<commit_message>
added temporary flow scheme in images folder
</commit_message>
<xml_diff>
--- a/paper/Images/scheme.pptx
+++ b/paper/Images/scheme.pptx
@@ -104,7 +104,16 @@
       </a:defRPr>
     </a:lvl9pPr>
   </p:defaultTextStyle>
+  <p:extLst>
+    <p:ext uri="{EFAFB233-063F-42B5-8137-9DF3F51BA10A}">
+      <p15:sldGuideLst xmlns:p15="http://schemas.microsoft.com/office/powerpoint/2012/main"/>
+    </p:ext>
+  </p:extLst>
 </p:presentation>
+</file>
+
+<file path=ppt/revisionInfo.xml><?xml version="1.0" encoding="utf-8"?>
+<p1510:revInfo xmlns:a="http://schemas.openxmlformats.org/drawingml/2006/main" xmlns:r="http://schemas.openxmlformats.org/officeDocument/2006/relationships" xmlns:p1510="http://schemas.microsoft.com/office/powerpoint/2015/10/main"/>
 </file>
 
 <file path=ppt/slideLayouts/slideLayout1.xml><?xml version="1.0" encoding="utf-8"?>
@@ -254,7 +263,7 @@
           <a:p>
             <a:fld id="{8F299877-8FF3-44DA-AAEE-A8E49885A9B8}" type="datetimeFigureOut">
               <a:rPr lang="it-IT" smtClean="0"/>
-              <a:t>14/09/2017</a:t>
+              <a:t>18/09/2017</a:t>
             </a:fld>
             <a:endParaRPr lang="it-IT"/>
           </a:p>
@@ -452,7 +461,7 @@
           <a:p>
             <a:fld id="{8F299877-8FF3-44DA-AAEE-A8E49885A9B8}" type="datetimeFigureOut">
               <a:rPr lang="it-IT" smtClean="0"/>
-              <a:t>14/09/2017</a:t>
+              <a:t>18/09/2017</a:t>
             </a:fld>
             <a:endParaRPr lang="it-IT"/>
           </a:p>
@@ -660,7 +669,7 @@
           <a:p>
             <a:fld id="{8F299877-8FF3-44DA-AAEE-A8E49885A9B8}" type="datetimeFigureOut">
               <a:rPr lang="it-IT" smtClean="0"/>
-              <a:t>14/09/2017</a:t>
+              <a:t>18/09/2017</a:t>
             </a:fld>
             <a:endParaRPr lang="it-IT"/>
           </a:p>
@@ -858,7 +867,7 @@
           <a:p>
             <a:fld id="{8F299877-8FF3-44DA-AAEE-A8E49885A9B8}" type="datetimeFigureOut">
               <a:rPr lang="it-IT" smtClean="0"/>
-              <a:t>14/09/2017</a:t>
+              <a:t>18/09/2017</a:t>
             </a:fld>
             <a:endParaRPr lang="it-IT"/>
           </a:p>
@@ -1133,7 +1142,7 @@
           <a:p>
             <a:fld id="{8F299877-8FF3-44DA-AAEE-A8E49885A9B8}" type="datetimeFigureOut">
               <a:rPr lang="it-IT" smtClean="0"/>
-              <a:t>14/09/2017</a:t>
+              <a:t>18/09/2017</a:t>
             </a:fld>
             <a:endParaRPr lang="it-IT"/>
           </a:p>
@@ -1398,7 +1407,7 @@
           <a:p>
             <a:fld id="{8F299877-8FF3-44DA-AAEE-A8E49885A9B8}" type="datetimeFigureOut">
               <a:rPr lang="it-IT" smtClean="0"/>
-              <a:t>14/09/2017</a:t>
+              <a:t>18/09/2017</a:t>
             </a:fld>
             <a:endParaRPr lang="it-IT"/>
           </a:p>
@@ -1810,7 +1819,7 @@
           <a:p>
             <a:fld id="{8F299877-8FF3-44DA-AAEE-A8E49885A9B8}" type="datetimeFigureOut">
               <a:rPr lang="it-IT" smtClean="0"/>
-              <a:t>14/09/2017</a:t>
+              <a:t>18/09/2017</a:t>
             </a:fld>
             <a:endParaRPr lang="it-IT"/>
           </a:p>
@@ -1951,7 +1960,7 @@
           <a:p>
             <a:fld id="{8F299877-8FF3-44DA-AAEE-A8E49885A9B8}" type="datetimeFigureOut">
               <a:rPr lang="it-IT" smtClean="0"/>
-              <a:t>14/09/2017</a:t>
+              <a:t>18/09/2017</a:t>
             </a:fld>
             <a:endParaRPr lang="it-IT"/>
           </a:p>
@@ -2064,7 +2073,7 @@
           <a:p>
             <a:fld id="{8F299877-8FF3-44DA-AAEE-A8E49885A9B8}" type="datetimeFigureOut">
               <a:rPr lang="it-IT" smtClean="0"/>
-              <a:t>14/09/2017</a:t>
+              <a:t>18/09/2017</a:t>
             </a:fld>
             <a:endParaRPr lang="it-IT"/>
           </a:p>
@@ -2375,7 +2384,7 @@
           <a:p>
             <a:fld id="{8F299877-8FF3-44DA-AAEE-A8E49885A9B8}" type="datetimeFigureOut">
               <a:rPr lang="it-IT" smtClean="0"/>
-              <a:t>14/09/2017</a:t>
+              <a:t>18/09/2017</a:t>
             </a:fld>
             <a:endParaRPr lang="it-IT"/>
           </a:p>
@@ -2663,7 +2672,7 @@
           <a:p>
             <a:fld id="{8F299877-8FF3-44DA-AAEE-A8E49885A9B8}" type="datetimeFigureOut">
               <a:rPr lang="it-IT" smtClean="0"/>
-              <a:t>14/09/2017</a:t>
+              <a:t>18/09/2017</a:t>
             </a:fld>
             <a:endParaRPr lang="it-IT"/>
           </a:p>
@@ -2904,7 +2913,7 @@
           <a:p>
             <a:fld id="{8F299877-8FF3-44DA-AAEE-A8E49885A9B8}" type="datetimeFigureOut">
               <a:rPr lang="it-IT" smtClean="0"/>
-              <a:t>14/09/2017</a:t>
+              <a:t>18/09/2017</a:t>
             </a:fld>
             <a:endParaRPr lang="it-IT"/>
           </a:p>
@@ -3349,7 +3358,7 @@
         </p:blipFill>
         <p:spPr>
           <a:xfrm>
-            <a:off x="5095874" y="548626"/>
+            <a:off x="5095874" y="62493"/>
             <a:ext cx="1228724" cy="923012"/>
           </a:xfrm>
           <a:prstGeom prst="rect">
@@ -3385,7 +3394,7 @@
         </p:blipFill>
         <p:spPr>
           <a:xfrm>
-            <a:off x="7823425" y="3699069"/>
+            <a:off x="9096642" y="3212936"/>
             <a:ext cx="1724028" cy="799886"/>
           </a:xfrm>
           <a:prstGeom prst="rect">
@@ -3421,44 +3430,8 @@
         </p:blipFill>
         <p:spPr>
           <a:xfrm>
-            <a:off x="2484120" y="3729545"/>
-            <a:ext cx="994404" cy="763148"/>
-          </a:xfrm>
-          <a:prstGeom prst="rect">
-            <a:avLst/>
-          </a:prstGeom>
-        </p:spPr>
-      </p:pic>
-      <p:pic>
-        <p:nvPicPr>
-          <p:cNvPr id="8" name="Elemento grafico 7">
-            <a:extLst>
-              <a:ext uri="{FF2B5EF4-FFF2-40B4-BE49-F238E27FC236}">
-                <a16:creationId xmlns:a16="http://schemas.microsoft.com/office/drawing/2014/main" id="{0E3B704F-1914-4D22-B742-70C0EA3FFCAC}"/>
-              </a:ext>
-            </a:extLst>
-          </p:cNvPr>
-          <p:cNvPicPr>
-            <a:picLocks noChangeAspect="1"/>
-          </p:cNvPicPr>
-          <p:nvPr/>
-        </p:nvPicPr>
-        <p:blipFill>
-          <a:blip r:embed="rId8">
-            <a:extLst>
-              <a:ext uri="{96DAC541-7B7A-43D3-8B79-37D633B846F1}">
-                <asvg:svgBlip xmlns:asvg="http://schemas.microsoft.com/office/drawing/2016/SVG/main" r:embed="rId9"/>
-              </a:ext>
-            </a:extLst>
-          </a:blip>
-          <a:stretch>
-            <a:fillRect/>
-          </a:stretch>
-        </p:blipFill>
-        <p:spPr>
-          <a:xfrm>
-            <a:off x="5213035" y="3729547"/>
-            <a:ext cx="994402" cy="763146"/>
+            <a:off x="1564600" y="2852547"/>
+            <a:ext cx="1853657" cy="1422576"/>
           </a:xfrm>
           <a:prstGeom prst="rect">
             <a:avLst/>
@@ -3479,8 +3452,8 @@
         </p:nvSpPr>
         <p:spPr>
           <a:xfrm>
-            <a:off x="2424110" y="5476553"/>
-            <a:ext cx="1114425" cy="369332"/>
+            <a:off x="2336763" y="4698968"/>
+            <a:ext cx="1114425" cy="1477328"/>
           </a:xfrm>
           <a:prstGeom prst="rect">
             <a:avLst/>
@@ -3499,10 +3472,25 @@
           <a:lstStyle/>
           <a:p>
             <a:pPr algn="ctr"/>
+            <a:endParaRPr lang="en-US" dirty="0"/>
+          </a:p>
+          <a:p>
+            <a:pPr algn="ctr"/>
+            <a:endParaRPr lang="en-US" dirty="0"/>
+          </a:p>
+          <a:p>
+            <a:pPr algn="ctr"/>
             <a:r>
               <a:rPr lang="en-US" dirty="0"/>
-              <a:t>optimizer</a:t>
+              <a:t>DPC</a:t>
             </a:r>
+          </a:p>
+          <a:p>
+            <a:pPr algn="ctr"/>
+            <a:endParaRPr lang="en-US" dirty="0"/>
+          </a:p>
+          <a:p>
+            <a:pPr algn="ctr"/>
             <a:endParaRPr lang="it-IT" dirty="0"/>
           </a:p>
         </p:txBody>
@@ -3521,8 +3509,8 @@
         </p:nvSpPr>
         <p:spPr>
           <a:xfrm>
-            <a:off x="4943472" y="5476553"/>
-            <a:ext cx="1533526" cy="369332"/>
+            <a:off x="5398475" y="4711887"/>
+            <a:ext cx="1533526" cy="1477328"/>
           </a:xfrm>
           <a:prstGeom prst="rect">
             <a:avLst/>
@@ -3541,10 +3529,25 @@
           <a:lstStyle/>
           <a:p>
             <a:pPr algn="ctr"/>
+            <a:endParaRPr lang="en-US" dirty="0"/>
+          </a:p>
+          <a:p>
+            <a:pPr algn="ctr"/>
+            <a:endParaRPr lang="en-US" dirty="0"/>
+          </a:p>
+          <a:p>
+            <a:pPr algn="ctr"/>
             <a:r>
               <a:rPr lang="en-US" dirty="0"/>
               <a:t>affine model</a:t>
             </a:r>
+          </a:p>
+          <a:p>
+            <a:pPr algn="ctr"/>
+            <a:endParaRPr lang="en-US" dirty="0"/>
+          </a:p>
+          <a:p>
+            <a:pPr algn="ctr"/>
             <a:endParaRPr lang="it-IT" dirty="0"/>
           </a:p>
         </p:txBody>
@@ -3560,15 +3563,15 @@
           </p:cNvPr>
           <p:cNvCxnSpPr>
             <a:cxnSpLocks/>
-            <a:stCxn id="8" idx="2"/>
+            <a:stCxn id="53" idx="2"/>
             <a:endCxn id="10" idx="0"/>
           </p:cNvCxnSpPr>
           <p:nvPr/>
         </p:nvCxnSpPr>
         <p:spPr>
-          <a:xfrm flipH="1">
-            <a:off x="5710235" y="4492693"/>
-            <a:ext cx="1" cy="983860"/>
+          <a:xfrm>
+            <a:off x="6162886" y="4273216"/>
+            <a:ext cx="2352" cy="438671"/>
           </a:xfrm>
           <a:prstGeom prst="straightConnector1">
             <a:avLst/>
@@ -3607,105 +3610,13 @@
           <p:cNvCxnSpPr>
             <a:cxnSpLocks/>
             <a:stCxn id="9" idx="0"/>
-            <a:endCxn id="7" idx="2"/>
           </p:cNvCxnSpPr>
           <p:nvPr/>
         </p:nvCxnSpPr>
         <p:spPr>
-          <a:xfrm flipH="1" flipV="1">
-            <a:off x="2981322" y="4492693"/>
-            <a:ext cx="1" cy="983860"/>
-          </a:xfrm>
-          <a:prstGeom prst="straightConnector1">
-            <a:avLst/>
-          </a:prstGeom>
-          <a:ln w="25400">
-            <a:solidFill>
-              <a:schemeClr val="tx1"/>
-            </a:solidFill>
-            <a:tailEnd type="triangle"/>
-          </a:ln>
-        </p:spPr>
-        <p:style>
-          <a:lnRef idx="1">
-            <a:schemeClr val="accent1"/>
-          </a:lnRef>
-          <a:fillRef idx="0">
-            <a:schemeClr val="accent1"/>
-          </a:fillRef>
-          <a:effectRef idx="0">
-            <a:schemeClr val="accent1"/>
-          </a:effectRef>
-          <a:fontRef idx="minor">
-            <a:schemeClr val="tx1"/>
-          </a:fontRef>
-        </p:style>
-      </p:cxnSp>
-      <p:cxnSp>
-        <p:nvCxnSpPr>
-          <p:cNvPr id="16" name="Connettore 2 15">
-            <a:extLst>
-              <a:ext uri="{FF2B5EF4-FFF2-40B4-BE49-F238E27FC236}">
-                <a16:creationId xmlns:a16="http://schemas.microsoft.com/office/drawing/2014/main" id="{779ACD4A-4022-436C-99BC-48D387B5CF4A}"/>
-              </a:ext>
-            </a:extLst>
-          </p:cNvPr>
-          <p:cNvCxnSpPr>
-            <a:stCxn id="10" idx="1"/>
-            <a:endCxn id="9" idx="3"/>
-          </p:cNvCxnSpPr>
-          <p:nvPr/>
-        </p:nvCxnSpPr>
-        <p:spPr>
-          <a:xfrm flipH="1">
-            <a:off x="3538535" y="5661219"/>
-            <a:ext cx="1404937" cy="0"/>
-          </a:xfrm>
-          <a:prstGeom prst="straightConnector1">
-            <a:avLst/>
-          </a:prstGeom>
-          <a:ln w="25400">
-            <a:solidFill>
-              <a:schemeClr val="tx1"/>
-            </a:solidFill>
-            <a:tailEnd type="triangle"/>
-          </a:ln>
-        </p:spPr>
-        <p:style>
-          <a:lnRef idx="1">
-            <a:schemeClr val="accent1"/>
-          </a:lnRef>
-          <a:fillRef idx="0">
-            <a:schemeClr val="accent1"/>
-          </a:fillRef>
-          <a:effectRef idx="0">
-            <a:schemeClr val="accent1"/>
-          </a:effectRef>
-          <a:fontRef idx="minor">
-            <a:schemeClr val="tx1"/>
-          </a:fontRef>
-        </p:style>
-      </p:cxnSp>
-      <p:cxnSp>
-        <p:nvCxnSpPr>
-          <p:cNvPr id="18" name="Connettore 2 17">
-            <a:extLst>
-              <a:ext uri="{FF2B5EF4-FFF2-40B4-BE49-F238E27FC236}">
-                <a16:creationId xmlns:a16="http://schemas.microsoft.com/office/drawing/2014/main" id="{7070F104-F14C-49FE-B7A0-133F02182E3F}"/>
-              </a:ext>
-            </a:extLst>
-          </p:cNvPr>
-          <p:cNvCxnSpPr>
-            <a:cxnSpLocks/>
-            <a:stCxn id="7" idx="3"/>
-            <a:endCxn id="8" idx="1"/>
-          </p:cNvCxnSpPr>
-          <p:nvPr/>
-        </p:nvCxnSpPr>
-        <p:spPr>
-          <a:xfrm>
-            <a:off x="3478524" y="4111119"/>
-            <a:ext cx="1734511" cy="1"/>
+          <a:xfrm flipV="1">
+            <a:off x="2893976" y="4317630"/>
+            <a:ext cx="0" cy="381338"/>
           </a:xfrm>
           <a:prstGeom prst="straightConnector1">
             <a:avLst/>
@@ -3747,20 +3658,20 @@
           <p:nvPr/>
         </p:nvCxnSpPr>
         <p:spPr>
-          <a:xfrm flipV="1">
-            <a:off x="2214561" y="4344168"/>
-            <a:ext cx="5608864" cy="1880104"/>
+          <a:xfrm>
+            <a:off x="2893975" y="4492551"/>
+            <a:ext cx="5020793" cy="1847125"/>
           </a:xfrm>
           <a:prstGeom prst="bentConnector3">
             <a:avLst>
-              <a:gd name="adj1" fmla="val 84779"/>
+              <a:gd name="adj1" fmla="val -12936"/>
             </a:avLst>
           </a:prstGeom>
           <a:ln w="25400">
             <a:solidFill>
               <a:schemeClr val="tx1"/>
             </a:solidFill>
-            <a:tailEnd type="triangle"/>
+            <a:tailEnd type="none"/>
           </a:ln>
         </p:spPr>
         <p:style>
@@ -3792,7 +3703,7 @@
         </p:nvSpPr>
         <p:spPr>
           <a:xfrm rot="2700000">
-            <a:off x="3549484" y="2605636"/>
+            <a:off x="3361556" y="1945030"/>
             <a:ext cx="597693" cy="1033463"/>
           </a:xfrm>
           <a:prstGeom prst="downArrow">
@@ -3837,9 +3748,9 @@
           <p:nvPr/>
         </p:nvSpPr>
         <p:spPr>
-          <a:xfrm rot="18900000">
-            <a:off x="7180889" y="2639622"/>
-            <a:ext cx="597693" cy="1033463"/>
+          <a:xfrm rot="18000000">
+            <a:off x="7643339" y="1847760"/>
+            <a:ext cx="597693" cy="1555570"/>
           </a:xfrm>
           <a:prstGeom prst="downArrow">
             <a:avLst/>
@@ -3884,7 +3795,7 @@
         </p:nvSpPr>
         <p:spPr>
           <a:xfrm>
-            <a:off x="5411387" y="2754444"/>
+            <a:off x="5396441" y="2094760"/>
             <a:ext cx="597693" cy="776164"/>
           </a:xfrm>
           <a:prstGeom prst="downArrow">
@@ -3916,49 +3827,6 @@
           </a:p>
         </p:txBody>
       </p:sp>
-      <p:cxnSp>
-        <p:nvCxnSpPr>
-          <p:cNvPr id="54" name="Connettore a gomito 53">
-            <a:extLst>
-              <a:ext uri="{FF2B5EF4-FFF2-40B4-BE49-F238E27FC236}">
-                <a16:creationId xmlns:a16="http://schemas.microsoft.com/office/drawing/2014/main" id="{6DE23424-1DE3-4400-B230-FA84E36AC3B3}"/>
-              </a:ext>
-            </a:extLst>
-          </p:cNvPr>
-          <p:cNvCxnSpPr/>
-          <p:nvPr/>
-        </p:nvCxnSpPr>
-        <p:spPr>
-          <a:xfrm rot="5400000">
-            <a:off x="2104579" y="5318951"/>
-            <a:ext cx="1001015" cy="752472"/>
-          </a:xfrm>
-          <a:prstGeom prst="bentConnector3">
-            <a:avLst>
-              <a:gd name="adj1" fmla="val 1472"/>
-            </a:avLst>
-          </a:prstGeom>
-          <a:ln w="25400">
-            <a:solidFill>
-              <a:schemeClr val="tx1"/>
-            </a:solidFill>
-          </a:ln>
-        </p:spPr>
-        <p:style>
-          <a:lnRef idx="1">
-            <a:schemeClr val="accent1"/>
-          </a:lnRef>
-          <a:fillRef idx="0">
-            <a:schemeClr val="accent1"/>
-          </a:fillRef>
-          <a:effectRef idx="0">
-            <a:schemeClr val="accent1"/>
-          </a:effectRef>
-          <a:fontRef idx="minor">
-            <a:schemeClr val="tx1"/>
-          </a:fontRef>
-        </p:style>
-      </p:cxnSp>
       <p:pic>
         <p:nvPicPr>
           <p:cNvPr id="63" name="Immagine 62">
@@ -3974,7 +3842,7 @@
           <p:nvPr/>
         </p:nvPicPr>
         <p:blipFill>
-          <a:blip r:embed="rId10">
+          <a:blip r:embed="rId8">
             <a:extLst>
               <a:ext uri="{28A0092B-C50C-407E-A947-70E740481C1C}">
                 <a14:useLocalDpi xmlns:a14="http://schemas.microsoft.com/office/drawing/2010/main" val="0"/>
@@ -3987,7 +3855,7 @@
         </p:blipFill>
         <p:spPr>
           <a:xfrm>
-            <a:off x="4239573" y="1934553"/>
+            <a:off x="4239573" y="1448420"/>
             <a:ext cx="2941320" cy="779728"/>
           </a:xfrm>
           <a:prstGeom prst="rect">
@@ -4009,7 +3877,7 @@
         </p:nvSpPr>
         <p:spPr>
           <a:xfrm>
-            <a:off x="5411386" y="1519991"/>
+            <a:off x="5411386" y="1033858"/>
             <a:ext cx="597693" cy="395169"/>
           </a:xfrm>
           <a:prstGeom prst="downArrow">
@@ -4055,7 +3923,7 @@
         </p:nvCxnSpPr>
         <p:spPr>
           <a:xfrm>
-            <a:off x="9547453" y="3909896"/>
+            <a:off x="10820670" y="3423763"/>
             <a:ext cx="785267" cy="0"/>
           </a:xfrm>
           <a:prstGeom prst="straightConnector1">
@@ -4097,7 +3965,2687 @@
         </p:nvCxnSpPr>
         <p:spPr>
           <a:xfrm>
-            <a:off x="9547452" y="4334912"/>
+            <a:off x="10820669" y="3848779"/>
+            <a:ext cx="785267" cy="0"/>
+          </a:xfrm>
+          <a:prstGeom prst="straightConnector1">
+            <a:avLst/>
+          </a:prstGeom>
+          <a:ln w="25400">
+            <a:solidFill>
+              <a:srgbClr val="C00000"/>
+            </a:solidFill>
+            <a:tailEnd type="triangle"/>
+          </a:ln>
+        </p:spPr>
+        <p:style>
+          <a:lnRef idx="1">
+            <a:schemeClr val="accent1"/>
+          </a:lnRef>
+          <a:fillRef idx="0">
+            <a:schemeClr val="accent1"/>
+          </a:fillRef>
+          <a:effectRef idx="0">
+            <a:schemeClr val="accent1"/>
+          </a:effectRef>
+          <a:fontRef idx="minor">
+            <a:schemeClr val="tx1"/>
+          </a:fontRef>
+        </p:style>
+      </p:cxnSp>
+      <mc:AlternateContent xmlns:mc="http://schemas.openxmlformats.org/markup-compatibility/2006" xmlns:a14="http://schemas.microsoft.com/office/drawing/2010/main">
+        <mc:Choice Requires="a14">
+          <p:sp>
+            <p:nvSpPr>
+              <p:cNvPr id="79" name="CasellaDiTesto 78">
+                <a:extLst>
+                  <a:ext uri="{FF2B5EF4-FFF2-40B4-BE49-F238E27FC236}">
+                    <a16:creationId xmlns:a16="http://schemas.microsoft.com/office/drawing/2014/main" id="{8FCB14C3-71CB-4EB4-B87F-6E242ABBA1E1}"/>
+                  </a:ext>
+                </a:extLst>
+              </p:cNvPr>
+              <p:cNvSpPr txBox="1"/>
+              <p:nvPr/>
+            </p:nvSpPr>
+            <p:spPr>
+              <a:xfrm>
+                <a:off x="10940119" y="3116222"/>
+                <a:ext cx="533544" cy="276999"/>
+              </a:xfrm>
+              <a:prstGeom prst="rect">
+                <a:avLst/>
+              </a:prstGeom>
+              <a:noFill/>
+            </p:spPr>
+            <p:txBody>
+              <a:bodyPr wrap="none" lIns="0" tIns="0" rIns="0" bIns="0" rtlCol="0">
+                <a:spAutoFit/>
+              </a:bodyPr>
+              <a:lstStyle/>
+              <a:p>
+                <a:pPr/>
+                <a14:m>
+                  <m:oMathPara xmlns:m="http://schemas.openxmlformats.org/officeDocument/2006/math">
+                    <m:oMathParaPr>
+                      <m:jc m:val="centerGroup"/>
+                    </m:oMathParaPr>
+                    <m:oMath xmlns:m="http://schemas.openxmlformats.org/officeDocument/2006/math">
+                      <m:sSub>
+                        <m:sSubPr>
+                          <m:ctrlPr>
+                            <a:rPr lang="it-IT" i="1" smtClean="0">
+                              <a:latin typeface="Cambria Math" panose="02040503050406030204" pitchFamily="18" charset="0"/>
+                            </a:rPr>
+                          </m:ctrlPr>
+                        </m:sSubPr>
+                        <m:e>
+                          <m:r>
+                            <a:rPr lang="en-US" b="0" i="1" smtClean="0">
+                              <a:latin typeface="Cambria Math" panose="02040503050406030204" pitchFamily="18" charset="0"/>
+                            </a:rPr>
+                            <m:t>𝐸</m:t>
+                          </m:r>
+                        </m:e>
+                        <m:sub>
+                          <m:r>
+                            <a:rPr lang="en-US" b="0" i="1" smtClean="0">
+                              <a:latin typeface="Cambria Math" panose="02040503050406030204" pitchFamily="18" charset="0"/>
+                            </a:rPr>
+                            <m:t>𝐷𝑃𝐶</m:t>
+                          </m:r>
+                        </m:sub>
+                      </m:sSub>
+                    </m:oMath>
+                  </m:oMathPara>
+                </a14:m>
+                <a:endParaRPr lang="it-IT" dirty="0"/>
+              </a:p>
+            </p:txBody>
+          </p:sp>
+        </mc:Choice>
+        <mc:Fallback xmlns="">
+          <p:sp>
+            <p:nvSpPr>
+              <p:cNvPr id="79" name="CasellaDiTesto 78">
+                <a:extLst>
+                  <a:ext uri="{FF2B5EF4-FFF2-40B4-BE49-F238E27FC236}">
+                    <a16:creationId xmlns:a16="http://schemas.microsoft.com/office/drawing/2014/main" id="{8FCB14C3-71CB-4EB4-B87F-6E242ABBA1E1}"/>
+                  </a:ext>
+                </a:extLst>
+              </p:cNvPr>
+              <p:cNvSpPr txBox="1">
+                <a:spLocks noRot="1" noChangeAspect="1" noMove="1" noResize="1" noEditPoints="1" noAdjustHandles="1" noChangeArrowheads="1" noChangeShapeType="1" noTextEdit="1"/>
+              </p:cNvSpPr>
+              <p:nvPr/>
+            </p:nvSpPr>
+            <p:spPr>
+              <a:xfrm>
+                <a:off x="10940119" y="3116222"/>
+                <a:ext cx="533544" cy="276999"/>
+              </a:xfrm>
+              <a:prstGeom prst="rect">
+                <a:avLst/>
+              </a:prstGeom>
+              <a:blipFill>
+                <a:blip r:embed="rId9"/>
+                <a:stretch>
+                  <a:fillRect l="-10345" r="-3448" b="-15217"/>
+                </a:stretch>
+              </a:blipFill>
+            </p:spPr>
+            <p:txBody>
+              <a:bodyPr/>
+              <a:lstStyle/>
+              <a:p>
+                <a:r>
+                  <a:rPr lang="it-IT">
+                    <a:noFill/>
+                  </a:rPr>
+                  <a:t> </a:t>
+                </a:r>
+              </a:p>
+            </p:txBody>
+          </p:sp>
+        </mc:Fallback>
+      </mc:AlternateContent>
+      <mc:AlternateContent xmlns:mc="http://schemas.openxmlformats.org/markup-compatibility/2006" xmlns:a14="http://schemas.microsoft.com/office/drawing/2010/main">
+        <mc:Choice Requires="a14">
+          <p:sp>
+            <p:nvSpPr>
+              <p:cNvPr id="80" name="CasellaDiTesto 79">
+                <a:extLst>
+                  <a:ext uri="{FF2B5EF4-FFF2-40B4-BE49-F238E27FC236}">
+                    <a16:creationId xmlns:a16="http://schemas.microsoft.com/office/drawing/2014/main" id="{49D75346-A6BC-4119-BEB0-A1126E25A29B}"/>
+                  </a:ext>
+                </a:extLst>
+              </p:cNvPr>
+              <p:cNvSpPr txBox="1"/>
+              <p:nvPr/>
+            </p:nvSpPr>
+            <p:spPr>
+              <a:xfrm>
+                <a:off x="10940119" y="3541237"/>
+                <a:ext cx="1174745" cy="299569"/>
+              </a:xfrm>
+              <a:prstGeom prst="rect">
+                <a:avLst/>
+              </a:prstGeom>
+              <a:noFill/>
+            </p:spPr>
+            <p:txBody>
+              <a:bodyPr wrap="none" lIns="0" tIns="0" rIns="0" bIns="0" rtlCol="0">
+                <a:spAutoFit/>
+              </a:bodyPr>
+              <a:lstStyle/>
+              <a:p>
+                <a:pPr/>
+                <a14:m>
+                  <m:oMathPara xmlns:m="http://schemas.openxmlformats.org/officeDocument/2006/math">
+                    <m:oMathParaPr>
+                      <m:jc m:val="centerGroup"/>
+                    </m:oMathParaPr>
+                    <m:oMath xmlns:m="http://schemas.openxmlformats.org/officeDocument/2006/math">
+                      <m:sSub>
+                        <m:sSubPr>
+                          <m:ctrlPr>
+                            <a:rPr lang="it-IT" i="1" smtClean="0">
+                              <a:latin typeface="Cambria Math" panose="02040503050406030204" pitchFamily="18" charset="0"/>
+                            </a:rPr>
+                          </m:ctrlPr>
+                        </m:sSubPr>
+                        <m:e>
+                          <m:r>
+                            <a:rPr lang="en-US" b="0" i="1" smtClean="0">
+                              <a:latin typeface="Cambria Math" panose="02040503050406030204" pitchFamily="18" charset="0"/>
+                            </a:rPr>
+                            <m:t>𝐸</m:t>
+                          </m:r>
+                        </m:e>
+                        <m:sub>
+                          <m:r>
+                            <a:rPr lang="en-US" b="0" i="1" smtClean="0">
+                              <a:latin typeface="Cambria Math" panose="02040503050406030204" pitchFamily="18" charset="0"/>
+                            </a:rPr>
+                            <m:t>𝑏𝑎𝑛𝑔</m:t>
+                          </m:r>
+                          <m:r>
+                            <a:rPr lang="en-US" b="0" i="1" smtClean="0">
+                              <a:latin typeface="Cambria Math" panose="02040503050406030204" pitchFamily="18" charset="0"/>
+                            </a:rPr>
+                            <m:t>−</m:t>
+                          </m:r>
+                          <m:r>
+                            <a:rPr lang="en-US" b="0" i="1" smtClean="0">
+                              <a:latin typeface="Cambria Math" panose="02040503050406030204" pitchFamily="18" charset="0"/>
+                            </a:rPr>
+                            <m:t>𝑏𝑎𝑛𝑔</m:t>
+                          </m:r>
+                        </m:sub>
+                      </m:sSub>
+                    </m:oMath>
+                  </m:oMathPara>
+                </a14:m>
+                <a:endParaRPr lang="it-IT" dirty="0"/>
+              </a:p>
+            </p:txBody>
+          </p:sp>
+        </mc:Choice>
+        <mc:Fallback xmlns="">
+          <p:sp>
+            <p:nvSpPr>
+              <p:cNvPr id="80" name="CasellaDiTesto 79">
+                <a:extLst>
+                  <a:ext uri="{FF2B5EF4-FFF2-40B4-BE49-F238E27FC236}">
+                    <a16:creationId xmlns:a16="http://schemas.microsoft.com/office/drawing/2014/main" id="{49D75346-A6BC-4119-BEB0-A1126E25A29B}"/>
+                  </a:ext>
+                </a:extLst>
+              </p:cNvPr>
+              <p:cNvSpPr txBox="1">
+                <a:spLocks noRot="1" noChangeAspect="1" noMove="1" noResize="1" noEditPoints="1" noAdjustHandles="1" noChangeArrowheads="1" noChangeShapeType="1" noTextEdit="1"/>
+              </p:cNvSpPr>
+              <p:nvPr/>
+            </p:nvSpPr>
+            <p:spPr>
+              <a:xfrm>
+                <a:off x="10940119" y="3541237"/>
+                <a:ext cx="1174745" cy="299569"/>
+              </a:xfrm>
+              <a:prstGeom prst="rect">
+                <a:avLst/>
+              </a:prstGeom>
+              <a:blipFill>
+                <a:blip r:embed="rId10"/>
+                <a:stretch>
+                  <a:fillRect l="-4688" r="-3646" b="-28571"/>
+                </a:stretch>
+              </a:blipFill>
+            </p:spPr>
+            <p:txBody>
+              <a:bodyPr/>
+              <a:lstStyle/>
+              <a:p>
+                <a:r>
+                  <a:rPr lang="it-IT">
+                    <a:noFill/>
+                  </a:rPr>
+                  <a:t> </a:t>
+                </a:r>
+              </a:p>
+            </p:txBody>
+          </p:sp>
+        </mc:Fallback>
+      </mc:AlternateContent>
+      <mc:AlternateContent xmlns:mc="http://schemas.openxmlformats.org/markup-compatibility/2006" xmlns:a14="http://schemas.microsoft.com/office/drawing/2010/main">
+        <mc:Choice Requires="a14">
+          <p:sp>
+            <p:nvSpPr>
+              <p:cNvPr id="2" name="CasellaDiTesto 1">
+                <a:extLst>
+                  <a:ext uri="{FF2B5EF4-FFF2-40B4-BE49-F238E27FC236}">
+                    <a16:creationId xmlns:a16="http://schemas.microsoft.com/office/drawing/2014/main" id="{12B04CED-2080-4D2F-8ECC-B1448F0D9258}"/>
+                  </a:ext>
+                </a:extLst>
+              </p:cNvPr>
+              <p:cNvSpPr txBox="1"/>
+              <p:nvPr/>
+            </p:nvSpPr>
+            <p:spPr>
+              <a:xfrm>
+                <a:off x="3073502" y="4267610"/>
+                <a:ext cx="312842" cy="276999"/>
+              </a:xfrm>
+              <a:prstGeom prst="rect">
+                <a:avLst/>
+              </a:prstGeom>
+              <a:noFill/>
+            </p:spPr>
+            <p:txBody>
+              <a:bodyPr wrap="none" lIns="0" tIns="0" rIns="0" bIns="0" rtlCol="0">
+                <a:spAutoFit/>
+              </a:bodyPr>
+              <a:lstStyle/>
+              <a:p>
+                <a:pPr/>
+                <a14:m>
+                  <m:oMathPara xmlns:m="http://schemas.openxmlformats.org/officeDocument/2006/math">
+                    <m:oMathParaPr>
+                      <m:jc m:val="centerGroup"/>
+                    </m:oMathParaPr>
+                    <m:oMath xmlns:m="http://schemas.openxmlformats.org/officeDocument/2006/math">
+                      <m:sSubSup>
+                        <m:sSubSupPr>
+                          <m:ctrlPr>
+                            <a:rPr lang="it-IT" i="1" smtClean="0">
+                              <a:latin typeface="Cambria Math" panose="02040503050406030204" pitchFamily="18" charset="0"/>
+                            </a:rPr>
+                          </m:ctrlPr>
+                        </m:sSubSupPr>
+                        <m:e>
+                          <m:r>
+                            <a:rPr lang="en-US" b="0" i="1" smtClean="0">
+                              <a:latin typeface="Cambria Math" panose="02040503050406030204" pitchFamily="18" charset="0"/>
+                            </a:rPr>
+                            <m:t>𝑋</m:t>
+                          </m:r>
+                        </m:e>
+                        <m:sub>
+                          <m:r>
+                            <a:rPr lang="en-US" b="0" i="1" smtClean="0">
+                              <a:latin typeface="Cambria Math" panose="02040503050406030204" pitchFamily="18" charset="0"/>
+                            </a:rPr>
+                            <m:t>𝑘</m:t>
+                          </m:r>
+                        </m:sub>
+                        <m:sup>
+                          <m:r>
+                            <a:rPr lang="en-US" b="0" i="1" smtClean="0">
+                              <a:latin typeface="Cambria Math" panose="02040503050406030204" pitchFamily="18" charset="0"/>
+                            </a:rPr>
+                            <m:t>𝑐</m:t>
+                          </m:r>
+                        </m:sup>
+                      </m:sSubSup>
+                    </m:oMath>
+                  </m:oMathPara>
+                </a14:m>
+                <a:endParaRPr lang="it-IT" dirty="0"/>
+              </a:p>
+            </p:txBody>
+          </p:sp>
+        </mc:Choice>
+        <mc:Fallback xmlns="">
+          <p:sp>
+            <p:nvSpPr>
+              <p:cNvPr id="2" name="CasellaDiTesto 1">
+                <a:extLst>
+                  <a:ext uri="{FF2B5EF4-FFF2-40B4-BE49-F238E27FC236}">
+                    <a16:creationId xmlns:a16="http://schemas.microsoft.com/office/drawing/2014/main" id="{12B04CED-2080-4D2F-8ECC-B1448F0D9258}"/>
+                  </a:ext>
+                </a:extLst>
+              </p:cNvPr>
+              <p:cNvSpPr txBox="1">
+                <a:spLocks noRot="1" noChangeAspect="1" noMove="1" noResize="1" noEditPoints="1" noAdjustHandles="1" noChangeArrowheads="1" noChangeShapeType="1" noTextEdit="1"/>
+              </p:cNvSpPr>
+              <p:nvPr/>
+            </p:nvSpPr>
+            <p:spPr>
+              <a:xfrm>
+                <a:off x="3073502" y="4267610"/>
+                <a:ext cx="312842" cy="276999"/>
+              </a:xfrm>
+              <a:prstGeom prst="rect">
+                <a:avLst/>
+              </a:prstGeom>
+              <a:blipFill>
+                <a:blip r:embed="rId11"/>
+                <a:stretch>
+                  <a:fillRect l="-15385" r="-5769" b="-17391"/>
+                </a:stretch>
+              </a:blipFill>
+            </p:spPr>
+            <p:txBody>
+              <a:bodyPr/>
+              <a:lstStyle/>
+              <a:p>
+                <a:r>
+                  <a:rPr lang="it-IT">
+                    <a:noFill/>
+                  </a:rPr>
+                  <a:t> </a:t>
+                </a:r>
+              </a:p>
+            </p:txBody>
+          </p:sp>
+        </mc:Fallback>
+      </mc:AlternateContent>
+      <p:grpSp>
+        <p:nvGrpSpPr>
+          <p:cNvPr id="28" name="Gruppo 27">
+            <a:extLst>
+              <a:ext uri="{FF2B5EF4-FFF2-40B4-BE49-F238E27FC236}">
+                <a16:creationId xmlns:a16="http://schemas.microsoft.com/office/drawing/2014/main" id="{E92A5A69-A54E-439F-A276-5BE3CFD07F0E}"/>
+              </a:ext>
+            </a:extLst>
+          </p:cNvPr>
+          <p:cNvGrpSpPr/>
+          <p:nvPr/>
+        </p:nvGrpSpPr>
+        <p:grpSpPr>
+          <a:xfrm>
+            <a:off x="3478524" y="3484068"/>
+            <a:ext cx="1734511" cy="262838"/>
+            <a:chOff x="3478524" y="3848282"/>
+            <a:chExt cx="1734511" cy="262838"/>
+          </a:xfrm>
+        </p:grpSpPr>
+        <p:cxnSp>
+          <p:nvCxnSpPr>
+            <p:cNvPr id="29" name="Connettore 2 28">
+              <a:extLst>
+                <a:ext uri="{FF2B5EF4-FFF2-40B4-BE49-F238E27FC236}">
+                  <a16:creationId xmlns:a16="http://schemas.microsoft.com/office/drawing/2014/main" id="{84ECEB94-61E7-4A7C-9E4E-B7E1711F3833}"/>
+                </a:ext>
+              </a:extLst>
+            </p:cNvPr>
+            <p:cNvCxnSpPr>
+              <a:cxnSpLocks/>
+            </p:cNvCxnSpPr>
+            <p:nvPr/>
+          </p:nvCxnSpPr>
+          <p:spPr>
+            <a:xfrm>
+              <a:off x="3478524" y="4111119"/>
+              <a:ext cx="1734511" cy="1"/>
+            </a:xfrm>
+            <a:prstGeom prst="straightConnector1">
+              <a:avLst/>
+            </a:prstGeom>
+            <a:ln w="25400">
+              <a:solidFill>
+                <a:schemeClr val="tx1"/>
+              </a:solidFill>
+              <a:tailEnd type="triangle"/>
+            </a:ln>
+          </p:spPr>
+          <p:style>
+            <a:lnRef idx="1">
+              <a:schemeClr val="accent1"/>
+            </a:lnRef>
+            <a:fillRef idx="0">
+              <a:schemeClr val="accent1"/>
+            </a:fillRef>
+            <a:effectRef idx="0">
+              <a:schemeClr val="accent1"/>
+            </a:effectRef>
+            <a:fontRef idx="minor">
+              <a:schemeClr val="tx1"/>
+            </a:fontRef>
+          </p:style>
+        </p:cxnSp>
+        <mc:AlternateContent xmlns:mc="http://schemas.openxmlformats.org/markup-compatibility/2006" xmlns:a14="http://schemas.microsoft.com/office/drawing/2010/main">
+          <mc:Choice Requires="a14">
+            <p:sp>
+              <p:nvSpPr>
+                <p:cNvPr id="30" name="CasellaDiTesto 29">
+                  <a:extLst>
+                    <a:ext uri="{FF2B5EF4-FFF2-40B4-BE49-F238E27FC236}">
+                      <a16:creationId xmlns:a16="http://schemas.microsoft.com/office/drawing/2014/main" id="{5E0B9B77-205A-4421-871F-C33864F8E324}"/>
+                    </a:ext>
+                  </a:extLst>
+                </p:cNvPr>
+                <p:cNvSpPr txBox="1"/>
+                <p:nvPr/>
+              </p:nvSpPr>
+              <p:spPr>
+                <a:xfrm>
+                  <a:off x="3945530" y="3848282"/>
+                  <a:ext cx="340988" cy="235642"/>
+                </a:xfrm>
+                <a:prstGeom prst="rect">
+                  <a:avLst/>
+                </a:prstGeom>
+                <a:noFill/>
+              </p:spPr>
+              <p:txBody>
+                <a:bodyPr wrap="square" lIns="0" tIns="0" rIns="0" bIns="0" rtlCol="0">
+                  <a:spAutoFit/>
+                </a:bodyPr>
+                <a:lstStyle/>
+                <a:p>
+                  <a:pPr/>
+                  <a14:m>
+                    <m:oMathPara xmlns:m="http://schemas.openxmlformats.org/officeDocument/2006/math">
+                      <m:oMathParaPr>
+                        <m:jc m:val="centerGroup"/>
+                      </m:oMathParaPr>
+                      <m:oMath xmlns:m="http://schemas.openxmlformats.org/officeDocument/2006/math">
+                        <m:sSubSup>
+                          <m:sSubSupPr>
+                            <m:ctrlPr>
+                              <a:rPr lang="it-IT" sz="1200" i="1" smtClean="0">
+                                <a:latin typeface="Cambria Math" panose="02040503050406030204" pitchFamily="18" charset="0"/>
+                              </a:rPr>
+                            </m:ctrlPr>
+                          </m:sSubSupPr>
+                          <m:e>
+                            <m:r>
+                              <a:rPr lang="en-US" sz="1200" b="0" i="1" smtClean="0">
+                                <a:latin typeface="Cambria Math" panose="02040503050406030204" pitchFamily="18" charset="0"/>
+                              </a:rPr>
+                              <m:t>𝑇</m:t>
+                            </m:r>
+                          </m:e>
+                          <m:sub>
+                            <m:r>
+                              <a:rPr lang="en-US" sz="1200" b="0" i="1" smtClean="0">
+                                <a:latin typeface="Cambria Math" panose="02040503050406030204" pitchFamily="18" charset="0"/>
+                              </a:rPr>
+                              <m:t>𝑘</m:t>
+                            </m:r>
+                            <m:r>
+                              <a:rPr lang="en-US" sz="1200" b="0" i="1" smtClean="0">
+                                <a:latin typeface="Cambria Math" panose="02040503050406030204" pitchFamily="18" charset="0"/>
+                              </a:rPr>
+                              <m:t>+1|</m:t>
+                            </m:r>
+                            <m:r>
+                              <a:rPr lang="en-US" sz="1200" b="0" i="1" smtClean="0">
+                                <a:latin typeface="Cambria Math" panose="02040503050406030204" pitchFamily="18" charset="0"/>
+                              </a:rPr>
+                              <m:t>𝑘</m:t>
+                            </m:r>
+                          </m:sub>
+                          <m:sup>
+                            <m:r>
+                              <a:rPr lang="en-US" sz="1200" b="0" i="1" smtClean="0">
+                                <a:latin typeface="Cambria Math" panose="02040503050406030204" pitchFamily="18" charset="0"/>
+                              </a:rPr>
+                              <m:t>𝑟</m:t>
+                            </m:r>
+                            <m:r>
+                              <a:rPr lang="en-US" sz="1200" b="0" i="1" smtClean="0">
+                                <a:latin typeface="Cambria Math" panose="02040503050406030204" pitchFamily="18" charset="0"/>
+                              </a:rPr>
+                              <m:t>,3</m:t>
+                            </m:r>
+                          </m:sup>
+                        </m:sSubSup>
+                      </m:oMath>
+                    </m:oMathPara>
+                  </a14:m>
+                  <a:endParaRPr lang="it-IT" sz="1200" dirty="0"/>
+                </a:p>
+              </p:txBody>
+            </p:sp>
+          </mc:Choice>
+          <mc:Fallback xmlns="">
+            <p:sp>
+              <p:nvSpPr>
+                <p:cNvPr id="30" name="CasellaDiTesto 29">
+                  <a:extLst>
+                    <a:ext uri="{FF2B5EF4-FFF2-40B4-BE49-F238E27FC236}">
+                      <a16:creationId xmlns:a16="http://schemas.microsoft.com/office/drawing/2014/main" id="{5E0B9B77-205A-4421-871F-C33864F8E324}"/>
+                    </a:ext>
+                  </a:extLst>
+                </p:cNvPr>
+                <p:cNvSpPr txBox="1">
+                  <a:spLocks noRot="1" noChangeAspect="1" noMove="1" noResize="1" noEditPoints="1" noAdjustHandles="1" noChangeArrowheads="1" noChangeShapeType="1" noTextEdit="1"/>
+                </p:cNvSpPr>
+                <p:nvPr/>
+              </p:nvSpPr>
+              <p:spPr>
+                <a:xfrm>
+                  <a:off x="3945530" y="3848282"/>
+                  <a:ext cx="340988" cy="235642"/>
+                </a:xfrm>
+                <a:prstGeom prst="rect">
+                  <a:avLst/>
+                </a:prstGeom>
+                <a:blipFill>
+                  <a:blip r:embed="rId12"/>
+                  <a:stretch>
+                    <a:fillRect l="-16071" r="-28571" b="-26316"/>
+                  </a:stretch>
+                </a:blipFill>
+              </p:spPr>
+              <p:txBody>
+                <a:bodyPr/>
+                <a:lstStyle/>
+                <a:p>
+                  <a:r>
+                    <a:rPr lang="it-IT">
+                      <a:noFill/>
+                    </a:rPr>
+                    <a:t> </a:t>
+                  </a:r>
+                </a:p>
+              </p:txBody>
+            </p:sp>
+          </mc:Fallback>
+        </mc:AlternateContent>
+      </p:grpSp>
+      <p:grpSp>
+        <p:nvGrpSpPr>
+          <p:cNvPr id="31" name="Gruppo 30">
+            <a:extLst>
+              <a:ext uri="{FF2B5EF4-FFF2-40B4-BE49-F238E27FC236}">
+                <a16:creationId xmlns:a16="http://schemas.microsoft.com/office/drawing/2014/main" id="{67DF0FB7-3DB2-460A-99E6-169B4AE00737}"/>
+              </a:ext>
+            </a:extLst>
+          </p:cNvPr>
+          <p:cNvGrpSpPr/>
+          <p:nvPr/>
+        </p:nvGrpSpPr>
+        <p:grpSpPr>
+          <a:xfrm>
+            <a:off x="3477944" y="2824938"/>
+            <a:ext cx="1734511" cy="262838"/>
+            <a:chOff x="3478524" y="3848282"/>
+            <a:chExt cx="1734511" cy="262838"/>
+          </a:xfrm>
+        </p:grpSpPr>
+        <p:cxnSp>
+          <p:nvCxnSpPr>
+            <p:cNvPr id="32" name="Connettore 2 31">
+              <a:extLst>
+                <a:ext uri="{FF2B5EF4-FFF2-40B4-BE49-F238E27FC236}">
+                  <a16:creationId xmlns:a16="http://schemas.microsoft.com/office/drawing/2014/main" id="{D2C32878-DB81-412A-B980-9CB2FBAE9875}"/>
+                </a:ext>
+              </a:extLst>
+            </p:cNvPr>
+            <p:cNvCxnSpPr>
+              <a:cxnSpLocks/>
+            </p:cNvCxnSpPr>
+            <p:nvPr/>
+          </p:nvCxnSpPr>
+          <p:spPr>
+            <a:xfrm>
+              <a:off x="3478524" y="4111119"/>
+              <a:ext cx="1734511" cy="1"/>
+            </a:xfrm>
+            <a:prstGeom prst="straightConnector1">
+              <a:avLst/>
+            </a:prstGeom>
+            <a:ln w="25400">
+              <a:solidFill>
+                <a:schemeClr val="tx1"/>
+              </a:solidFill>
+              <a:tailEnd type="triangle"/>
+            </a:ln>
+          </p:spPr>
+          <p:style>
+            <a:lnRef idx="1">
+              <a:schemeClr val="accent1"/>
+            </a:lnRef>
+            <a:fillRef idx="0">
+              <a:schemeClr val="accent1"/>
+            </a:fillRef>
+            <a:effectRef idx="0">
+              <a:schemeClr val="accent1"/>
+            </a:effectRef>
+            <a:fontRef idx="minor">
+              <a:schemeClr val="tx1"/>
+            </a:fontRef>
+          </p:style>
+        </p:cxnSp>
+        <mc:AlternateContent xmlns:mc="http://schemas.openxmlformats.org/markup-compatibility/2006" xmlns:a14="http://schemas.microsoft.com/office/drawing/2010/main">
+          <mc:Choice Requires="a14">
+            <p:sp>
+              <p:nvSpPr>
+                <p:cNvPr id="33" name="CasellaDiTesto 32">
+                  <a:extLst>
+                    <a:ext uri="{FF2B5EF4-FFF2-40B4-BE49-F238E27FC236}">
+                      <a16:creationId xmlns:a16="http://schemas.microsoft.com/office/drawing/2014/main" id="{CC0A4510-D7A3-4D4E-86EB-69F1A5D5E1B1}"/>
+                    </a:ext>
+                  </a:extLst>
+                </p:cNvPr>
+                <p:cNvSpPr txBox="1"/>
+                <p:nvPr/>
+              </p:nvSpPr>
+              <p:spPr>
+                <a:xfrm>
+                  <a:off x="3945530" y="3848282"/>
+                  <a:ext cx="340988" cy="235642"/>
+                </a:xfrm>
+                <a:prstGeom prst="rect">
+                  <a:avLst/>
+                </a:prstGeom>
+                <a:noFill/>
+              </p:spPr>
+              <p:txBody>
+                <a:bodyPr wrap="square" lIns="0" tIns="0" rIns="0" bIns="0" rtlCol="0">
+                  <a:spAutoFit/>
+                </a:bodyPr>
+                <a:lstStyle/>
+                <a:p>
+                  <a:pPr/>
+                  <a14:m>
+                    <m:oMathPara xmlns:m="http://schemas.openxmlformats.org/officeDocument/2006/math">
+                      <m:oMathParaPr>
+                        <m:jc m:val="centerGroup"/>
+                      </m:oMathParaPr>
+                      <m:oMath xmlns:m="http://schemas.openxmlformats.org/officeDocument/2006/math">
+                        <m:sSubSup>
+                          <m:sSubSupPr>
+                            <m:ctrlPr>
+                              <a:rPr lang="it-IT" sz="1200" i="1" smtClean="0">
+                                <a:latin typeface="Cambria Math" panose="02040503050406030204" pitchFamily="18" charset="0"/>
+                              </a:rPr>
+                            </m:ctrlPr>
+                          </m:sSubSupPr>
+                          <m:e>
+                            <m:r>
+                              <a:rPr lang="en-US" sz="1200" b="0" i="1" smtClean="0">
+                                <a:latin typeface="Cambria Math" panose="02040503050406030204" pitchFamily="18" charset="0"/>
+                              </a:rPr>
+                              <m:t>𝑇</m:t>
+                            </m:r>
+                          </m:e>
+                          <m:sub>
+                            <m:r>
+                              <a:rPr lang="en-US" sz="1200" b="0" i="1" smtClean="0">
+                                <a:latin typeface="Cambria Math" panose="02040503050406030204" pitchFamily="18" charset="0"/>
+                              </a:rPr>
+                              <m:t>𝑘</m:t>
+                            </m:r>
+                            <m:r>
+                              <a:rPr lang="en-US" sz="1200" b="0" i="1" smtClean="0">
+                                <a:latin typeface="Cambria Math" panose="02040503050406030204" pitchFamily="18" charset="0"/>
+                              </a:rPr>
+                              <m:t>+1|</m:t>
+                            </m:r>
+                            <m:r>
+                              <a:rPr lang="en-US" sz="1200" b="0" i="1" smtClean="0">
+                                <a:latin typeface="Cambria Math" panose="02040503050406030204" pitchFamily="18" charset="0"/>
+                              </a:rPr>
+                              <m:t>𝑘</m:t>
+                            </m:r>
+                          </m:sub>
+                          <m:sup>
+                            <m:r>
+                              <a:rPr lang="en-US" sz="1200" b="0" i="1" smtClean="0">
+                                <a:latin typeface="Cambria Math" panose="02040503050406030204" pitchFamily="18" charset="0"/>
+                              </a:rPr>
+                              <m:t>𝑟</m:t>
+                            </m:r>
+                            <m:r>
+                              <a:rPr lang="en-US" sz="1200" b="0" i="1" smtClean="0">
+                                <a:latin typeface="Cambria Math" panose="02040503050406030204" pitchFamily="18" charset="0"/>
+                              </a:rPr>
+                              <m:t>,1</m:t>
+                            </m:r>
+                          </m:sup>
+                        </m:sSubSup>
+                      </m:oMath>
+                    </m:oMathPara>
+                  </a14:m>
+                  <a:endParaRPr lang="it-IT" sz="1200" dirty="0"/>
+                </a:p>
+              </p:txBody>
+            </p:sp>
+          </mc:Choice>
+          <mc:Fallback xmlns="">
+            <p:sp>
+              <p:nvSpPr>
+                <p:cNvPr id="33" name="CasellaDiTesto 32">
+                  <a:extLst>
+                    <a:ext uri="{FF2B5EF4-FFF2-40B4-BE49-F238E27FC236}">
+                      <a16:creationId xmlns:a16="http://schemas.microsoft.com/office/drawing/2014/main" id="{CC0A4510-D7A3-4D4E-86EB-69F1A5D5E1B1}"/>
+                    </a:ext>
+                  </a:extLst>
+                </p:cNvPr>
+                <p:cNvSpPr txBox="1">
+                  <a:spLocks noRot="1" noChangeAspect="1" noMove="1" noResize="1" noEditPoints="1" noAdjustHandles="1" noChangeArrowheads="1" noChangeShapeType="1" noTextEdit="1"/>
+                </p:cNvSpPr>
+                <p:nvPr/>
+              </p:nvSpPr>
+              <p:spPr>
+                <a:xfrm>
+                  <a:off x="3945530" y="3848282"/>
+                  <a:ext cx="340988" cy="235642"/>
+                </a:xfrm>
+                <a:prstGeom prst="rect">
+                  <a:avLst/>
+                </a:prstGeom>
+                <a:blipFill>
+                  <a:blip r:embed="rId13"/>
+                  <a:stretch>
+                    <a:fillRect l="-16071" r="-28571" b="-23077"/>
+                  </a:stretch>
+                </a:blipFill>
+              </p:spPr>
+              <p:txBody>
+                <a:bodyPr/>
+                <a:lstStyle/>
+                <a:p>
+                  <a:r>
+                    <a:rPr lang="it-IT">
+                      <a:noFill/>
+                    </a:rPr>
+                    <a:t> </a:t>
+                  </a:r>
+                </a:p>
+              </p:txBody>
+            </p:sp>
+          </mc:Fallback>
+        </mc:AlternateContent>
+      </p:grpSp>
+      <p:grpSp>
+        <p:nvGrpSpPr>
+          <p:cNvPr id="34" name="Gruppo 33">
+            <a:extLst>
+              <a:ext uri="{FF2B5EF4-FFF2-40B4-BE49-F238E27FC236}">
+                <a16:creationId xmlns:a16="http://schemas.microsoft.com/office/drawing/2014/main" id="{8661A09D-8D7E-4339-A125-E055A6E5E36D}"/>
+              </a:ext>
+            </a:extLst>
+          </p:cNvPr>
+          <p:cNvGrpSpPr/>
+          <p:nvPr/>
+        </p:nvGrpSpPr>
+        <p:grpSpPr>
+          <a:xfrm>
+            <a:off x="3477944" y="3811728"/>
+            <a:ext cx="1734511" cy="262838"/>
+            <a:chOff x="3478524" y="3848282"/>
+            <a:chExt cx="1734511" cy="262838"/>
+          </a:xfrm>
+        </p:grpSpPr>
+        <p:cxnSp>
+          <p:nvCxnSpPr>
+            <p:cNvPr id="35" name="Connettore 2 34">
+              <a:extLst>
+                <a:ext uri="{FF2B5EF4-FFF2-40B4-BE49-F238E27FC236}">
+                  <a16:creationId xmlns:a16="http://schemas.microsoft.com/office/drawing/2014/main" id="{16182D99-549D-43D6-8EA8-11078A6D5F4C}"/>
+                </a:ext>
+              </a:extLst>
+            </p:cNvPr>
+            <p:cNvCxnSpPr>
+              <a:cxnSpLocks/>
+            </p:cNvCxnSpPr>
+            <p:nvPr/>
+          </p:nvCxnSpPr>
+          <p:spPr>
+            <a:xfrm>
+              <a:off x="3478524" y="4111119"/>
+              <a:ext cx="1734511" cy="1"/>
+            </a:xfrm>
+            <a:prstGeom prst="straightConnector1">
+              <a:avLst/>
+            </a:prstGeom>
+            <a:ln w="25400">
+              <a:solidFill>
+                <a:schemeClr val="tx1"/>
+              </a:solidFill>
+              <a:tailEnd type="triangle"/>
+            </a:ln>
+          </p:spPr>
+          <p:style>
+            <a:lnRef idx="1">
+              <a:schemeClr val="accent1"/>
+            </a:lnRef>
+            <a:fillRef idx="0">
+              <a:schemeClr val="accent1"/>
+            </a:fillRef>
+            <a:effectRef idx="0">
+              <a:schemeClr val="accent1"/>
+            </a:effectRef>
+            <a:fontRef idx="minor">
+              <a:schemeClr val="tx1"/>
+            </a:fontRef>
+          </p:style>
+        </p:cxnSp>
+        <mc:AlternateContent xmlns:mc="http://schemas.openxmlformats.org/markup-compatibility/2006" xmlns:a14="http://schemas.microsoft.com/office/drawing/2010/main">
+          <mc:Choice Requires="a14">
+            <p:sp>
+              <p:nvSpPr>
+                <p:cNvPr id="36" name="CasellaDiTesto 35">
+                  <a:extLst>
+                    <a:ext uri="{FF2B5EF4-FFF2-40B4-BE49-F238E27FC236}">
+                      <a16:creationId xmlns:a16="http://schemas.microsoft.com/office/drawing/2014/main" id="{3357BEB4-3935-4287-9292-A646099201A7}"/>
+                    </a:ext>
+                  </a:extLst>
+                </p:cNvPr>
+                <p:cNvSpPr txBox="1"/>
+                <p:nvPr/>
+              </p:nvSpPr>
+              <p:spPr>
+                <a:xfrm>
+                  <a:off x="3945530" y="3848282"/>
+                  <a:ext cx="340988" cy="235642"/>
+                </a:xfrm>
+                <a:prstGeom prst="rect">
+                  <a:avLst/>
+                </a:prstGeom>
+                <a:noFill/>
+              </p:spPr>
+              <p:txBody>
+                <a:bodyPr wrap="square" lIns="0" tIns="0" rIns="0" bIns="0" rtlCol="0">
+                  <a:spAutoFit/>
+                </a:bodyPr>
+                <a:lstStyle/>
+                <a:p>
+                  <a:pPr/>
+                  <a14:m>
+                    <m:oMathPara xmlns:m="http://schemas.openxmlformats.org/officeDocument/2006/math">
+                      <m:oMathParaPr>
+                        <m:jc m:val="centerGroup"/>
+                      </m:oMathParaPr>
+                      <m:oMath xmlns:m="http://schemas.openxmlformats.org/officeDocument/2006/math">
+                        <m:sSubSup>
+                          <m:sSubSupPr>
+                            <m:ctrlPr>
+                              <a:rPr lang="it-IT" sz="1200" i="1" smtClean="0">
+                                <a:latin typeface="Cambria Math" panose="02040503050406030204" pitchFamily="18" charset="0"/>
+                              </a:rPr>
+                            </m:ctrlPr>
+                          </m:sSubSupPr>
+                          <m:e>
+                            <m:r>
+                              <a:rPr lang="en-US" sz="1200" b="0" i="1" smtClean="0">
+                                <a:latin typeface="Cambria Math" panose="02040503050406030204" pitchFamily="18" charset="0"/>
+                              </a:rPr>
+                              <m:t>𝑇</m:t>
+                            </m:r>
+                          </m:e>
+                          <m:sub>
+                            <m:r>
+                              <a:rPr lang="en-US" sz="1200" b="0" i="1" smtClean="0">
+                                <a:latin typeface="Cambria Math" panose="02040503050406030204" pitchFamily="18" charset="0"/>
+                              </a:rPr>
+                              <m:t>𝑘</m:t>
+                            </m:r>
+                            <m:r>
+                              <a:rPr lang="en-US" sz="1200" b="0" i="1" smtClean="0">
+                                <a:latin typeface="Cambria Math" panose="02040503050406030204" pitchFamily="18" charset="0"/>
+                              </a:rPr>
+                              <m:t>+1|</m:t>
+                            </m:r>
+                            <m:r>
+                              <a:rPr lang="en-US" sz="1200" b="0" i="1" smtClean="0">
+                                <a:latin typeface="Cambria Math" panose="02040503050406030204" pitchFamily="18" charset="0"/>
+                              </a:rPr>
+                              <m:t>𝑘</m:t>
+                            </m:r>
+                          </m:sub>
+                          <m:sup>
+                            <m:r>
+                              <a:rPr lang="en-US" sz="1200" b="0" i="1" smtClean="0">
+                                <a:latin typeface="Cambria Math" panose="02040503050406030204" pitchFamily="18" charset="0"/>
+                              </a:rPr>
+                              <m:t>𝑟</m:t>
+                            </m:r>
+                            <m:r>
+                              <a:rPr lang="en-US" sz="1200" b="0" i="1" smtClean="0">
+                                <a:latin typeface="Cambria Math" panose="02040503050406030204" pitchFamily="18" charset="0"/>
+                              </a:rPr>
+                              <m:t>,4</m:t>
+                            </m:r>
+                          </m:sup>
+                        </m:sSubSup>
+                      </m:oMath>
+                    </m:oMathPara>
+                  </a14:m>
+                  <a:endParaRPr lang="it-IT" sz="1200" dirty="0"/>
+                </a:p>
+              </p:txBody>
+            </p:sp>
+          </mc:Choice>
+          <mc:Fallback xmlns="">
+            <p:sp>
+              <p:nvSpPr>
+                <p:cNvPr id="36" name="CasellaDiTesto 35">
+                  <a:extLst>
+                    <a:ext uri="{FF2B5EF4-FFF2-40B4-BE49-F238E27FC236}">
+                      <a16:creationId xmlns:a16="http://schemas.microsoft.com/office/drawing/2014/main" id="{3357BEB4-3935-4287-9292-A646099201A7}"/>
+                    </a:ext>
+                  </a:extLst>
+                </p:cNvPr>
+                <p:cNvSpPr txBox="1">
+                  <a:spLocks noRot="1" noChangeAspect="1" noMove="1" noResize="1" noEditPoints="1" noAdjustHandles="1" noChangeArrowheads="1" noChangeShapeType="1" noTextEdit="1"/>
+                </p:cNvSpPr>
+                <p:nvPr/>
+              </p:nvSpPr>
+              <p:spPr>
+                <a:xfrm>
+                  <a:off x="3945530" y="3848282"/>
+                  <a:ext cx="340988" cy="235642"/>
+                </a:xfrm>
+                <a:prstGeom prst="rect">
+                  <a:avLst/>
+                </a:prstGeom>
+                <a:blipFill>
+                  <a:blip r:embed="rId14"/>
+                  <a:stretch>
+                    <a:fillRect l="-16071" r="-28571" b="-23077"/>
+                  </a:stretch>
+                </a:blipFill>
+              </p:spPr>
+              <p:txBody>
+                <a:bodyPr/>
+                <a:lstStyle/>
+                <a:p>
+                  <a:r>
+                    <a:rPr lang="it-IT">
+                      <a:noFill/>
+                    </a:rPr>
+                    <a:t> </a:t>
+                  </a:r>
+                </a:p>
+              </p:txBody>
+            </p:sp>
+          </mc:Fallback>
+        </mc:AlternateContent>
+      </p:grpSp>
+      <p:grpSp>
+        <p:nvGrpSpPr>
+          <p:cNvPr id="45" name="Gruppo 44">
+            <a:extLst>
+              <a:ext uri="{FF2B5EF4-FFF2-40B4-BE49-F238E27FC236}">
+                <a16:creationId xmlns:a16="http://schemas.microsoft.com/office/drawing/2014/main" id="{0398E553-55C9-4A95-A6D7-677DF07AE213}"/>
+              </a:ext>
+            </a:extLst>
+          </p:cNvPr>
+          <p:cNvGrpSpPr/>
+          <p:nvPr/>
+        </p:nvGrpSpPr>
+        <p:grpSpPr>
+          <a:xfrm>
+            <a:off x="3477943" y="3152745"/>
+            <a:ext cx="1734511" cy="262838"/>
+            <a:chOff x="3478524" y="3848282"/>
+            <a:chExt cx="1734511" cy="262838"/>
+          </a:xfrm>
+        </p:grpSpPr>
+        <p:cxnSp>
+          <p:nvCxnSpPr>
+            <p:cNvPr id="46" name="Connettore 2 45">
+              <a:extLst>
+                <a:ext uri="{FF2B5EF4-FFF2-40B4-BE49-F238E27FC236}">
+                  <a16:creationId xmlns:a16="http://schemas.microsoft.com/office/drawing/2014/main" id="{936BFD17-854A-4000-886F-3045E91C22E6}"/>
+                </a:ext>
+              </a:extLst>
+            </p:cNvPr>
+            <p:cNvCxnSpPr>
+              <a:cxnSpLocks/>
+            </p:cNvCxnSpPr>
+            <p:nvPr/>
+          </p:nvCxnSpPr>
+          <p:spPr>
+            <a:xfrm>
+              <a:off x="3478524" y="4111119"/>
+              <a:ext cx="1734511" cy="1"/>
+            </a:xfrm>
+            <a:prstGeom prst="straightConnector1">
+              <a:avLst/>
+            </a:prstGeom>
+            <a:ln w="25400">
+              <a:solidFill>
+                <a:schemeClr val="tx1"/>
+              </a:solidFill>
+              <a:tailEnd type="triangle"/>
+            </a:ln>
+          </p:spPr>
+          <p:style>
+            <a:lnRef idx="1">
+              <a:schemeClr val="accent1"/>
+            </a:lnRef>
+            <a:fillRef idx="0">
+              <a:schemeClr val="accent1"/>
+            </a:fillRef>
+            <a:effectRef idx="0">
+              <a:schemeClr val="accent1"/>
+            </a:effectRef>
+            <a:fontRef idx="minor">
+              <a:schemeClr val="tx1"/>
+            </a:fontRef>
+          </p:style>
+        </p:cxnSp>
+        <mc:AlternateContent xmlns:mc="http://schemas.openxmlformats.org/markup-compatibility/2006" xmlns:a14="http://schemas.microsoft.com/office/drawing/2010/main">
+          <mc:Choice Requires="a14">
+            <p:sp>
+              <p:nvSpPr>
+                <p:cNvPr id="47" name="CasellaDiTesto 46">
+                  <a:extLst>
+                    <a:ext uri="{FF2B5EF4-FFF2-40B4-BE49-F238E27FC236}">
+                      <a16:creationId xmlns:a16="http://schemas.microsoft.com/office/drawing/2014/main" id="{9D25F8A6-44C5-44FA-8E3D-38045037DDD8}"/>
+                    </a:ext>
+                  </a:extLst>
+                </p:cNvPr>
+                <p:cNvSpPr txBox="1"/>
+                <p:nvPr/>
+              </p:nvSpPr>
+              <p:spPr>
+                <a:xfrm>
+                  <a:off x="3945530" y="3848282"/>
+                  <a:ext cx="340988" cy="235642"/>
+                </a:xfrm>
+                <a:prstGeom prst="rect">
+                  <a:avLst/>
+                </a:prstGeom>
+                <a:noFill/>
+              </p:spPr>
+              <p:txBody>
+                <a:bodyPr wrap="square" lIns="0" tIns="0" rIns="0" bIns="0" rtlCol="0">
+                  <a:spAutoFit/>
+                </a:bodyPr>
+                <a:lstStyle/>
+                <a:p>
+                  <a:pPr/>
+                  <a14:m>
+                    <m:oMathPara xmlns:m="http://schemas.openxmlformats.org/officeDocument/2006/math">
+                      <m:oMathParaPr>
+                        <m:jc m:val="centerGroup"/>
+                      </m:oMathParaPr>
+                      <m:oMath xmlns:m="http://schemas.openxmlformats.org/officeDocument/2006/math">
+                        <m:sSubSup>
+                          <m:sSubSupPr>
+                            <m:ctrlPr>
+                              <a:rPr lang="it-IT" sz="1200" i="1" smtClean="0">
+                                <a:latin typeface="Cambria Math" panose="02040503050406030204" pitchFamily="18" charset="0"/>
+                              </a:rPr>
+                            </m:ctrlPr>
+                          </m:sSubSupPr>
+                          <m:e>
+                            <m:r>
+                              <a:rPr lang="en-US" sz="1200" b="0" i="1" smtClean="0">
+                                <a:latin typeface="Cambria Math" panose="02040503050406030204" pitchFamily="18" charset="0"/>
+                              </a:rPr>
+                              <m:t>𝑇</m:t>
+                            </m:r>
+                          </m:e>
+                          <m:sub>
+                            <m:r>
+                              <a:rPr lang="en-US" sz="1200" b="0" i="1" smtClean="0">
+                                <a:latin typeface="Cambria Math" panose="02040503050406030204" pitchFamily="18" charset="0"/>
+                              </a:rPr>
+                              <m:t>𝑘</m:t>
+                            </m:r>
+                            <m:r>
+                              <a:rPr lang="en-US" sz="1200" b="0" i="1" smtClean="0">
+                                <a:latin typeface="Cambria Math" panose="02040503050406030204" pitchFamily="18" charset="0"/>
+                              </a:rPr>
+                              <m:t>+1|</m:t>
+                            </m:r>
+                            <m:r>
+                              <a:rPr lang="en-US" sz="1200" b="0" i="1" smtClean="0">
+                                <a:latin typeface="Cambria Math" panose="02040503050406030204" pitchFamily="18" charset="0"/>
+                              </a:rPr>
+                              <m:t>𝑘</m:t>
+                            </m:r>
+                          </m:sub>
+                          <m:sup>
+                            <m:r>
+                              <a:rPr lang="en-US" sz="1200" b="0" i="1" smtClean="0">
+                                <a:latin typeface="Cambria Math" panose="02040503050406030204" pitchFamily="18" charset="0"/>
+                              </a:rPr>
+                              <m:t>𝑟</m:t>
+                            </m:r>
+                            <m:r>
+                              <a:rPr lang="en-US" sz="1200" b="0" i="1" smtClean="0">
+                                <a:latin typeface="Cambria Math" panose="02040503050406030204" pitchFamily="18" charset="0"/>
+                              </a:rPr>
+                              <m:t>,3</m:t>
+                            </m:r>
+                          </m:sup>
+                        </m:sSubSup>
+                      </m:oMath>
+                    </m:oMathPara>
+                  </a14:m>
+                  <a:endParaRPr lang="it-IT" sz="1200" dirty="0"/>
+                </a:p>
+              </p:txBody>
+            </p:sp>
+          </mc:Choice>
+          <mc:Fallback xmlns="">
+            <p:sp>
+              <p:nvSpPr>
+                <p:cNvPr id="47" name="CasellaDiTesto 46">
+                  <a:extLst>
+                    <a:ext uri="{FF2B5EF4-FFF2-40B4-BE49-F238E27FC236}">
+                      <a16:creationId xmlns:a16="http://schemas.microsoft.com/office/drawing/2014/main" id="{9D25F8A6-44C5-44FA-8E3D-38045037DDD8}"/>
+                    </a:ext>
+                  </a:extLst>
+                </p:cNvPr>
+                <p:cNvSpPr txBox="1">
+                  <a:spLocks noRot="1" noChangeAspect="1" noMove="1" noResize="1" noEditPoints="1" noAdjustHandles="1" noChangeArrowheads="1" noChangeShapeType="1" noTextEdit="1"/>
+                </p:cNvSpPr>
+                <p:nvPr/>
+              </p:nvSpPr>
+              <p:spPr>
+                <a:xfrm>
+                  <a:off x="3945530" y="3848282"/>
+                  <a:ext cx="340988" cy="235642"/>
+                </a:xfrm>
+                <a:prstGeom prst="rect">
+                  <a:avLst/>
+                </a:prstGeom>
+                <a:blipFill>
+                  <a:blip r:embed="rId12"/>
+                  <a:stretch>
+                    <a:fillRect l="-16071" r="-28571" b="-23077"/>
+                  </a:stretch>
+                </a:blipFill>
+              </p:spPr>
+              <p:txBody>
+                <a:bodyPr/>
+                <a:lstStyle/>
+                <a:p>
+                  <a:r>
+                    <a:rPr lang="it-IT">
+                      <a:noFill/>
+                    </a:rPr>
+                    <a:t> </a:t>
+                  </a:r>
+                </a:p>
+              </p:txBody>
+            </p:sp>
+          </mc:Fallback>
+        </mc:AlternateContent>
+      </p:grpSp>
+      <p:pic>
+        <p:nvPicPr>
+          <p:cNvPr id="53" name="Elemento grafico 52">
+            <a:extLst>
+              <a:ext uri="{FF2B5EF4-FFF2-40B4-BE49-F238E27FC236}">
+                <a16:creationId xmlns:a16="http://schemas.microsoft.com/office/drawing/2014/main" id="{8068A91F-EBBC-4E2C-9B6D-460171F8B23F}"/>
+              </a:ext>
+            </a:extLst>
+          </p:cNvPr>
+          <p:cNvPicPr>
+            <a:picLocks noChangeAspect="1"/>
+          </p:cNvPicPr>
+          <p:nvPr/>
+        </p:nvPicPr>
+        <p:blipFill>
+          <a:blip r:embed="rId6">
+            <a:extLst>
+              <a:ext uri="{96DAC541-7B7A-43D3-8B79-37D633B846F1}">
+                <asvg:svgBlip xmlns:asvg="http://schemas.microsoft.com/office/drawing/2016/SVG/main" r:embed="rId7"/>
+              </a:ext>
+            </a:extLst>
+          </a:blip>
+          <a:stretch>
+            <a:fillRect/>
+          </a:stretch>
+        </p:blipFill>
+        <p:spPr>
+          <a:xfrm>
+            <a:off x="5236057" y="2850640"/>
+            <a:ext cx="1853657" cy="1422576"/>
+          </a:xfrm>
+          <a:prstGeom prst="rect">
+            <a:avLst/>
+          </a:prstGeom>
+        </p:spPr>
+      </p:pic>
+      <p:sp>
+        <p:nvSpPr>
+          <p:cNvPr id="65" name="CasellaDiTesto 64">
+            <a:extLst>
+              <a:ext uri="{FF2B5EF4-FFF2-40B4-BE49-F238E27FC236}">
+                <a16:creationId xmlns:a16="http://schemas.microsoft.com/office/drawing/2014/main" id="{4D8CDAAA-CC14-4D8D-BC8C-E5431120DBD1}"/>
+              </a:ext>
+            </a:extLst>
+          </p:cNvPr>
+          <p:cNvSpPr txBox="1"/>
+          <p:nvPr/>
+        </p:nvSpPr>
+        <p:spPr>
+          <a:xfrm>
+            <a:off x="279351" y="3984490"/>
+            <a:ext cx="1114425" cy="1477328"/>
+          </a:xfrm>
+          <a:prstGeom prst="rect">
+            <a:avLst/>
+          </a:prstGeom>
+          <a:noFill/>
+          <a:ln>
+            <a:solidFill>
+              <a:schemeClr val="tx1"/>
+            </a:solidFill>
+          </a:ln>
+        </p:spPr>
+        <p:txBody>
+          <a:bodyPr wrap="square" rtlCol="0">
+            <a:spAutoFit/>
+          </a:bodyPr>
+          <a:lstStyle/>
+          <a:p>
+            <a:pPr algn="ctr"/>
+            <a:endParaRPr lang="en-US" dirty="0"/>
+          </a:p>
+          <a:p>
+            <a:pPr algn="ctr"/>
+            <a:r>
+              <a:rPr lang="en-US" dirty="0"/>
+              <a:t>Bang-bang controller</a:t>
+            </a:r>
+          </a:p>
+          <a:p>
+            <a:pPr algn="ctr"/>
+            <a:endParaRPr lang="it-IT" dirty="0"/>
+          </a:p>
+        </p:txBody>
+      </p:sp>
+      <p:cxnSp>
+        <p:nvCxnSpPr>
+          <p:cNvPr id="56" name="Connettore a gomito 55">
+            <a:extLst>
+              <a:ext uri="{FF2B5EF4-FFF2-40B4-BE49-F238E27FC236}">
+                <a16:creationId xmlns:a16="http://schemas.microsoft.com/office/drawing/2014/main" id="{DC367AA9-75F9-4734-8FEE-A995CB3DC096}"/>
+              </a:ext>
+            </a:extLst>
+          </p:cNvPr>
+          <p:cNvCxnSpPr>
+            <a:cxnSpLocks/>
+            <a:stCxn id="7" idx="1"/>
+            <a:endCxn id="65" idx="0"/>
+          </p:cNvCxnSpPr>
+          <p:nvPr/>
+        </p:nvCxnSpPr>
+        <p:spPr>
+          <a:xfrm rot="10800000" flipV="1">
+            <a:off x="836564" y="3563834"/>
+            <a:ext cx="728036" cy="420655"/>
+          </a:xfrm>
+          <a:prstGeom prst="bentConnector2">
+            <a:avLst/>
+          </a:prstGeom>
+          <a:ln w="25400">
+            <a:solidFill>
+              <a:schemeClr val="tx1"/>
+            </a:solidFill>
+            <a:tailEnd type="triangle"/>
+          </a:ln>
+        </p:spPr>
+        <p:style>
+          <a:lnRef idx="1">
+            <a:schemeClr val="accent1"/>
+          </a:lnRef>
+          <a:fillRef idx="0">
+            <a:schemeClr val="accent1"/>
+          </a:fillRef>
+          <a:effectRef idx="0">
+            <a:schemeClr val="accent1"/>
+          </a:effectRef>
+          <a:fontRef idx="minor">
+            <a:schemeClr val="tx1"/>
+          </a:fontRef>
+        </p:style>
+      </p:cxnSp>
+      <p:cxnSp>
+        <p:nvCxnSpPr>
+          <p:cNvPr id="72" name="Connettore a gomito 71">
+            <a:extLst>
+              <a:ext uri="{FF2B5EF4-FFF2-40B4-BE49-F238E27FC236}">
+                <a16:creationId xmlns:a16="http://schemas.microsoft.com/office/drawing/2014/main" id="{2DABF13E-DCDA-4B69-91F7-B4CE8B7E316A}"/>
+              </a:ext>
+            </a:extLst>
+          </p:cNvPr>
+          <p:cNvCxnSpPr>
+            <a:cxnSpLocks/>
+            <a:endCxn id="6" idx="1"/>
+          </p:cNvCxnSpPr>
+          <p:nvPr/>
+        </p:nvCxnSpPr>
+        <p:spPr>
+          <a:xfrm rot="5400000" flipH="1" flipV="1">
+            <a:off x="7126255" y="4367509"/>
+            <a:ext cx="2725016" cy="1215757"/>
+          </a:xfrm>
+          <a:prstGeom prst="bentConnector2">
+            <a:avLst/>
+          </a:prstGeom>
+          <a:ln w="25400">
+            <a:solidFill>
+              <a:schemeClr val="tx1"/>
+            </a:solidFill>
+            <a:tailEnd type="triangle"/>
+          </a:ln>
+        </p:spPr>
+        <p:style>
+          <a:lnRef idx="1">
+            <a:schemeClr val="accent1"/>
+          </a:lnRef>
+          <a:fillRef idx="0">
+            <a:schemeClr val="accent1"/>
+          </a:fillRef>
+          <a:effectRef idx="0">
+            <a:schemeClr val="accent1"/>
+          </a:effectRef>
+          <a:fontRef idx="minor">
+            <a:schemeClr val="tx1"/>
+          </a:fontRef>
+        </p:style>
+      </p:cxnSp>
+      <p:cxnSp>
+        <p:nvCxnSpPr>
+          <p:cNvPr id="83" name="Connettore a gomito 82">
+            <a:extLst>
+              <a:ext uri="{FF2B5EF4-FFF2-40B4-BE49-F238E27FC236}">
+                <a16:creationId xmlns:a16="http://schemas.microsoft.com/office/drawing/2014/main" id="{B5BE41E8-9E78-466C-A50A-150C2391EF00}"/>
+              </a:ext>
+            </a:extLst>
+          </p:cNvPr>
+          <p:cNvCxnSpPr>
+            <a:cxnSpLocks/>
+          </p:cNvCxnSpPr>
+          <p:nvPr/>
+        </p:nvCxnSpPr>
+        <p:spPr>
+          <a:xfrm flipV="1">
+            <a:off x="2009512" y="3864016"/>
+            <a:ext cx="7087130" cy="2805202"/>
+          </a:xfrm>
+          <a:prstGeom prst="bentConnector3">
+            <a:avLst>
+              <a:gd name="adj1" fmla="val 93606"/>
+            </a:avLst>
+          </a:prstGeom>
+          <a:ln w="25400">
+            <a:solidFill>
+              <a:schemeClr val="tx1"/>
+            </a:solidFill>
+            <a:tailEnd type="triangle"/>
+          </a:ln>
+        </p:spPr>
+        <p:style>
+          <a:lnRef idx="1">
+            <a:schemeClr val="accent1"/>
+          </a:lnRef>
+          <a:fillRef idx="0">
+            <a:schemeClr val="accent1"/>
+          </a:fillRef>
+          <a:effectRef idx="0">
+            <a:schemeClr val="accent1"/>
+          </a:effectRef>
+          <a:fontRef idx="minor">
+            <a:schemeClr val="tx1"/>
+          </a:fontRef>
+        </p:style>
+      </p:cxnSp>
+      <p:grpSp>
+        <p:nvGrpSpPr>
+          <p:cNvPr id="104" name="Gruppo 103">
+            <a:extLst>
+              <a:ext uri="{FF2B5EF4-FFF2-40B4-BE49-F238E27FC236}">
+                <a16:creationId xmlns:a16="http://schemas.microsoft.com/office/drawing/2014/main" id="{69F4EC79-76D4-46F7-B431-E6C4426A1B64}"/>
+              </a:ext>
+            </a:extLst>
+          </p:cNvPr>
+          <p:cNvGrpSpPr/>
+          <p:nvPr/>
+        </p:nvGrpSpPr>
+        <p:grpSpPr>
+          <a:xfrm>
+            <a:off x="3553755" y="5506118"/>
+            <a:ext cx="1734511" cy="262838"/>
+            <a:chOff x="3478524" y="3848282"/>
+            <a:chExt cx="1734511" cy="262838"/>
+          </a:xfrm>
+        </p:grpSpPr>
+        <p:cxnSp>
+          <p:nvCxnSpPr>
+            <p:cNvPr id="105" name="Connettore 2 104">
+              <a:extLst>
+                <a:ext uri="{FF2B5EF4-FFF2-40B4-BE49-F238E27FC236}">
+                  <a16:creationId xmlns:a16="http://schemas.microsoft.com/office/drawing/2014/main" id="{79A66021-2796-44B2-99D8-8F55DA3B648D}"/>
+                </a:ext>
+              </a:extLst>
+            </p:cNvPr>
+            <p:cNvCxnSpPr>
+              <a:cxnSpLocks/>
+            </p:cNvCxnSpPr>
+            <p:nvPr/>
+          </p:nvCxnSpPr>
+          <p:spPr>
+            <a:xfrm>
+              <a:off x="3478524" y="4111119"/>
+              <a:ext cx="1734511" cy="1"/>
+            </a:xfrm>
+            <a:prstGeom prst="straightConnector1">
+              <a:avLst/>
+            </a:prstGeom>
+            <a:ln w="25400">
+              <a:solidFill>
+                <a:schemeClr val="tx1"/>
+              </a:solidFill>
+              <a:headEnd type="triangle"/>
+              <a:tailEnd type="none"/>
+            </a:ln>
+          </p:spPr>
+          <p:style>
+            <a:lnRef idx="1">
+              <a:schemeClr val="accent1"/>
+            </a:lnRef>
+            <a:fillRef idx="0">
+              <a:schemeClr val="accent1"/>
+            </a:fillRef>
+            <a:effectRef idx="0">
+              <a:schemeClr val="accent1"/>
+            </a:effectRef>
+            <a:fontRef idx="minor">
+              <a:schemeClr val="tx1"/>
+            </a:fontRef>
+          </p:style>
+        </p:cxnSp>
+        <mc:AlternateContent xmlns:mc="http://schemas.openxmlformats.org/markup-compatibility/2006" xmlns:a14="http://schemas.microsoft.com/office/drawing/2010/main">
+          <mc:Choice Requires="a14">
+            <p:sp>
+              <p:nvSpPr>
+                <p:cNvPr id="106" name="CasellaDiTesto 105">
+                  <a:extLst>
+                    <a:ext uri="{FF2B5EF4-FFF2-40B4-BE49-F238E27FC236}">
+                      <a16:creationId xmlns:a16="http://schemas.microsoft.com/office/drawing/2014/main" id="{D2072E85-5D3A-4D3D-B6B3-92EC7DA8D504}"/>
+                    </a:ext>
+                  </a:extLst>
+                </p:cNvPr>
+                <p:cNvSpPr txBox="1"/>
+                <p:nvPr/>
+              </p:nvSpPr>
+              <p:spPr>
+                <a:xfrm>
+                  <a:off x="3945530" y="3848282"/>
+                  <a:ext cx="340988" cy="219163"/>
+                </a:xfrm>
+                <a:prstGeom prst="rect">
+                  <a:avLst/>
+                </a:prstGeom>
+                <a:noFill/>
+              </p:spPr>
+              <p:txBody>
+                <a:bodyPr wrap="square" lIns="0" tIns="0" rIns="0" bIns="0" rtlCol="0">
+                  <a:spAutoFit/>
+                </a:bodyPr>
+                <a:lstStyle/>
+                <a:p>
+                  <a:pPr/>
+                  <a14:m>
+                    <m:oMathPara xmlns:m="http://schemas.openxmlformats.org/officeDocument/2006/math">
+                      <m:oMathParaPr>
+                        <m:jc m:val="centerGroup"/>
+                      </m:oMathParaPr>
+                      <m:oMath xmlns:m="http://schemas.openxmlformats.org/officeDocument/2006/math">
+                        <m:sSubSup>
+                          <m:sSubSupPr>
+                            <m:ctrlPr>
+                              <a:rPr lang="it-IT" sz="1200" i="1" smtClean="0">
+                                <a:latin typeface="Cambria Math" panose="02040503050406030204" pitchFamily="18" charset="0"/>
+                              </a:rPr>
+                            </m:ctrlPr>
+                          </m:sSubSupPr>
+                          <m:e>
+                            <m:r>
+                              <a:rPr lang="en-US" sz="1200" b="0" i="1" smtClean="0">
+                                <a:latin typeface="Cambria Math" panose="02040503050406030204" pitchFamily="18" charset="0"/>
+                              </a:rPr>
+                              <m:t>𝑇</m:t>
+                            </m:r>
+                          </m:e>
+                          <m:sub>
+                            <m:r>
+                              <a:rPr lang="en-US" sz="1200" b="0" i="1" smtClean="0">
+                                <a:latin typeface="Cambria Math" panose="02040503050406030204" pitchFamily="18" charset="0"/>
+                              </a:rPr>
+                              <m:t>𝑘</m:t>
+                            </m:r>
+                            <m:r>
+                              <a:rPr lang="en-US" sz="1200" b="0" i="1" smtClean="0">
+                                <a:latin typeface="Cambria Math" panose="02040503050406030204" pitchFamily="18" charset="0"/>
+                              </a:rPr>
+                              <m:t>+</m:t>
+                            </m:r>
+                            <m:r>
+                              <a:rPr lang="en-US" sz="1200" b="0" i="1" smtClean="0">
+                                <a:latin typeface="Cambria Math" panose="02040503050406030204" pitchFamily="18" charset="0"/>
+                              </a:rPr>
+                              <m:t>𝑗</m:t>
+                            </m:r>
+                            <m:r>
+                              <a:rPr lang="en-US" sz="1200" b="0" i="1" smtClean="0">
+                                <a:latin typeface="Cambria Math" panose="02040503050406030204" pitchFamily="18" charset="0"/>
+                              </a:rPr>
+                              <m:t>|</m:t>
+                            </m:r>
+                            <m:r>
+                              <a:rPr lang="en-US" sz="1200" b="0" i="1" smtClean="0">
+                                <a:latin typeface="Cambria Math" panose="02040503050406030204" pitchFamily="18" charset="0"/>
+                              </a:rPr>
+                              <m:t>𝑘</m:t>
+                            </m:r>
+                          </m:sub>
+                          <m:sup>
+                            <m:r>
+                              <a:rPr lang="en-US" sz="1200" b="0" i="1" smtClean="0">
+                                <a:latin typeface="Cambria Math" panose="02040503050406030204" pitchFamily="18" charset="0"/>
+                              </a:rPr>
+                              <m:t>3</m:t>
+                            </m:r>
+                          </m:sup>
+                        </m:sSubSup>
+                      </m:oMath>
+                    </m:oMathPara>
+                  </a14:m>
+                  <a:endParaRPr lang="it-IT" sz="1200" dirty="0"/>
+                </a:p>
+              </p:txBody>
+            </p:sp>
+          </mc:Choice>
+          <mc:Fallback xmlns="">
+            <p:sp>
+              <p:nvSpPr>
+                <p:cNvPr id="106" name="CasellaDiTesto 105">
+                  <a:extLst>
+                    <a:ext uri="{FF2B5EF4-FFF2-40B4-BE49-F238E27FC236}">
+                      <a16:creationId xmlns:a16="http://schemas.microsoft.com/office/drawing/2014/main" id="{D2072E85-5D3A-4D3D-B6B3-92EC7DA8D504}"/>
+                    </a:ext>
+                  </a:extLst>
+                </p:cNvPr>
+                <p:cNvSpPr txBox="1">
+                  <a:spLocks noRot="1" noChangeAspect="1" noMove="1" noResize="1" noEditPoints="1" noAdjustHandles="1" noChangeArrowheads="1" noChangeShapeType="1" noTextEdit="1"/>
+                </p:cNvSpPr>
+                <p:nvPr/>
+              </p:nvSpPr>
+              <p:spPr>
+                <a:xfrm>
+                  <a:off x="3945530" y="3848282"/>
+                  <a:ext cx="340988" cy="219163"/>
+                </a:xfrm>
+                <a:prstGeom prst="rect">
+                  <a:avLst/>
+                </a:prstGeom>
+                <a:blipFill>
+                  <a:blip r:embed="rId15"/>
+                  <a:stretch>
+                    <a:fillRect l="-16071" r="-23214" b="-27778"/>
+                  </a:stretch>
+                </a:blipFill>
+              </p:spPr>
+              <p:txBody>
+                <a:bodyPr/>
+                <a:lstStyle/>
+                <a:p>
+                  <a:r>
+                    <a:rPr lang="it-IT">
+                      <a:noFill/>
+                    </a:rPr>
+                    <a:t> </a:t>
+                  </a:r>
+                </a:p>
+              </p:txBody>
+            </p:sp>
+          </mc:Fallback>
+        </mc:AlternateContent>
+      </p:grpSp>
+      <p:grpSp>
+        <p:nvGrpSpPr>
+          <p:cNvPr id="107" name="Gruppo 106">
+            <a:extLst>
+              <a:ext uri="{FF2B5EF4-FFF2-40B4-BE49-F238E27FC236}">
+                <a16:creationId xmlns:a16="http://schemas.microsoft.com/office/drawing/2014/main" id="{07F869B5-C7FC-4CC8-8F6F-1BA994BD040E}"/>
+              </a:ext>
+            </a:extLst>
+          </p:cNvPr>
+          <p:cNvGrpSpPr/>
+          <p:nvPr/>
+        </p:nvGrpSpPr>
+        <p:grpSpPr>
+          <a:xfrm>
+            <a:off x="3553175" y="4846988"/>
+            <a:ext cx="1734511" cy="262838"/>
+            <a:chOff x="3478524" y="3848282"/>
+            <a:chExt cx="1734511" cy="262838"/>
+          </a:xfrm>
+        </p:grpSpPr>
+        <p:cxnSp>
+          <p:nvCxnSpPr>
+            <p:cNvPr id="108" name="Connettore 2 107">
+              <a:extLst>
+                <a:ext uri="{FF2B5EF4-FFF2-40B4-BE49-F238E27FC236}">
+                  <a16:creationId xmlns:a16="http://schemas.microsoft.com/office/drawing/2014/main" id="{59587D12-6DDE-4538-A360-FBAFCC34201B}"/>
+                </a:ext>
+              </a:extLst>
+            </p:cNvPr>
+            <p:cNvCxnSpPr>
+              <a:cxnSpLocks/>
+            </p:cNvCxnSpPr>
+            <p:nvPr/>
+          </p:nvCxnSpPr>
+          <p:spPr>
+            <a:xfrm>
+              <a:off x="3478524" y="4111119"/>
+              <a:ext cx="1734511" cy="1"/>
+            </a:xfrm>
+            <a:prstGeom prst="straightConnector1">
+              <a:avLst/>
+            </a:prstGeom>
+            <a:ln w="25400">
+              <a:solidFill>
+                <a:schemeClr val="tx1"/>
+              </a:solidFill>
+              <a:headEnd type="triangle"/>
+              <a:tailEnd type="none"/>
+            </a:ln>
+          </p:spPr>
+          <p:style>
+            <a:lnRef idx="1">
+              <a:schemeClr val="accent1"/>
+            </a:lnRef>
+            <a:fillRef idx="0">
+              <a:schemeClr val="accent1"/>
+            </a:fillRef>
+            <a:effectRef idx="0">
+              <a:schemeClr val="accent1"/>
+            </a:effectRef>
+            <a:fontRef idx="minor">
+              <a:schemeClr val="tx1"/>
+            </a:fontRef>
+          </p:style>
+        </p:cxnSp>
+        <mc:AlternateContent xmlns:mc="http://schemas.openxmlformats.org/markup-compatibility/2006" xmlns:a14="http://schemas.microsoft.com/office/drawing/2010/main">
+          <mc:Choice Requires="a14">
+            <p:sp>
+              <p:nvSpPr>
+                <p:cNvPr id="109" name="CasellaDiTesto 108">
+                  <a:extLst>
+                    <a:ext uri="{FF2B5EF4-FFF2-40B4-BE49-F238E27FC236}">
+                      <a16:creationId xmlns:a16="http://schemas.microsoft.com/office/drawing/2014/main" id="{2D9F2E9D-E398-4B0C-8FB0-768362C6E38A}"/>
+                    </a:ext>
+                  </a:extLst>
+                </p:cNvPr>
+                <p:cNvSpPr txBox="1"/>
+                <p:nvPr/>
+              </p:nvSpPr>
+              <p:spPr>
+                <a:xfrm>
+                  <a:off x="3945530" y="3848282"/>
+                  <a:ext cx="340988" cy="217880"/>
+                </a:xfrm>
+                <a:prstGeom prst="rect">
+                  <a:avLst/>
+                </a:prstGeom>
+                <a:noFill/>
+              </p:spPr>
+              <p:txBody>
+                <a:bodyPr wrap="square" lIns="0" tIns="0" rIns="0" bIns="0" rtlCol="0">
+                  <a:spAutoFit/>
+                </a:bodyPr>
+                <a:lstStyle/>
+                <a:p>
+                  <a:pPr/>
+                  <a14:m>
+                    <m:oMathPara xmlns:m="http://schemas.openxmlformats.org/officeDocument/2006/math">
+                      <m:oMathParaPr>
+                        <m:jc m:val="centerGroup"/>
+                      </m:oMathParaPr>
+                      <m:oMath xmlns:m="http://schemas.openxmlformats.org/officeDocument/2006/math">
+                        <m:sSubSup>
+                          <m:sSubSupPr>
+                            <m:ctrlPr>
+                              <a:rPr lang="it-IT" sz="1200" i="1" smtClean="0">
+                                <a:latin typeface="Cambria Math" panose="02040503050406030204" pitchFamily="18" charset="0"/>
+                              </a:rPr>
+                            </m:ctrlPr>
+                          </m:sSubSupPr>
+                          <m:e>
+                            <m:r>
+                              <a:rPr lang="en-US" sz="1200" b="0" i="1" smtClean="0">
+                                <a:latin typeface="Cambria Math" panose="02040503050406030204" pitchFamily="18" charset="0"/>
+                              </a:rPr>
+                              <m:t>𝑇</m:t>
+                            </m:r>
+                          </m:e>
+                          <m:sub>
+                            <m:r>
+                              <a:rPr lang="en-US" sz="1200" b="0" i="1" smtClean="0">
+                                <a:latin typeface="Cambria Math" panose="02040503050406030204" pitchFamily="18" charset="0"/>
+                              </a:rPr>
+                              <m:t>𝑘</m:t>
+                            </m:r>
+                            <m:r>
+                              <a:rPr lang="en-US" sz="1200" b="0" i="1" smtClean="0">
+                                <a:latin typeface="Cambria Math" panose="02040503050406030204" pitchFamily="18" charset="0"/>
+                              </a:rPr>
+                              <m:t>+</m:t>
+                            </m:r>
+                            <m:r>
+                              <a:rPr lang="en-US" sz="1200" b="0" i="1" smtClean="0">
+                                <a:latin typeface="Cambria Math" panose="02040503050406030204" pitchFamily="18" charset="0"/>
+                              </a:rPr>
+                              <m:t>𝑗</m:t>
+                            </m:r>
+                            <m:r>
+                              <a:rPr lang="en-US" sz="1200" b="0" i="1" smtClean="0">
+                                <a:latin typeface="Cambria Math" panose="02040503050406030204" pitchFamily="18" charset="0"/>
+                              </a:rPr>
+                              <m:t>|</m:t>
+                            </m:r>
+                            <m:r>
+                              <a:rPr lang="en-US" sz="1200" b="0" i="1" smtClean="0">
+                                <a:latin typeface="Cambria Math" panose="02040503050406030204" pitchFamily="18" charset="0"/>
+                              </a:rPr>
+                              <m:t>𝑘</m:t>
+                            </m:r>
+                          </m:sub>
+                          <m:sup>
+                            <m:r>
+                              <a:rPr lang="en-US" sz="1200" b="0" i="1" smtClean="0">
+                                <a:latin typeface="Cambria Math" panose="02040503050406030204" pitchFamily="18" charset="0"/>
+                              </a:rPr>
+                              <m:t>1</m:t>
+                            </m:r>
+                          </m:sup>
+                        </m:sSubSup>
+                      </m:oMath>
+                    </m:oMathPara>
+                  </a14:m>
+                  <a:endParaRPr lang="it-IT" sz="1200" dirty="0"/>
+                </a:p>
+              </p:txBody>
+            </p:sp>
+          </mc:Choice>
+          <mc:Fallback xmlns="">
+            <p:sp>
+              <p:nvSpPr>
+                <p:cNvPr id="109" name="CasellaDiTesto 108">
+                  <a:extLst>
+                    <a:ext uri="{FF2B5EF4-FFF2-40B4-BE49-F238E27FC236}">
+                      <a16:creationId xmlns:a16="http://schemas.microsoft.com/office/drawing/2014/main" id="{2D9F2E9D-E398-4B0C-8FB0-768362C6E38A}"/>
+                    </a:ext>
+                  </a:extLst>
+                </p:cNvPr>
+                <p:cNvSpPr txBox="1">
+                  <a:spLocks noRot="1" noChangeAspect="1" noMove="1" noResize="1" noEditPoints="1" noAdjustHandles="1" noChangeArrowheads="1" noChangeShapeType="1" noTextEdit="1"/>
+                </p:cNvSpPr>
+                <p:nvPr/>
+              </p:nvSpPr>
+              <p:spPr>
+                <a:xfrm>
+                  <a:off x="3945530" y="3848282"/>
+                  <a:ext cx="340988" cy="217880"/>
+                </a:xfrm>
+                <a:prstGeom prst="rect">
+                  <a:avLst/>
+                </a:prstGeom>
+                <a:blipFill>
+                  <a:blip r:embed="rId16"/>
+                  <a:stretch>
+                    <a:fillRect l="-16071" r="-25000" b="-25000"/>
+                  </a:stretch>
+                </a:blipFill>
+              </p:spPr>
+              <p:txBody>
+                <a:bodyPr/>
+                <a:lstStyle/>
+                <a:p>
+                  <a:r>
+                    <a:rPr lang="it-IT">
+                      <a:noFill/>
+                    </a:rPr>
+                    <a:t> </a:t>
+                  </a:r>
+                </a:p>
+              </p:txBody>
+            </p:sp>
+          </mc:Fallback>
+        </mc:AlternateContent>
+      </p:grpSp>
+      <p:grpSp>
+        <p:nvGrpSpPr>
+          <p:cNvPr id="110" name="Gruppo 109">
+            <a:extLst>
+              <a:ext uri="{FF2B5EF4-FFF2-40B4-BE49-F238E27FC236}">
+                <a16:creationId xmlns:a16="http://schemas.microsoft.com/office/drawing/2014/main" id="{EFF88DE8-A122-4C7F-96EF-86932C20A3C7}"/>
+              </a:ext>
+            </a:extLst>
+          </p:cNvPr>
+          <p:cNvGrpSpPr/>
+          <p:nvPr/>
+        </p:nvGrpSpPr>
+        <p:grpSpPr>
+          <a:xfrm>
+            <a:off x="3553175" y="5833778"/>
+            <a:ext cx="1734511" cy="262838"/>
+            <a:chOff x="3478524" y="3848282"/>
+            <a:chExt cx="1734511" cy="262838"/>
+          </a:xfrm>
+        </p:grpSpPr>
+        <p:cxnSp>
+          <p:nvCxnSpPr>
+            <p:cNvPr id="111" name="Connettore 2 110">
+              <a:extLst>
+                <a:ext uri="{FF2B5EF4-FFF2-40B4-BE49-F238E27FC236}">
+                  <a16:creationId xmlns:a16="http://schemas.microsoft.com/office/drawing/2014/main" id="{088D6A15-1A29-4537-A612-33647045D76A}"/>
+                </a:ext>
+              </a:extLst>
+            </p:cNvPr>
+            <p:cNvCxnSpPr>
+              <a:cxnSpLocks/>
+            </p:cNvCxnSpPr>
+            <p:nvPr/>
+          </p:nvCxnSpPr>
+          <p:spPr>
+            <a:xfrm>
+              <a:off x="3478524" y="4111119"/>
+              <a:ext cx="1734511" cy="1"/>
+            </a:xfrm>
+            <a:prstGeom prst="straightConnector1">
+              <a:avLst/>
+            </a:prstGeom>
+            <a:ln w="25400">
+              <a:solidFill>
+                <a:schemeClr val="tx1"/>
+              </a:solidFill>
+              <a:headEnd type="triangle"/>
+              <a:tailEnd type="none"/>
+            </a:ln>
+          </p:spPr>
+          <p:style>
+            <a:lnRef idx="1">
+              <a:schemeClr val="accent1"/>
+            </a:lnRef>
+            <a:fillRef idx="0">
+              <a:schemeClr val="accent1"/>
+            </a:fillRef>
+            <a:effectRef idx="0">
+              <a:schemeClr val="accent1"/>
+            </a:effectRef>
+            <a:fontRef idx="minor">
+              <a:schemeClr val="tx1"/>
+            </a:fontRef>
+          </p:style>
+        </p:cxnSp>
+        <mc:AlternateContent xmlns:mc="http://schemas.openxmlformats.org/markup-compatibility/2006" xmlns:a14="http://schemas.microsoft.com/office/drawing/2010/main">
+          <mc:Choice Requires="a14">
+            <p:sp>
+              <p:nvSpPr>
+                <p:cNvPr id="112" name="CasellaDiTesto 111">
+                  <a:extLst>
+                    <a:ext uri="{FF2B5EF4-FFF2-40B4-BE49-F238E27FC236}">
+                      <a16:creationId xmlns:a16="http://schemas.microsoft.com/office/drawing/2014/main" id="{C95F9768-80B5-45AC-BE81-DE2E6C0B65D7}"/>
+                    </a:ext>
+                  </a:extLst>
+                </p:cNvPr>
+                <p:cNvSpPr txBox="1"/>
+                <p:nvPr/>
+              </p:nvSpPr>
+              <p:spPr>
+                <a:xfrm>
+                  <a:off x="3945530" y="3848282"/>
+                  <a:ext cx="340988" cy="217495"/>
+                </a:xfrm>
+                <a:prstGeom prst="rect">
+                  <a:avLst/>
+                </a:prstGeom>
+                <a:noFill/>
+              </p:spPr>
+              <p:txBody>
+                <a:bodyPr wrap="square" lIns="0" tIns="0" rIns="0" bIns="0" rtlCol="0">
+                  <a:spAutoFit/>
+                </a:bodyPr>
+                <a:lstStyle/>
+                <a:p>
+                  <a:pPr/>
+                  <a14:m>
+                    <m:oMathPara xmlns:m="http://schemas.openxmlformats.org/officeDocument/2006/math">
+                      <m:oMathParaPr>
+                        <m:jc m:val="centerGroup"/>
+                      </m:oMathParaPr>
+                      <m:oMath xmlns:m="http://schemas.openxmlformats.org/officeDocument/2006/math">
+                        <m:sSubSup>
+                          <m:sSubSupPr>
+                            <m:ctrlPr>
+                              <a:rPr lang="it-IT" sz="1200" i="1" smtClean="0">
+                                <a:latin typeface="Cambria Math" panose="02040503050406030204" pitchFamily="18" charset="0"/>
+                              </a:rPr>
+                            </m:ctrlPr>
+                          </m:sSubSupPr>
+                          <m:e>
+                            <m:r>
+                              <a:rPr lang="en-US" sz="1200" b="0" i="1" smtClean="0">
+                                <a:latin typeface="Cambria Math" panose="02040503050406030204" pitchFamily="18" charset="0"/>
+                              </a:rPr>
+                              <m:t>𝑇</m:t>
+                            </m:r>
+                          </m:e>
+                          <m:sub>
+                            <m:r>
+                              <a:rPr lang="en-US" sz="1200" b="0" i="1" smtClean="0">
+                                <a:latin typeface="Cambria Math" panose="02040503050406030204" pitchFamily="18" charset="0"/>
+                              </a:rPr>
+                              <m:t>𝑘</m:t>
+                            </m:r>
+                            <m:r>
+                              <a:rPr lang="en-US" sz="1200" b="0" i="1" smtClean="0">
+                                <a:latin typeface="Cambria Math" panose="02040503050406030204" pitchFamily="18" charset="0"/>
+                              </a:rPr>
+                              <m:t>+</m:t>
+                            </m:r>
+                            <m:r>
+                              <a:rPr lang="en-US" sz="1200" b="0" i="1" smtClean="0">
+                                <a:latin typeface="Cambria Math" panose="02040503050406030204" pitchFamily="18" charset="0"/>
+                              </a:rPr>
+                              <m:t>𝑗</m:t>
+                            </m:r>
+                            <m:r>
+                              <a:rPr lang="en-US" sz="1200" b="0" i="1" smtClean="0">
+                                <a:latin typeface="Cambria Math" panose="02040503050406030204" pitchFamily="18" charset="0"/>
+                              </a:rPr>
+                              <m:t>|</m:t>
+                            </m:r>
+                            <m:r>
+                              <a:rPr lang="en-US" sz="1200" b="0" i="1" smtClean="0">
+                                <a:latin typeface="Cambria Math" panose="02040503050406030204" pitchFamily="18" charset="0"/>
+                              </a:rPr>
+                              <m:t>𝑘</m:t>
+                            </m:r>
+                          </m:sub>
+                          <m:sup>
+                            <m:r>
+                              <a:rPr lang="en-US" sz="1200" b="0" i="1" smtClean="0">
+                                <a:latin typeface="Cambria Math" panose="02040503050406030204" pitchFamily="18" charset="0"/>
+                              </a:rPr>
+                              <m:t>4</m:t>
+                            </m:r>
+                          </m:sup>
+                        </m:sSubSup>
+                      </m:oMath>
+                    </m:oMathPara>
+                  </a14:m>
+                  <a:endParaRPr lang="it-IT" sz="1200" dirty="0"/>
+                </a:p>
+              </p:txBody>
+            </p:sp>
+          </mc:Choice>
+          <mc:Fallback xmlns="">
+            <p:sp>
+              <p:nvSpPr>
+                <p:cNvPr id="112" name="CasellaDiTesto 111">
+                  <a:extLst>
+                    <a:ext uri="{FF2B5EF4-FFF2-40B4-BE49-F238E27FC236}">
+                      <a16:creationId xmlns:a16="http://schemas.microsoft.com/office/drawing/2014/main" id="{C95F9768-80B5-45AC-BE81-DE2E6C0B65D7}"/>
+                    </a:ext>
+                  </a:extLst>
+                </p:cNvPr>
+                <p:cNvSpPr txBox="1">
+                  <a:spLocks noRot="1" noChangeAspect="1" noMove="1" noResize="1" noEditPoints="1" noAdjustHandles="1" noChangeArrowheads="1" noChangeShapeType="1" noTextEdit="1"/>
+                </p:cNvSpPr>
+                <p:nvPr/>
+              </p:nvSpPr>
+              <p:spPr>
+                <a:xfrm>
+                  <a:off x="3945530" y="3848282"/>
+                  <a:ext cx="340988" cy="217495"/>
+                </a:xfrm>
+                <a:prstGeom prst="rect">
+                  <a:avLst/>
+                </a:prstGeom>
+                <a:blipFill>
+                  <a:blip r:embed="rId17"/>
+                  <a:stretch>
+                    <a:fillRect l="-16071" r="-25000" b="-25000"/>
+                  </a:stretch>
+                </a:blipFill>
+              </p:spPr>
+              <p:txBody>
+                <a:bodyPr/>
+                <a:lstStyle/>
+                <a:p>
+                  <a:r>
+                    <a:rPr lang="it-IT">
+                      <a:noFill/>
+                    </a:rPr>
+                    <a:t> </a:t>
+                  </a:r>
+                </a:p>
+              </p:txBody>
+            </p:sp>
+          </mc:Fallback>
+        </mc:AlternateContent>
+      </p:grpSp>
+      <p:grpSp>
+        <p:nvGrpSpPr>
+          <p:cNvPr id="113" name="Gruppo 112">
+            <a:extLst>
+              <a:ext uri="{FF2B5EF4-FFF2-40B4-BE49-F238E27FC236}">
+                <a16:creationId xmlns:a16="http://schemas.microsoft.com/office/drawing/2014/main" id="{6A13FA58-7920-4103-92ED-4B26D0F38A3E}"/>
+              </a:ext>
+            </a:extLst>
+          </p:cNvPr>
+          <p:cNvGrpSpPr/>
+          <p:nvPr/>
+        </p:nvGrpSpPr>
+        <p:grpSpPr>
+          <a:xfrm>
+            <a:off x="3553174" y="5174795"/>
+            <a:ext cx="1734511" cy="262838"/>
+            <a:chOff x="3478524" y="3848282"/>
+            <a:chExt cx="1734511" cy="262838"/>
+          </a:xfrm>
+        </p:grpSpPr>
+        <p:cxnSp>
+          <p:nvCxnSpPr>
+            <p:cNvPr id="114" name="Connettore 2 113">
+              <a:extLst>
+                <a:ext uri="{FF2B5EF4-FFF2-40B4-BE49-F238E27FC236}">
+                  <a16:creationId xmlns:a16="http://schemas.microsoft.com/office/drawing/2014/main" id="{267CB802-D90E-442E-802B-8E640AEA5C15}"/>
+                </a:ext>
+              </a:extLst>
+            </p:cNvPr>
+            <p:cNvCxnSpPr>
+              <a:cxnSpLocks/>
+            </p:cNvCxnSpPr>
+            <p:nvPr/>
+          </p:nvCxnSpPr>
+          <p:spPr>
+            <a:xfrm>
+              <a:off x="3478524" y="4111119"/>
+              <a:ext cx="1734511" cy="1"/>
+            </a:xfrm>
+            <a:prstGeom prst="straightConnector1">
+              <a:avLst/>
+            </a:prstGeom>
+            <a:ln w="25400">
+              <a:solidFill>
+                <a:schemeClr val="tx1"/>
+              </a:solidFill>
+              <a:headEnd type="triangle"/>
+              <a:tailEnd type="none"/>
+            </a:ln>
+          </p:spPr>
+          <p:style>
+            <a:lnRef idx="1">
+              <a:schemeClr val="accent1"/>
+            </a:lnRef>
+            <a:fillRef idx="0">
+              <a:schemeClr val="accent1"/>
+            </a:fillRef>
+            <a:effectRef idx="0">
+              <a:schemeClr val="accent1"/>
+            </a:effectRef>
+            <a:fontRef idx="minor">
+              <a:schemeClr val="tx1"/>
+            </a:fontRef>
+          </p:style>
+        </p:cxnSp>
+        <mc:AlternateContent xmlns:mc="http://schemas.openxmlformats.org/markup-compatibility/2006" xmlns:a14="http://schemas.microsoft.com/office/drawing/2010/main">
+          <mc:Choice Requires="a14">
+            <p:sp>
+              <p:nvSpPr>
+                <p:cNvPr id="115" name="CasellaDiTesto 114">
+                  <a:extLst>
+                    <a:ext uri="{FF2B5EF4-FFF2-40B4-BE49-F238E27FC236}">
+                      <a16:creationId xmlns:a16="http://schemas.microsoft.com/office/drawing/2014/main" id="{8B66ED18-F067-426C-A2B1-2CCF493C365E}"/>
+                    </a:ext>
+                  </a:extLst>
+                </p:cNvPr>
+                <p:cNvSpPr txBox="1"/>
+                <p:nvPr/>
+              </p:nvSpPr>
+              <p:spPr>
+                <a:xfrm>
+                  <a:off x="3945530" y="3848282"/>
+                  <a:ext cx="340988" cy="219163"/>
+                </a:xfrm>
+                <a:prstGeom prst="rect">
+                  <a:avLst/>
+                </a:prstGeom>
+                <a:noFill/>
+              </p:spPr>
+              <p:txBody>
+                <a:bodyPr wrap="square" lIns="0" tIns="0" rIns="0" bIns="0" rtlCol="0">
+                  <a:spAutoFit/>
+                </a:bodyPr>
+                <a:lstStyle/>
+                <a:p>
+                  <a:pPr/>
+                  <a14:m>
+                    <m:oMathPara xmlns:m="http://schemas.openxmlformats.org/officeDocument/2006/math">
+                      <m:oMathParaPr>
+                        <m:jc m:val="centerGroup"/>
+                      </m:oMathParaPr>
+                      <m:oMath xmlns:m="http://schemas.openxmlformats.org/officeDocument/2006/math">
+                        <m:sSubSup>
+                          <m:sSubSupPr>
+                            <m:ctrlPr>
+                              <a:rPr lang="it-IT" sz="1200" i="1" smtClean="0">
+                                <a:latin typeface="Cambria Math" panose="02040503050406030204" pitchFamily="18" charset="0"/>
+                              </a:rPr>
+                            </m:ctrlPr>
+                          </m:sSubSupPr>
+                          <m:e>
+                            <m:r>
+                              <a:rPr lang="en-US" sz="1200" b="0" i="1" smtClean="0">
+                                <a:latin typeface="Cambria Math" panose="02040503050406030204" pitchFamily="18" charset="0"/>
+                              </a:rPr>
+                              <m:t>𝑇</m:t>
+                            </m:r>
+                          </m:e>
+                          <m:sub>
+                            <m:r>
+                              <a:rPr lang="en-US" sz="1200" b="0" i="1" smtClean="0">
+                                <a:latin typeface="Cambria Math" panose="02040503050406030204" pitchFamily="18" charset="0"/>
+                              </a:rPr>
+                              <m:t>𝑘</m:t>
+                            </m:r>
+                            <m:r>
+                              <a:rPr lang="en-US" sz="1200" b="0" i="1" smtClean="0">
+                                <a:latin typeface="Cambria Math" panose="02040503050406030204" pitchFamily="18" charset="0"/>
+                              </a:rPr>
+                              <m:t>+</m:t>
+                            </m:r>
+                            <m:r>
+                              <a:rPr lang="en-US" sz="1200" b="0" i="1" smtClean="0">
+                                <a:latin typeface="Cambria Math" panose="02040503050406030204" pitchFamily="18" charset="0"/>
+                              </a:rPr>
+                              <m:t>𝑗</m:t>
+                            </m:r>
+                            <m:r>
+                              <a:rPr lang="en-US" sz="1200" b="0" i="1" smtClean="0">
+                                <a:latin typeface="Cambria Math" panose="02040503050406030204" pitchFamily="18" charset="0"/>
+                              </a:rPr>
+                              <m:t>|</m:t>
+                            </m:r>
+                            <m:r>
+                              <a:rPr lang="en-US" sz="1200" b="0" i="1" smtClean="0">
+                                <a:latin typeface="Cambria Math" panose="02040503050406030204" pitchFamily="18" charset="0"/>
+                              </a:rPr>
+                              <m:t>𝑘</m:t>
+                            </m:r>
+                          </m:sub>
+                          <m:sup>
+                            <m:r>
+                              <a:rPr lang="en-US" sz="1200" b="0" i="1" smtClean="0">
+                                <a:latin typeface="Cambria Math" panose="02040503050406030204" pitchFamily="18" charset="0"/>
+                              </a:rPr>
+                              <m:t>3</m:t>
+                            </m:r>
+                          </m:sup>
+                        </m:sSubSup>
+                      </m:oMath>
+                    </m:oMathPara>
+                  </a14:m>
+                  <a:endParaRPr lang="it-IT" sz="1200" dirty="0"/>
+                </a:p>
+              </p:txBody>
+            </p:sp>
+          </mc:Choice>
+          <mc:Fallback xmlns="">
+            <p:sp>
+              <p:nvSpPr>
+                <p:cNvPr id="115" name="CasellaDiTesto 114">
+                  <a:extLst>
+                    <a:ext uri="{FF2B5EF4-FFF2-40B4-BE49-F238E27FC236}">
+                      <a16:creationId xmlns:a16="http://schemas.microsoft.com/office/drawing/2014/main" id="{8B66ED18-F067-426C-A2B1-2CCF493C365E}"/>
+                    </a:ext>
+                  </a:extLst>
+                </p:cNvPr>
+                <p:cNvSpPr txBox="1">
+                  <a:spLocks noRot="1" noChangeAspect="1" noMove="1" noResize="1" noEditPoints="1" noAdjustHandles="1" noChangeArrowheads="1" noChangeShapeType="1" noTextEdit="1"/>
+                </p:cNvSpPr>
+                <p:nvPr/>
+              </p:nvSpPr>
+              <p:spPr>
+                <a:xfrm>
+                  <a:off x="3945530" y="3848282"/>
+                  <a:ext cx="340988" cy="219163"/>
+                </a:xfrm>
+                <a:prstGeom prst="rect">
+                  <a:avLst/>
+                </a:prstGeom>
+                <a:blipFill>
+                  <a:blip r:embed="rId18"/>
+                  <a:stretch>
+                    <a:fillRect l="-16071" r="-25000" b="-27778"/>
+                  </a:stretch>
+                </a:blipFill>
+              </p:spPr>
+              <p:txBody>
+                <a:bodyPr/>
+                <a:lstStyle/>
+                <a:p>
+                  <a:r>
+                    <a:rPr lang="it-IT">
+                      <a:noFill/>
+                    </a:rPr>
+                    <a:t> </a:t>
+                  </a:r>
+                </a:p>
+              </p:txBody>
+            </p:sp>
+          </mc:Fallback>
+        </mc:AlternateContent>
+      </p:grpSp>
+      <p:grpSp>
+        <p:nvGrpSpPr>
+          <p:cNvPr id="117" name="Gruppo 116">
+            <a:extLst>
+              <a:ext uri="{FF2B5EF4-FFF2-40B4-BE49-F238E27FC236}">
+                <a16:creationId xmlns:a16="http://schemas.microsoft.com/office/drawing/2014/main" id="{85830D88-B937-4778-BBA7-12FBFDE1D599}"/>
+              </a:ext>
+            </a:extLst>
+          </p:cNvPr>
+          <p:cNvGrpSpPr/>
+          <p:nvPr/>
+        </p:nvGrpSpPr>
+        <p:grpSpPr>
+          <a:xfrm>
+            <a:off x="3555102" y="4536397"/>
+            <a:ext cx="1734511" cy="262838"/>
+            <a:chOff x="3478524" y="3848282"/>
+            <a:chExt cx="1734511" cy="262838"/>
+          </a:xfrm>
+        </p:grpSpPr>
+        <p:cxnSp>
+          <p:nvCxnSpPr>
+            <p:cNvPr id="118" name="Connettore 2 117">
+              <a:extLst>
+                <a:ext uri="{FF2B5EF4-FFF2-40B4-BE49-F238E27FC236}">
+                  <a16:creationId xmlns:a16="http://schemas.microsoft.com/office/drawing/2014/main" id="{77648BC6-2C76-4488-9F91-59169443EF19}"/>
+                </a:ext>
+              </a:extLst>
+            </p:cNvPr>
+            <p:cNvCxnSpPr>
+              <a:cxnSpLocks/>
+            </p:cNvCxnSpPr>
+            <p:nvPr/>
+          </p:nvCxnSpPr>
+          <p:spPr>
+            <a:xfrm>
+              <a:off x="3478524" y="4111119"/>
+              <a:ext cx="1734511" cy="1"/>
+            </a:xfrm>
+            <a:prstGeom prst="straightConnector1">
+              <a:avLst/>
+            </a:prstGeom>
+            <a:ln w="25400">
+              <a:solidFill>
+                <a:schemeClr val="tx1"/>
+              </a:solidFill>
+              <a:headEnd type="triangle"/>
+              <a:tailEnd type="none"/>
+            </a:ln>
+          </p:spPr>
+          <p:style>
+            <a:lnRef idx="1">
+              <a:schemeClr val="accent1"/>
+            </a:lnRef>
+            <a:fillRef idx="0">
+              <a:schemeClr val="accent1"/>
+            </a:fillRef>
+            <a:effectRef idx="0">
+              <a:schemeClr val="accent1"/>
+            </a:effectRef>
+            <a:fontRef idx="minor">
+              <a:schemeClr val="tx1"/>
+            </a:fontRef>
+          </p:style>
+        </p:cxnSp>
+        <mc:AlternateContent xmlns:mc="http://schemas.openxmlformats.org/markup-compatibility/2006" xmlns:a14="http://schemas.microsoft.com/office/drawing/2010/main">
+          <mc:Choice Requires="a14">
+            <p:sp>
+              <p:nvSpPr>
+                <p:cNvPr id="119" name="CasellaDiTesto 118">
+                  <a:extLst>
+                    <a:ext uri="{FF2B5EF4-FFF2-40B4-BE49-F238E27FC236}">
+                      <a16:creationId xmlns:a16="http://schemas.microsoft.com/office/drawing/2014/main" id="{F80DDBD1-BAD0-4FB3-AC73-93EA7F366FC3}"/>
+                    </a:ext>
+                  </a:extLst>
+                </p:cNvPr>
+                <p:cNvSpPr txBox="1"/>
+                <p:nvPr/>
+              </p:nvSpPr>
+              <p:spPr>
+                <a:xfrm>
+                  <a:off x="3945530" y="3848282"/>
+                  <a:ext cx="340988" cy="234616"/>
+                </a:xfrm>
+                <a:prstGeom prst="rect">
+                  <a:avLst/>
+                </a:prstGeom>
+                <a:noFill/>
+              </p:spPr>
+              <p:txBody>
+                <a:bodyPr wrap="square" lIns="0" tIns="0" rIns="0" bIns="0" rtlCol="0">
+                  <a:spAutoFit/>
+                </a:bodyPr>
+                <a:lstStyle/>
+                <a:p>
+                  <a:pPr/>
+                  <a14:m>
+                    <m:oMathPara xmlns:m="http://schemas.openxmlformats.org/officeDocument/2006/math">
+                      <m:oMathParaPr>
+                        <m:jc m:val="centerGroup"/>
+                      </m:oMathParaPr>
+                      <m:oMath xmlns:m="http://schemas.openxmlformats.org/officeDocument/2006/math">
+                        <m:sSubSup>
+                          <m:sSubSupPr>
+                            <m:ctrlPr>
+                              <a:rPr lang="it-IT" sz="1200" i="1" smtClean="0">
+                                <a:latin typeface="Cambria Math" panose="02040503050406030204" pitchFamily="18" charset="0"/>
+                              </a:rPr>
+                            </m:ctrlPr>
+                          </m:sSubSupPr>
+                          <m:e>
+                            <m:r>
+                              <a:rPr lang="en-US" sz="1200" b="0" i="1" smtClean="0">
+                                <a:latin typeface="Cambria Math" panose="02040503050406030204" pitchFamily="18" charset="0"/>
+                              </a:rPr>
+                              <m:t>𝑃</m:t>
+                            </m:r>
+                          </m:e>
+                          <m:sub>
+                            <m:r>
+                              <a:rPr lang="en-US" sz="1200" b="0" i="1" smtClean="0">
+                                <a:latin typeface="Cambria Math" panose="02040503050406030204" pitchFamily="18" charset="0"/>
+                              </a:rPr>
+                              <m:t>𝑘</m:t>
+                            </m:r>
+                            <m:r>
+                              <a:rPr lang="en-US" sz="1200" b="0" i="1" smtClean="0">
+                                <a:latin typeface="Cambria Math" panose="02040503050406030204" pitchFamily="18" charset="0"/>
+                              </a:rPr>
+                              <m:t>+</m:t>
+                            </m:r>
+                            <m:r>
+                              <a:rPr lang="en-US" sz="1200" b="0" i="1" smtClean="0">
+                                <a:latin typeface="Cambria Math" panose="02040503050406030204" pitchFamily="18" charset="0"/>
+                              </a:rPr>
+                              <m:t>𝑗</m:t>
+                            </m:r>
+                            <m:r>
+                              <a:rPr lang="en-US" sz="1200" b="0" i="1" smtClean="0">
+                                <a:latin typeface="Cambria Math" panose="02040503050406030204" pitchFamily="18" charset="0"/>
+                              </a:rPr>
+                              <m:t>|</m:t>
+                            </m:r>
+                            <m:r>
+                              <a:rPr lang="en-US" sz="1200" b="0" i="1" smtClean="0">
+                                <a:latin typeface="Cambria Math" panose="02040503050406030204" pitchFamily="18" charset="0"/>
+                              </a:rPr>
+                              <m:t>𝑘</m:t>
+                            </m:r>
+                          </m:sub>
+                          <m:sup/>
+                        </m:sSubSup>
+                      </m:oMath>
+                    </m:oMathPara>
+                  </a14:m>
+                  <a:endParaRPr lang="it-IT" sz="1200" dirty="0"/>
+                </a:p>
+              </p:txBody>
+            </p:sp>
+          </mc:Choice>
+          <mc:Fallback xmlns="">
+            <p:sp>
+              <p:nvSpPr>
+                <p:cNvPr id="119" name="CasellaDiTesto 118">
+                  <a:extLst>
+                    <a:ext uri="{FF2B5EF4-FFF2-40B4-BE49-F238E27FC236}">
+                      <a16:creationId xmlns:a16="http://schemas.microsoft.com/office/drawing/2014/main" id="{F80DDBD1-BAD0-4FB3-AC73-93EA7F366FC3}"/>
+                    </a:ext>
+                  </a:extLst>
+                </p:cNvPr>
+                <p:cNvSpPr txBox="1">
+                  <a:spLocks noRot="1" noChangeAspect="1" noMove="1" noResize="1" noEditPoints="1" noAdjustHandles="1" noChangeArrowheads="1" noChangeShapeType="1" noTextEdit="1"/>
+                </p:cNvSpPr>
+                <p:nvPr/>
+              </p:nvSpPr>
+              <p:spPr>
+                <a:xfrm>
+                  <a:off x="3945530" y="3848282"/>
+                  <a:ext cx="340988" cy="234616"/>
+                </a:xfrm>
+                <a:prstGeom prst="rect">
+                  <a:avLst/>
+                </a:prstGeom>
+                <a:blipFill>
+                  <a:blip r:embed="rId19"/>
+                  <a:stretch>
+                    <a:fillRect l="-16071" r="-25000" b="-23077"/>
+                  </a:stretch>
+                </a:blipFill>
+              </p:spPr>
+              <p:txBody>
+                <a:bodyPr/>
+                <a:lstStyle/>
+                <a:p>
+                  <a:r>
+                    <a:rPr lang="it-IT">
+                      <a:noFill/>
+                    </a:rPr>
+                    <a:t> </a:t>
+                  </a:r>
+                </a:p>
+              </p:txBody>
+            </p:sp>
+          </mc:Fallback>
+        </mc:AlternateContent>
+      </p:grpSp>
+      <p:cxnSp>
+        <p:nvCxnSpPr>
+          <p:cNvPr id="138" name="Connettore a gomito 137">
+            <a:extLst>
+              <a:ext uri="{FF2B5EF4-FFF2-40B4-BE49-F238E27FC236}">
+                <a16:creationId xmlns:a16="http://schemas.microsoft.com/office/drawing/2014/main" id="{07FBD521-82A0-4BCD-94C2-BF6DF9777E40}"/>
+              </a:ext>
+            </a:extLst>
+          </p:cNvPr>
+          <p:cNvCxnSpPr>
+            <a:cxnSpLocks/>
+          </p:cNvCxnSpPr>
+          <p:nvPr/>
+        </p:nvCxnSpPr>
+        <p:spPr>
+          <a:xfrm flipV="1">
+            <a:off x="1393776" y="4317630"/>
+            <a:ext cx="615736" cy="648589"/>
+          </a:xfrm>
+          <a:prstGeom prst="bentConnector2">
+            <a:avLst/>
+          </a:prstGeom>
+          <a:ln w="25400">
+            <a:solidFill>
+              <a:schemeClr val="tx1"/>
+            </a:solidFill>
+            <a:tailEnd type="triangle"/>
+          </a:ln>
+        </p:spPr>
+        <p:style>
+          <a:lnRef idx="1">
+            <a:schemeClr val="accent1"/>
+          </a:lnRef>
+          <a:fillRef idx="0">
+            <a:schemeClr val="accent1"/>
+          </a:fillRef>
+          <a:effectRef idx="0">
+            <a:schemeClr val="accent1"/>
+          </a:effectRef>
+          <a:fontRef idx="minor">
+            <a:schemeClr val="tx1"/>
+          </a:fontRef>
+        </p:style>
+      </p:cxnSp>
+      <p:cxnSp>
+        <p:nvCxnSpPr>
+          <p:cNvPr id="141" name="Connettore diritto 140">
+            <a:extLst>
+              <a:ext uri="{FF2B5EF4-FFF2-40B4-BE49-F238E27FC236}">
+                <a16:creationId xmlns:a16="http://schemas.microsoft.com/office/drawing/2014/main" id="{D33DABFE-579F-474E-B013-0FB2EB462167}"/>
+              </a:ext>
+            </a:extLst>
+          </p:cNvPr>
+          <p:cNvCxnSpPr/>
+          <p:nvPr/>
+        </p:nvCxnSpPr>
+        <p:spPr>
+          <a:xfrm>
+            <a:off x="2009512" y="4944738"/>
+            <a:ext cx="0" cy="1732790"/>
+          </a:xfrm>
+          <a:prstGeom prst="line">
+            <a:avLst/>
+          </a:prstGeom>
+          <a:ln w="25400">
+            <a:solidFill>
+              <a:schemeClr val="tx1"/>
+            </a:solidFill>
+          </a:ln>
+        </p:spPr>
+        <p:style>
+          <a:lnRef idx="1">
+            <a:schemeClr val="accent1"/>
+          </a:lnRef>
+          <a:fillRef idx="0">
+            <a:schemeClr val="accent1"/>
+          </a:fillRef>
+          <a:effectRef idx="0">
+            <a:schemeClr val="accent1"/>
+          </a:effectRef>
+          <a:fontRef idx="minor">
+            <a:schemeClr val="tx1"/>
+          </a:fontRef>
+        </p:style>
+      </p:cxnSp>
+      <p:sp>
+        <p:nvSpPr>
+          <p:cNvPr id="54" name="CasellaDiTesto 53">
+            <a:extLst>
+              <a:ext uri="{FF2B5EF4-FFF2-40B4-BE49-F238E27FC236}">
+                <a16:creationId xmlns:a16="http://schemas.microsoft.com/office/drawing/2014/main" id="{DA213299-8667-467E-B1A1-766AFBDBCD33}"/>
+              </a:ext>
+            </a:extLst>
+          </p:cNvPr>
+          <p:cNvSpPr txBox="1"/>
+          <p:nvPr/>
+        </p:nvSpPr>
+        <p:spPr>
+          <a:xfrm>
+            <a:off x="9119663" y="4138371"/>
+            <a:ext cx="1701005" cy="646331"/>
+          </a:xfrm>
+          <a:prstGeom prst="rect">
+            <a:avLst/>
+          </a:prstGeom>
+          <a:noFill/>
+          <a:ln>
+            <a:solidFill>
+              <a:schemeClr val="tx1"/>
+            </a:solidFill>
+          </a:ln>
+        </p:spPr>
+        <p:txBody>
+          <a:bodyPr wrap="square" rtlCol="0">
+            <a:spAutoFit/>
+          </a:bodyPr>
+          <a:lstStyle/>
+          <a:p>
+            <a:pPr algn="ctr"/>
+            <a:r>
+              <a:rPr lang="en-US" dirty="0"/>
+              <a:t>Energy RF model</a:t>
+            </a:r>
+            <a:endParaRPr lang="it-IT" dirty="0"/>
+          </a:p>
+        </p:txBody>
+      </p:sp>
+      <p:cxnSp>
+        <p:nvCxnSpPr>
+          <p:cNvPr id="55" name="Connettore 2 54">
+            <a:extLst>
+              <a:ext uri="{FF2B5EF4-FFF2-40B4-BE49-F238E27FC236}">
+                <a16:creationId xmlns:a16="http://schemas.microsoft.com/office/drawing/2014/main" id="{2D9B9356-B18B-427F-BD2F-C478CEEBA327}"/>
+              </a:ext>
+            </a:extLst>
+          </p:cNvPr>
+          <p:cNvCxnSpPr/>
+          <p:nvPr/>
+        </p:nvCxnSpPr>
+        <p:spPr>
+          <a:xfrm>
+            <a:off x="10822148" y="4295256"/>
+            <a:ext cx="785267" cy="0"/>
+          </a:xfrm>
+          <a:prstGeom prst="straightConnector1">
+            <a:avLst/>
+          </a:prstGeom>
+          <a:ln w="25400">
+            <a:solidFill>
+              <a:srgbClr val="C00000"/>
+            </a:solidFill>
+            <a:tailEnd type="triangle"/>
+          </a:ln>
+        </p:spPr>
+        <p:style>
+          <a:lnRef idx="1">
+            <a:schemeClr val="accent1"/>
+          </a:lnRef>
+          <a:fillRef idx="0">
+            <a:schemeClr val="accent1"/>
+          </a:fillRef>
+          <a:effectRef idx="0">
+            <a:schemeClr val="accent1"/>
+          </a:effectRef>
+          <a:fontRef idx="minor">
+            <a:schemeClr val="tx1"/>
+          </a:fontRef>
+        </p:style>
+      </p:cxnSp>
+      <p:cxnSp>
+        <p:nvCxnSpPr>
+          <p:cNvPr id="57" name="Connettore 2 56">
+            <a:extLst>
+              <a:ext uri="{FF2B5EF4-FFF2-40B4-BE49-F238E27FC236}">
+                <a16:creationId xmlns:a16="http://schemas.microsoft.com/office/drawing/2014/main" id="{8E3C2ACE-B9B9-4F61-A8A7-7D7E8CC71B6C}"/>
+              </a:ext>
+            </a:extLst>
+          </p:cNvPr>
+          <p:cNvCxnSpPr/>
+          <p:nvPr/>
+        </p:nvCxnSpPr>
+        <p:spPr>
+          <a:xfrm>
+            <a:off x="10822147" y="4720272"/>
             <a:ext cx="785267" cy="0"/>
           </a:xfrm>
           <a:prstGeom prst="straightConnector1">
@@ -4129,10 +6677,10 @@
         <mc:Choice xmlns:a14="http://schemas.microsoft.com/office/drawing/2010/main" Requires="a14">
           <p:sp>
             <p:nvSpPr>
-              <p:cNvPr id="79" name="CasellaDiTesto 78">
+              <p:cNvPr id="58" name="CasellaDiTesto 57">
                 <a:extLst>
                   <a:ext uri="{FF2B5EF4-FFF2-40B4-BE49-F238E27FC236}">
-                    <a16:creationId xmlns:a16="http://schemas.microsoft.com/office/drawing/2014/main" id="{8FCB14C3-71CB-4EB4-B87F-6E242ABBA1E1}"/>
+                    <a16:creationId xmlns:a16="http://schemas.microsoft.com/office/drawing/2014/main" id="{8DFD62D6-D0A9-4614-A524-26415EB8665B}"/>
                   </a:ext>
                 </a:extLst>
               </p:cNvPr>
@@ -4141,121 +6689,7 @@
             </p:nvSpPr>
             <p:spPr>
               <a:xfrm>
-                <a:off x="9666902" y="3602355"/>
-                <a:ext cx="546368" cy="276999"/>
-              </a:xfrm>
-              <a:prstGeom prst="rect">
-                <a:avLst/>
-              </a:prstGeom>
-              <a:noFill/>
-            </p:spPr>
-            <p:txBody>
-              <a:bodyPr wrap="none" lIns="0" tIns="0" rIns="0" bIns="0" rtlCol="0">
-                <a:spAutoFit/>
-              </a:bodyPr>
-              <a:lstStyle/>
-              <a:p>
-                <a14:m>
-                  <m:oMathPara xmlns:m="http://schemas.openxmlformats.org/officeDocument/2006/math">
-                    <m:oMathParaPr>
-                      <m:jc m:val="centerGroup"/>
-                    </m:oMathParaPr>
-                    <m:oMath xmlns:m="http://schemas.openxmlformats.org/officeDocument/2006/math">
-                      <m:sSub>
-                        <m:sSubPr>
-                          <m:ctrlPr>
-                            <a:rPr lang="it-IT" i="1" smtClean="0">
-                              <a:latin typeface="Cambria Math" panose="02040503050406030204" pitchFamily="18" charset="0"/>
-                            </a:rPr>
-                          </m:ctrlPr>
-                        </m:sSubPr>
-                        <m:e>
-                          <m:r>
-                            <a:rPr lang="en-US" b="0" i="1" smtClean="0">
-                              <a:latin typeface="Cambria Math" panose="02040503050406030204" pitchFamily="18" charset="0"/>
-                            </a:rPr>
-                            <m:t>𝐸</m:t>
-                          </m:r>
-                        </m:e>
-                        <m:sub>
-                          <m:r>
-                            <a:rPr lang="en-US" b="0" i="1" smtClean="0">
-                              <a:latin typeface="Cambria Math" panose="02040503050406030204" pitchFamily="18" charset="0"/>
-                            </a:rPr>
-                            <m:t>𝑟𝑒𝑎𝑙</m:t>
-                          </m:r>
-                        </m:sub>
-                      </m:sSub>
-                    </m:oMath>
-                  </m:oMathPara>
-                </a14:m>
-                <a:endParaRPr lang="it-IT" dirty="0"/>
-              </a:p>
-            </p:txBody>
-          </p:sp>
-        </mc:Choice>
-        <mc:Fallback>
-          <p:sp>
-            <p:nvSpPr>
-              <p:cNvPr id="79" name="CasellaDiTesto 78">
-                <a:extLst>
-                  <a:ext uri="{FF2B5EF4-FFF2-40B4-BE49-F238E27FC236}">
-                    <a16:creationId xmlns:a16="http://schemas.microsoft.com/office/drawing/2014/main" id="{8FCB14C3-71CB-4EB4-B87F-6E242ABBA1E1}"/>
-                  </a:ext>
-                </a:extLst>
-              </p:cNvPr>
-              <p:cNvSpPr txBox="1">
-                <a:spLocks noRot="1" noChangeAspect="1" noMove="1" noResize="1" noEditPoints="1" noAdjustHandles="1" noChangeArrowheads="1" noChangeShapeType="1" noTextEdit="1"/>
-              </p:cNvSpPr>
-              <p:nvPr/>
-            </p:nvSpPr>
-            <p:spPr>
-              <a:xfrm>
-                <a:off x="9666902" y="3602355"/>
-                <a:ext cx="546368" cy="276999"/>
-              </a:xfrm>
-              <a:prstGeom prst="rect">
-                <a:avLst/>
-              </a:prstGeom>
-              <a:blipFill>
-                <a:blip r:embed="rId11"/>
-                <a:stretch>
-                  <a:fillRect l="-10112" r="-4494" b="-17778"/>
-                </a:stretch>
-              </a:blipFill>
-            </p:spPr>
-            <p:txBody>
-              <a:bodyPr/>
-              <a:lstStyle/>
-              <a:p>
-                <a:r>
-                  <a:rPr lang="it-IT">
-                    <a:noFill/>
-                  </a:rPr>
-                  <a:t> </a:t>
-                </a:r>
-              </a:p>
-            </p:txBody>
-          </p:sp>
-        </mc:Fallback>
-      </mc:AlternateContent>
-      <mc:AlternateContent xmlns:mc="http://schemas.openxmlformats.org/markup-compatibility/2006">
-        <mc:Choice xmlns:a14="http://schemas.microsoft.com/office/drawing/2010/main" Requires="a14">
-          <p:sp>
-            <p:nvSpPr>
-              <p:cNvPr id="80" name="CasellaDiTesto 79">
-                <a:extLst>
-                  <a:ext uri="{FF2B5EF4-FFF2-40B4-BE49-F238E27FC236}">
-                    <a16:creationId xmlns:a16="http://schemas.microsoft.com/office/drawing/2014/main" id="{49D75346-A6BC-4119-BEB0-A1126E25A29B}"/>
-                  </a:ext>
-                </a:extLst>
-              </p:cNvPr>
-              <p:cNvSpPr txBox="1"/>
-              <p:nvPr/>
-            </p:nvSpPr>
-            <p:spPr>
-              <a:xfrm>
-                <a:off x="9666902" y="4027370"/>
+                <a:off x="10941597" y="3987715"/>
                 <a:ext cx="533544" cy="276999"/>
               </a:xfrm>
               <a:prstGeom prst="rect">
@@ -4269,6 +6703,7 @@
               </a:bodyPr>
               <a:lstStyle/>
               <a:p>
+                <a:pPr/>
                 <a14:m>
                   <m:oMathPara xmlns:m="http://schemas.openxmlformats.org/officeDocument/2006/math">
                     <m:oMathParaPr>
@@ -4311,10 +6746,10 @@
         <mc:Fallback>
           <p:sp>
             <p:nvSpPr>
-              <p:cNvPr id="80" name="CasellaDiTesto 79">
+              <p:cNvPr id="58" name="CasellaDiTesto 57">
                 <a:extLst>
                   <a:ext uri="{FF2B5EF4-FFF2-40B4-BE49-F238E27FC236}">
-                    <a16:creationId xmlns:a16="http://schemas.microsoft.com/office/drawing/2014/main" id="{49D75346-A6BC-4119-BEB0-A1126E25A29B}"/>
+                    <a16:creationId xmlns:a16="http://schemas.microsoft.com/office/drawing/2014/main" id="{8DFD62D6-D0A9-4614-A524-26415EB8665B}"/>
                   </a:ext>
                 </a:extLst>
               </p:cNvPr>
@@ -4325,16 +6760,143 @@
             </p:nvSpPr>
             <p:spPr>
               <a:xfrm>
-                <a:off x="9666902" y="4027370"/>
+                <a:off x="10941597" y="3987715"/>
                 <a:ext cx="533544" cy="276999"/>
               </a:xfrm>
               <a:prstGeom prst="rect">
                 <a:avLst/>
               </a:prstGeom>
               <a:blipFill>
-                <a:blip r:embed="rId12"/>
+                <a:blip r:embed="rId20"/>
                 <a:stretch>
-                  <a:fillRect l="-10345" r="-3448" b="-15556"/>
+                  <a:fillRect l="-10345" r="-3448" b="-15217"/>
+                </a:stretch>
+              </a:blipFill>
+            </p:spPr>
+            <p:txBody>
+              <a:bodyPr/>
+              <a:lstStyle/>
+              <a:p>
+                <a:r>
+                  <a:rPr lang="it-IT">
+                    <a:noFill/>
+                  </a:rPr>
+                  <a:t> </a:t>
+                </a:r>
+              </a:p>
+            </p:txBody>
+          </p:sp>
+        </mc:Fallback>
+      </mc:AlternateContent>
+      <mc:AlternateContent xmlns:mc="http://schemas.openxmlformats.org/markup-compatibility/2006">
+        <mc:Choice xmlns:a14="http://schemas.microsoft.com/office/drawing/2010/main" Requires="a14">
+          <p:sp>
+            <p:nvSpPr>
+              <p:cNvPr id="59" name="CasellaDiTesto 58">
+                <a:extLst>
+                  <a:ext uri="{FF2B5EF4-FFF2-40B4-BE49-F238E27FC236}">
+                    <a16:creationId xmlns:a16="http://schemas.microsoft.com/office/drawing/2014/main" id="{637265F9-7C04-44D8-881F-B0FD1DF670FC}"/>
+                  </a:ext>
+                </a:extLst>
+              </p:cNvPr>
+              <p:cNvSpPr txBox="1"/>
+              <p:nvPr/>
+            </p:nvSpPr>
+            <p:spPr>
+              <a:xfrm>
+                <a:off x="10941597" y="4412730"/>
+                <a:ext cx="1174745" cy="299569"/>
+              </a:xfrm>
+              <a:prstGeom prst="rect">
+                <a:avLst/>
+              </a:prstGeom>
+              <a:noFill/>
+            </p:spPr>
+            <p:txBody>
+              <a:bodyPr wrap="none" lIns="0" tIns="0" rIns="0" bIns="0" rtlCol="0">
+                <a:spAutoFit/>
+              </a:bodyPr>
+              <a:lstStyle/>
+              <a:p>
+                <a:pPr/>
+                <a14:m>
+                  <m:oMathPara xmlns:m="http://schemas.openxmlformats.org/officeDocument/2006/math">
+                    <m:oMathParaPr>
+                      <m:jc m:val="centerGroup"/>
+                    </m:oMathParaPr>
+                    <m:oMath xmlns:m="http://schemas.openxmlformats.org/officeDocument/2006/math">
+                      <m:sSub>
+                        <m:sSubPr>
+                          <m:ctrlPr>
+                            <a:rPr lang="it-IT" i="1" smtClean="0">
+                              <a:latin typeface="Cambria Math" panose="02040503050406030204" pitchFamily="18" charset="0"/>
+                            </a:rPr>
+                          </m:ctrlPr>
+                        </m:sSubPr>
+                        <m:e>
+                          <m:r>
+                            <a:rPr lang="en-US" b="0" i="1" smtClean="0">
+                              <a:latin typeface="Cambria Math" panose="02040503050406030204" pitchFamily="18" charset="0"/>
+                            </a:rPr>
+                            <m:t>𝐸</m:t>
+                          </m:r>
+                        </m:e>
+                        <m:sub>
+                          <m:r>
+                            <a:rPr lang="en-US" b="0" i="1" smtClean="0">
+                              <a:latin typeface="Cambria Math" panose="02040503050406030204" pitchFamily="18" charset="0"/>
+                            </a:rPr>
+                            <m:t>𝑏𝑎𝑛𝑔</m:t>
+                          </m:r>
+                          <m:r>
+                            <a:rPr lang="en-US" b="0" i="1" smtClean="0">
+                              <a:latin typeface="Cambria Math" panose="02040503050406030204" pitchFamily="18" charset="0"/>
+                            </a:rPr>
+                            <m:t>−</m:t>
+                          </m:r>
+                          <m:r>
+                            <a:rPr lang="en-US" b="0" i="1" smtClean="0">
+                              <a:latin typeface="Cambria Math" panose="02040503050406030204" pitchFamily="18" charset="0"/>
+                            </a:rPr>
+                            <m:t>𝑏𝑎𝑛𝑔</m:t>
+                          </m:r>
+                        </m:sub>
+                      </m:sSub>
+                    </m:oMath>
+                  </m:oMathPara>
+                </a14:m>
+                <a:endParaRPr lang="it-IT" dirty="0"/>
+              </a:p>
+            </p:txBody>
+          </p:sp>
+        </mc:Choice>
+        <mc:Fallback>
+          <p:sp>
+            <p:nvSpPr>
+              <p:cNvPr id="59" name="CasellaDiTesto 58">
+                <a:extLst>
+                  <a:ext uri="{FF2B5EF4-FFF2-40B4-BE49-F238E27FC236}">
+                    <a16:creationId xmlns:a16="http://schemas.microsoft.com/office/drawing/2014/main" id="{637265F9-7C04-44D8-881F-B0FD1DF670FC}"/>
+                  </a:ext>
+                </a:extLst>
+              </p:cNvPr>
+              <p:cNvSpPr txBox="1">
+                <a:spLocks noRot="1" noChangeAspect="1" noMove="1" noResize="1" noEditPoints="1" noAdjustHandles="1" noChangeArrowheads="1" noChangeShapeType="1" noTextEdit="1"/>
+              </p:cNvSpPr>
+              <p:nvPr/>
+            </p:nvSpPr>
+            <p:spPr>
+              <a:xfrm>
+                <a:off x="10941597" y="4412730"/>
+                <a:ext cx="1174745" cy="299569"/>
+              </a:xfrm>
+              <a:prstGeom prst="rect">
+                <a:avLst/>
+              </a:prstGeom>
+              <a:blipFill>
+                <a:blip r:embed="rId21"/>
+                <a:stretch>
+                  <a:fillRect l="-4663" r="-3109" b="-28571"/>
                 </a:stretch>
               </a:blipFill>
             </p:spPr>
@@ -4355,22 +6917,20 @@
       </mc:AlternateContent>
       <p:cxnSp>
         <p:nvCxnSpPr>
-          <p:cNvPr id="82" name="Connettore 2 81">
-            <a:extLst>
-              <a:ext uri="{FF2B5EF4-FFF2-40B4-BE49-F238E27FC236}">
-                <a16:creationId xmlns:a16="http://schemas.microsoft.com/office/drawing/2014/main" id="{436F9210-6B4E-4974-A139-AD3AA9C61D22}"/>
-              </a:ext>
-            </a:extLst>
-          </p:cNvPr>
-          <p:cNvCxnSpPr>
-            <a:cxnSpLocks/>
-          </p:cNvCxnSpPr>
+          <p:cNvPr id="4" name="Connettore 2 3">
+            <a:extLst>
+              <a:ext uri="{FF2B5EF4-FFF2-40B4-BE49-F238E27FC236}">
+                <a16:creationId xmlns:a16="http://schemas.microsoft.com/office/drawing/2014/main" id="{D9A3420A-C581-4B38-9E44-49CE18A2B70B}"/>
+              </a:ext>
+            </a:extLst>
+          </p:cNvPr>
+          <p:cNvCxnSpPr/>
           <p:nvPr/>
         </p:nvCxnSpPr>
         <p:spPr>
           <a:xfrm>
-            <a:off x="6903034" y="4027370"/>
-            <a:ext cx="920391" cy="0"/>
+            <a:off x="8629095" y="4663857"/>
+            <a:ext cx="490568" cy="0"/>
           </a:xfrm>
           <a:prstGeom prst="straightConnector1">
             <a:avLst/>
@@ -4397,42 +6957,48 @@
           </a:fontRef>
         </p:style>
       </p:cxnSp>
-      <p:sp>
-        <p:nvSpPr>
-          <p:cNvPr id="84" name="CasellaDiTesto 83">
-            <a:extLst>
-              <a:ext uri="{FF2B5EF4-FFF2-40B4-BE49-F238E27FC236}">
-                <a16:creationId xmlns:a16="http://schemas.microsoft.com/office/drawing/2014/main" id="{21790424-20C0-4712-9976-637DEF2FD58E}"/>
-              </a:ext>
-            </a:extLst>
-          </p:cNvPr>
-          <p:cNvSpPr txBox="1"/>
+      <p:cxnSp>
+        <p:nvCxnSpPr>
+          <p:cNvPr id="11" name="Connettore 2 10">
+            <a:extLst>
+              <a:ext uri="{FF2B5EF4-FFF2-40B4-BE49-F238E27FC236}">
+                <a16:creationId xmlns:a16="http://schemas.microsoft.com/office/drawing/2014/main" id="{996BC85E-2292-4870-8A4F-D62AA3347F80}"/>
+              </a:ext>
+            </a:extLst>
+          </p:cNvPr>
+          <p:cNvCxnSpPr/>
           <p:nvPr/>
-        </p:nvSpPr>
+        </p:nvCxnSpPr>
         <p:spPr>
           <a:xfrm>
-            <a:off x="6895918" y="3689104"/>
-            <a:ext cx="867866" cy="276999"/>
+            <a:off x="7880884" y="4295256"/>
+            <a:ext cx="1238779" cy="0"/>
           </a:xfrm>
-          <a:prstGeom prst="rect">
+          <a:prstGeom prst="straightConnector1">
             <a:avLst/>
           </a:prstGeom>
-          <a:noFill/>
+          <a:ln w="25400">
+            <a:solidFill>
+              <a:schemeClr val="tx1"/>
+            </a:solidFill>
+            <a:tailEnd type="triangle"/>
+          </a:ln>
         </p:spPr>
-        <p:txBody>
-          <a:bodyPr wrap="none" lIns="0" tIns="0" rIns="0" bIns="0" rtlCol="0">
-            <a:spAutoFit/>
-          </a:bodyPr>
-          <a:lstStyle/>
-          <a:p>
-            <a:r>
-              <a:rPr lang="en-US" dirty="0"/>
-              <a:t>Real data</a:t>
-            </a:r>
-            <a:endParaRPr lang="it-IT" dirty="0"/>
-          </a:p>
-        </p:txBody>
-      </p:sp>
+        <p:style>
+          <a:lnRef idx="1">
+            <a:schemeClr val="accent1"/>
+          </a:lnRef>
+          <a:fillRef idx="0">
+            <a:schemeClr val="accent1"/>
+          </a:fillRef>
+          <a:effectRef idx="0">
+            <a:schemeClr val="accent1"/>
+          </a:effectRef>
+          <a:fontRef idx="minor">
+            <a:schemeClr val="tx1"/>
+          </a:fontRef>
+        </p:style>
+      </p:cxnSp>
     </p:spTree>
     <p:extLst>
       <p:ext uri="{BB962C8B-B14F-4D97-AF65-F5344CB8AC3E}">

</xml_diff>

<commit_message>
completed section 5 and fixed figures problems
</commit_message>
<xml_diff>
--- a/paper/Images/scheme.pptx
+++ b/paper/Images/scheme.pptx
@@ -263,7 +263,7 @@
           <a:p>
             <a:fld id="{8F299877-8FF3-44DA-AAEE-A8E49885A9B8}" type="datetimeFigureOut">
               <a:rPr lang="it-IT" smtClean="0"/>
-              <a:t>18/09/2017</a:t>
+              <a:t>20/09/2017</a:t>
             </a:fld>
             <a:endParaRPr lang="it-IT"/>
           </a:p>
@@ -461,7 +461,7 @@
           <a:p>
             <a:fld id="{8F299877-8FF3-44DA-AAEE-A8E49885A9B8}" type="datetimeFigureOut">
               <a:rPr lang="it-IT" smtClean="0"/>
-              <a:t>18/09/2017</a:t>
+              <a:t>20/09/2017</a:t>
             </a:fld>
             <a:endParaRPr lang="it-IT"/>
           </a:p>
@@ -669,7 +669,7 @@
           <a:p>
             <a:fld id="{8F299877-8FF3-44DA-AAEE-A8E49885A9B8}" type="datetimeFigureOut">
               <a:rPr lang="it-IT" smtClean="0"/>
-              <a:t>18/09/2017</a:t>
+              <a:t>20/09/2017</a:t>
             </a:fld>
             <a:endParaRPr lang="it-IT"/>
           </a:p>
@@ -867,7 +867,7 @@
           <a:p>
             <a:fld id="{8F299877-8FF3-44DA-AAEE-A8E49885A9B8}" type="datetimeFigureOut">
               <a:rPr lang="it-IT" smtClean="0"/>
-              <a:t>18/09/2017</a:t>
+              <a:t>20/09/2017</a:t>
             </a:fld>
             <a:endParaRPr lang="it-IT"/>
           </a:p>
@@ -1142,7 +1142,7 @@
           <a:p>
             <a:fld id="{8F299877-8FF3-44DA-AAEE-A8E49885A9B8}" type="datetimeFigureOut">
               <a:rPr lang="it-IT" smtClean="0"/>
-              <a:t>18/09/2017</a:t>
+              <a:t>20/09/2017</a:t>
             </a:fld>
             <a:endParaRPr lang="it-IT"/>
           </a:p>
@@ -1407,7 +1407,7 @@
           <a:p>
             <a:fld id="{8F299877-8FF3-44DA-AAEE-A8E49885A9B8}" type="datetimeFigureOut">
               <a:rPr lang="it-IT" smtClean="0"/>
-              <a:t>18/09/2017</a:t>
+              <a:t>20/09/2017</a:t>
             </a:fld>
             <a:endParaRPr lang="it-IT"/>
           </a:p>
@@ -1819,7 +1819,7 @@
           <a:p>
             <a:fld id="{8F299877-8FF3-44DA-AAEE-A8E49885A9B8}" type="datetimeFigureOut">
               <a:rPr lang="it-IT" smtClean="0"/>
-              <a:t>18/09/2017</a:t>
+              <a:t>20/09/2017</a:t>
             </a:fld>
             <a:endParaRPr lang="it-IT"/>
           </a:p>
@@ -1960,7 +1960,7 @@
           <a:p>
             <a:fld id="{8F299877-8FF3-44DA-AAEE-A8E49885A9B8}" type="datetimeFigureOut">
               <a:rPr lang="it-IT" smtClean="0"/>
-              <a:t>18/09/2017</a:t>
+              <a:t>20/09/2017</a:t>
             </a:fld>
             <a:endParaRPr lang="it-IT"/>
           </a:p>
@@ -2073,7 +2073,7 @@
           <a:p>
             <a:fld id="{8F299877-8FF3-44DA-AAEE-A8E49885A9B8}" type="datetimeFigureOut">
               <a:rPr lang="it-IT" smtClean="0"/>
-              <a:t>18/09/2017</a:t>
+              <a:t>20/09/2017</a:t>
             </a:fld>
             <a:endParaRPr lang="it-IT"/>
           </a:p>
@@ -2384,7 +2384,7 @@
           <a:p>
             <a:fld id="{8F299877-8FF3-44DA-AAEE-A8E49885A9B8}" type="datetimeFigureOut">
               <a:rPr lang="it-IT" smtClean="0"/>
-              <a:t>18/09/2017</a:t>
+              <a:t>20/09/2017</a:t>
             </a:fld>
             <a:endParaRPr lang="it-IT"/>
           </a:p>
@@ -2672,7 +2672,7 @@
           <a:p>
             <a:fld id="{8F299877-8FF3-44DA-AAEE-A8E49885A9B8}" type="datetimeFigureOut">
               <a:rPr lang="it-IT" smtClean="0"/>
-              <a:t>18/09/2017</a:t>
+              <a:t>20/09/2017</a:t>
             </a:fld>
             <a:endParaRPr lang="it-IT"/>
           </a:p>
@@ -2913,7 +2913,7 @@
           <a:p>
             <a:fld id="{8F299877-8FF3-44DA-AAEE-A8E49885A9B8}" type="datetimeFigureOut">
               <a:rPr lang="it-IT" smtClean="0"/>
-              <a:t>18/09/2017</a:t>
+              <a:t>20/09/2017</a:t>
             </a:fld>
             <a:endParaRPr lang="it-IT"/>
           </a:p>
@@ -6673,8 +6673,8 @@
           </a:fontRef>
         </p:style>
       </p:cxnSp>
-      <mc:AlternateContent xmlns:mc="http://schemas.openxmlformats.org/markup-compatibility/2006">
-        <mc:Choice xmlns:a14="http://schemas.microsoft.com/office/drawing/2010/main" Requires="a14">
+      <mc:AlternateContent xmlns:mc="http://schemas.openxmlformats.org/markup-compatibility/2006" xmlns:a14="http://schemas.microsoft.com/office/drawing/2010/main">
+        <mc:Choice Requires="a14">
           <p:sp>
             <p:nvSpPr>
               <p:cNvPr id="58" name="CasellaDiTesto 57">
@@ -6743,7 +6743,7 @@
             </p:txBody>
           </p:sp>
         </mc:Choice>
-        <mc:Fallback>
+        <mc:Fallback xmlns="">
           <p:sp>
             <p:nvSpPr>
               <p:cNvPr id="58" name="CasellaDiTesto 57">
@@ -6788,8 +6788,8 @@
           </p:sp>
         </mc:Fallback>
       </mc:AlternateContent>
-      <mc:AlternateContent xmlns:mc="http://schemas.openxmlformats.org/markup-compatibility/2006">
-        <mc:Choice xmlns:a14="http://schemas.microsoft.com/office/drawing/2010/main" Requires="a14">
+      <mc:AlternateContent xmlns:mc="http://schemas.openxmlformats.org/markup-compatibility/2006" xmlns:a14="http://schemas.microsoft.com/office/drawing/2010/main">
+        <mc:Choice Requires="a14">
           <p:sp>
             <p:nvSpPr>
               <p:cNvPr id="59" name="CasellaDiTesto 58">
@@ -6870,7 +6870,7 @@
             </p:txBody>
           </p:sp>
         </mc:Choice>
-        <mc:Fallback>
+        <mc:Fallback xmlns="">
           <p:sp>
             <p:nvSpPr>
               <p:cNvPr id="59" name="CasellaDiTesto 58">
@@ -6999,6 +6999,1163 @@
           </a:fontRef>
         </p:style>
       </p:cxnSp>
+      <p:grpSp>
+        <p:nvGrpSpPr>
+          <p:cNvPr id="44" name="Gruppo 43">
+            <a:extLst>
+              <a:ext uri="{FF2B5EF4-FFF2-40B4-BE49-F238E27FC236}">
+                <a16:creationId xmlns:a16="http://schemas.microsoft.com/office/drawing/2014/main" id="{A6E1EFBC-EB1D-47FC-A2D6-2025A3767C21}"/>
+              </a:ext>
+            </a:extLst>
+          </p:cNvPr>
+          <p:cNvGrpSpPr/>
+          <p:nvPr/>
+        </p:nvGrpSpPr>
+        <p:grpSpPr>
+          <a:xfrm>
+            <a:off x="2219416" y="2824938"/>
+            <a:ext cx="5051395" cy="3442697"/>
+            <a:chOff x="2263806" y="2824938"/>
+            <a:chExt cx="5051395" cy="3442697"/>
+          </a:xfrm>
+        </p:grpSpPr>
+        <p:cxnSp>
+          <p:nvCxnSpPr>
+            <p:cNvPr id="20" name="Connettore diritto 19">
+              <a:extLst>
+                <a:ext uri="{FF2B5EF4-FFF2-40B4-BE49-F238E27FC236}">
+                  <a16:creationId xmlns:a16="http://schemas.microsoft.com/office/drawing/2014/main" id="{B3D9149F-73DA-418D-A1AA-E015F4E3FA6B}"/>
+                </a:ext>
+              </a:extLst>
+            </p:cNvPr>
+            <p:cNvCxnSpPr>
+              <a:cxnSpLocks/>
+            </p:cNvCxnSpPr>
+            <p:nvPr/>
+          </p:nvCxnSpPr>
+          <p:spPr>
+            <a:xfrm flipV="1">
+              <a:off x="2336763" y="4544609"/>
+              <a:ext cx="0" cy="1723026"/>
+            </a:xfrm>
+            <a:prstGeom prst="line">
+              <a:avLst/>
+            </a:prstGeom>
+            <a:ln w="19050">
+              <a:solidFill>
+                <a:schemeClr val="accent4">
+                  <a:lumMod val="60000"/>
+                  <a:lumOff val="40000"/>
+                </a:schemeClr>
+              </a:solidFill>
+              <a:prstDash val="dash"/>
+            </a:ln>
+          </p:spPr>
+          <p:style>
+            <a:lnRef idx="1">
+              <a:schemeClr val="accent1"/>
+            </a:lnRef>
+            <a:fillRef idx="0">
+              <a:schemeClr val="accent1"/>
+            </a:fillRef>
+            <a:effectRef idx="0">
+              <a:schemeClr val="accent1"/>
+            </a:effectRef>
+            <a:fontRef idx="minor">
+              <a:schemeClr val="tx1"/>
+            </a:fontRef>
+          </p:style>
+        </p:cxnSp>
+        <p:cxnSp>
+          <p:nvCxnSpPr>
+            <p:cNvPr id="8" name="Connettore diritto 7">
+              <a:extLst>
+                <a:ext uri="{FF2B5EF4-FFF2-40B4-BE49-F238E27FC236}">
+                  <a16:creationId xmlns:a16="http://schemas.microsoft.com/office/drawing/2014/main" id="{069FB223-34D3-4D13-9474-089AFE6E8EC1}"/>
+                </a:ext>
+              </a:extLst>
+            </p:cNvPr>
+            <p:cNvCxnSpPr/>
+            <p:nvPr/>
+          </p:nvCxnSpPr>
+          <p:spPr>
+            <a:xfrm>
+              <a:off x="5095874" y="2824938"/>
+              <a:ext cx="2219326" cy="0"/>
+            </a:xfrm>
+            <a:prstGeom prst="line">
+              <a:avLst/>
+            </a:prstGeom>
+            <a:ln w="19050">
+              <a:solidFill>
+                <a:schemeClr val="accent4">
+                  <a:lumMod val="60000"/>
+                  <a:lumOff val="40000"/>
+                </a:schemeClr>
+              </a:solidFill>
+              <a:prstDash val="dash"/>
+            </a:ln>
+          </p:spPr>
+          <p:style>
+            <a:lnRef idx="1">
+              <a:schemeClr val="accent1"/>
+            </a:lnRef>
+            <a:fillRef idx="0">
+              <a:schemeClr val="accent1"/>
+            </a:fillRef>
+            <a:effectRef idx="0">
+              <a:schemeClr val="accent1"/>
+            </a:effectRef>
+            <a:fontRef idx="minor">
+              <a:schemeClr val="tx1"/>
+            </a:fontRef>
+          </p:style>
+        </p:cxnSp>
+        <p:cxnSp>
+          <p:nvCxnSpPr>
+            <p:cNvPr id="16" name="Connettore diritto 15">
+              <a:extLst>
+                <a:ext uri="{FF2B5EF4-FFF2-40B4-BE49-F238E27FC236}">
+                  <a16:creationId xmlns:a16="http://schemas.microsoft.com/office/drawing/2014/main" id="{BF391156-E784-4064-B6B0-4BDB965F41E0}"/>
+                </a:ext>
+              </a:extLst>
+            </p:cNvPr>
+            <p:cNvCxnSpPr/>
+            <p:nvPr/>
+          </p:nvCxnSpPr>
+          <p:spPr>
+            <a:xfrm>
+              <a:off x="7315200" y="2824938"/>
+              <a:ext cx="0" cy="3442697"/>
+            </a:xfrm>
+            <a:prstGeom prst="line">
+              <a:avLst/>
+            </a:prstGeom>
+            <a:ln w="19050">
+              <a:solidFill>
+                <a:schemeClr val="accent4">
+                  <a:lumMod val="60000"/>
+                  <a:lumOff val="40000"/>
+                </a:schemeClr>
+              </a:solidFill>
+              <a:prstDash val="dash"/>
+            </a:ln>
+          </p:spPr>
+          <p:style>
+            <a:lnRef idx="1">
+              <a:schemeClr val="accent1"/>
+            </a:lnRef>
+            <a:fillRef idx="0">
+              <a:schemeClr val="accent1"/>
+            </a:fillRef>
+            <a:effectRef idx="0">
+              <a:schemeClr val="accent1"/>
+            </a:effectRef>
+            <a:fontRef idx="minor">
+              <a:schemeClr val="tx1"/>
+            </a:fontRef>
+          </p:style>
+        </p:cxnSp>
+        <p:cxnSp>
+          <p:nvCxnSpPr>
+            <p:cNvPr id="18" name="Connettore diritto 17">
+              <a:extLst>
+                <a:ext uri="{FF2B5EF4-FFF2-40B4-BE49-F238E27FC236}">
+                  <a16:creationId xmlns:a16="http://schemas.microsoft.com/office/drawing/2014/main" id="{CBD88759-98D9-4B1B-A3BF-B8FA82E10583}"/>
+                </a:ext>
+              </a:extLst>
+            </p:cNvPr>
+            <p:cNvCxnSpPr>
+              <a:cxnSpLocks/>
+            </p:cNvCxnSpPr>
+            <p:nvPr/>
+          </p:nvCxnSpPr>
+          <p:spPr>
+            <a:xfrm flipH="1">
+              <a:off x="2263806" y="6267635"/>
+              <a:ext cx="5051395" cy="0"/>
+            </a:xfrm>
+            <a:prstGeom prst="line">
+              <a:avLst/>
+            </a:prstGeom>
+            <a:ln w="19050">
+              <a:solidFill>
+                <a:schemeClr val="accent4">
+                  <a:lumMod val="60000"/>
+                  <a:lumOff val="40000"/>
+                </a:schemeClr>
+              </a:solidFill>
+              <a:prstDash val="dash"/>
+            </a:ln>
+          </p:spPr>
+          <p:style>
+            <a:lnRef idx="1">
+              <a:schemeClr val="accent1"/>
+            </a:lnRef>
+            <a:fillRef idx="0">
+              <a:schemeClr val="accent1"/>
+            </a:fillRef>
+            <a:effectRef idx="0">
+              <a:schemeClr val="accent1"/>
+            </a:effectRef>
+            <a:fontRef idx="minor">
+              <a:schemeClr val="tx1"/>
+            </a:fontRef>
+          </p:style>
+        </p:cxnSp>
+        <p:cxnSp>
+          <p:nvCxnSpPr>
+            <p:cNvPr id="37" name="Connettore diritto 36">
+              <a:extLst>
+                <a:ext uri="{FF2B5EF4-FFF2-40B4-BE49-F238E27FC236}">
+                  <a16:creationId xmlns:a16="http://schemas.microsoft.com/office/drawing/2014/main" id="{6F726565-DA98-4E18-B603-1718B351A256}"/>
+                </a:ext>
+              </a:extLst>
+            </p:cNvPr>
+            <p:cNvCxnSpPr>
+              <a:cxnSpLocks/>
+            </p:cNvCxnSpPr>
+            <p:nvPr/>
+          </p:nvCxnSpPr>
+          <p:spPr>
+            <a:xfrm>
+              <a:off x="2336763" y="4536397"/>
+              <a:ext cx="2759111" cy="0"/>
+            </a:xfrm>
+            <a:prstGeom prst="line">
+              <a:avLst/>
+            </a:prstGeom>
+            <a:ln w="19050">
+              <a:solidFill>
+                <a:schemeClr val="accent4">
+                  <a:lumMod val="60000"/>
+                  <a:lumOff val="40000"/>
+                </a:schemeClr>
+              </a:solidFill>
+              <a:prstDash val="dash"/>
+            </a:ln>
+          </p:spPr>
+          <p:style>
+            <a:lnRef idx="1">
+              <a:schemeClr val="accent1"/>
+            </a:lnRef>
+            <a:fillRef idx="0">
+              <a:schemeClr val="accent1"/>
+            </a:fillRef>
+            <a:effectRef idx="0">
+              <a:schemeClr val="accent1"/>
+            </a:effectRef>
+            <a:fontRef idx="minor">
+              <a:schemeClr val="tx1"/>
+            </a:fontRef>
+          </p:style>
+        </p:cxnSp>
+        <p:cxnSp>
+          <p:nvCxnSpPr>
+            <p:cNvPr id="39" name="Connettore diritto 38">
+              <a:extLst>
+                <a:ext uri="{FF2B5EF4-FFF2-40B4-BE49-F238E27FC236}">
+                  <a16:creationId xmlns:a16="http://schemas.microsoft.com/office/drawing/2014/main" id="{CA62FE2F-CBD4-438C-BDFB-D73BBBA31115}"/>
+                </a:ext>
+              </a:extLst>
+            </p:cNvPr>
+            <p:cNvCxnSpPr/>
+            <p:nvPr/>
+          </p:nvCxnSpPr>
+          <p:spPr>
+            <a:xfrm>
+              <a:off x="5095874" y="2824938"/>
+              <a:ext cx="0" cy="1711459"/>
+            </a:xfrm>
+            <a:prstGeom prst="line">
+              <a:avLst/>
+            </a:prstGeom>
+            <a:ln w="19050">
+              <a:solidFill>
+                <a:schemeClr val="accent4">
+                  <a:lumMod val="60000"/>
+                  <a:lumOff val="40000"/>
+                </a:schemeClr>
+              </a:solidFill>
+              <a:prstDash val="dash"/>
+            </a:ln>
+          </p:spPr>
+          <p:style>
+            <a:lnRef idx="1">
+              <a:schemeClr val="accent1"/>
+            </a:lnRef>
+            <a:fillRef idx="0">
+              <a:schemeClr val="accent1"/>
+            </a:fillRef>
+            <a:effectRef idx="0">
+              <a:schemeClr val="accent1"/>
+            </a:effectRef>
+            <a:fontRef idx="minor">
+              <a:schemeClr val="tx1"/>
+            </a:fontRef>
+          </p:style>
+        </p:cxnSp>
+      </p:grpSp>
+      <p:sp>
+        <p:nvSpPr>
+          <p:cNvPr id="48" name="CasellaDiTesto 47">
+            <a:extLst>
+              <a:ext uri="{FF2B5EF4-FFF2-40B4-BE49-F238E27FC236}">
+                <a16:creationId xmlns:a16="http://schemas.microsoft.com/office/drawing/2014/main" id="{63DCC8D9-56D4-4FBC-AF80-37CC4264C1F1}"/>
+              </a:ext>
+            </a:extLst>
+          </p:cNvPr>
+          <p:cNvSpPr txBox="1"/>
+          <p:nvPr/>
+        </p:nvSpPr>
+        <p:spPr>
+          <a:xfrm>
+            <a:off x="7270809" y="2870924"/>
+            <a:ext cx="1125047" cy="369332"/>
+          </a:xfrm>
+          <a:prstGeom prst="rect">
+            <a:avLst/>
+          </a:prstGeom>
+          <a:noFill/>
+        </p:spPr>
+        <p:txBody>
+          <a:bodyPr wrap="square" rtlCol="0">
+            <a:spAutoFit/>
+          </a:bodyPr>
+          <a:lstStyle/>
+          <a:p>
+            <a:r>
+              <a:rPr lang="en-US" dirty="0">
+                <a:solidFill>
+                  <a:schemeClr val="accent4">
+                    <a:lumMod val="60000"/>
+                    <a:lumOff val="40000"/>
+                  </a:schemeClr>
+                </a:solidFill>
+              </a:rPr>
+              <a:t>Section 2</a:t>
+            </a:r>
+            <a:endParaRPr lang="it-IT" dirty="0">
+              <a:solidFill>
+                <a:schemeClr val="accent4">
+                  <a:lumMod val="60000"/>
+                  <a:lumOff val="40000"/>
+                </a:schemeClr>
+              </a:solidFill>
+            </a:endParaRPr>
+          </a:p>
+        </p:txBody>
+      </p:sp>
+      <p:sp>
+        <p:nvSpPr>
+          <p:cNvPr id="50" name="Rettangolo 49">
+            <a:extLst>
+              <a:ext uri="{FF2B5EF4-FFF2-40B4-BE49-F238E27FC236}">
+                <a16:creationId xmlns:a16="http://schemas.microsoft.com/office/drawing/2014/main" id="{181C2D10-3804-462C-8271-9208BE241265}"/>
+              </a:ext>
+            </a:extLst>
+          </p:cNvPr>
+          <p:cNvSpPr/>
+          <p:nvPr/>
+        </p:nvSpPr>
+        <p:spPr>
+          <a:xfrm>
+            <a:off x="1564600" y="2684834"/>
+            <a:ext cx="1886588" cy="1727896"/>
+          </a:xfrm>
+          <a:prstGeom prst="rect">
+            <a:avLst/>
+          </a:prstGeom>
+          <a:noFill/>
+          <a:ln w="19050">
+            <a:solidFill>
+              <a:srgbClr val="FF0000"/>
+            </a:solidFill>
+            <a:prstDash val="dash"/>
+          </a:ln>
+        </p:spPr>
+        <p:style>
+          <a:lnRef idx="2">
+            <a:schemeClr val="accent1">
+              <a:shade val="50000"/>
+            </a:schemeClr>
+          </a:lnRef>
+          <a:fillRef idx="1">
+            <a:schemeClr val="accent1"/>
+          </a:fillRef>
+          <a:effectRef idx="0">
+            <a:schemeClr val="accent1"/>
+          </a:effectRef>
+          <a:fontRef idx="minor">
+            <a:schemeClr val="lt1"/>
+          </a:fontRef>
+        </p:style>
+        <p:txBody>
+          <a:bodyPr rtlCol="0" anchor="ctr"/>
+          <a:lstStyle/>
+          <a:p>
+            <a:pPr algn="ctr"/>
+            <a:endParaRPr lang="it-IT"/>
+          </a:p>
+        </p:txBody>
+      </p:sp>
+      <p:sp>
+        <p:nvSpPr>
+          <p:cNvPr id="85" name="CasellaDiTesto 84">
+            <a:extLst>
+              <a:ext uri="{FF2B5EF4-FFF2-40B4-BE49-F238E27FC236}">
+                <a16:creationId xmlns:a16="http://schemas.microsoft.com/office/drawing/2014/main" id="{200E67BA-AF06-4E25-AAB3-E0EFB8709A63}"/>
+              </a:ext>
+            </a:extLst>
+          </p:cNvPr>
+          <p:cNvSpPr txBox="1"/>
+          <p:nvPr/>
+        </p:nvSpPr>
+        <p:spPr>
+          <a:xfrm>
+            <a:off x="1564600" y="2265553"/>
+            <a:ext cx="1357551" cy="369332"/>
+          </a:xfrm>
+          <a:prstGeom prst="rect">
+            <a:avLst/>
+          </a:prstGeom>
+          <a:noFill/>
+        </p:spPr>
+        <p:txBody>
+          <a:bodyPr wrap="square" rtlCol="0">
+            <a:spAutoFit/>
+          </a:bodyPr>
+          <a:lstStyle/>
+          <a:p>
+            <a:r>
+              <a:rPr lang="en-US" dirty="0">
+                <a:solidFill>
+                  <a:srgbClr val="FF0000"/>
+                </a:solidFill>
+              </a:rPr>
+              <a:t>Section 5.3</a:t>
+            </a:r>
+            <a:endParaRPr lang="it-IT" dirty="0">
+              <a:solidFill>
+                <a:srgbClr val="FF0000"/>
+              </a:solidFill>
+            </a:endParaRPr>
+          </a:p>
+        </p:txBody>
+      </p:sp>
+      <p:grpSp>
+        <p:nvGrpSpPr>
+          <p:cNvPr id="76" name="Gruppo 75">
+            <a:extLst>
+              <a:ext uri="{FF2B5EF4-FFF2-40B4-BE49-F238E27FC236}">
+                <a16:creationId xmlns:a16="http://schemas.microsoft.com/office/drawing/2014/main" id="{209AAE03-339F-40D8-B34E-C02F10F82FE9}"/>
+              </a:ext>
+            </a:extLst>
+          </p:cNvPr>
+          <p:cNvGrpSpPr/>
+          <p:nvPr/>
+        </p:nvGrpSpPr>
+        <p:grpSpPr>
+          <a:xfrm>
+            <a:off x="175098" y="3746905"/>
+            <a:ext cx="3378076" cy="2741444"/>
+            <a:chOff x="175098" y="3746905"/>
+            <a:chExt cx="3378076" cy="2741444"/>
+          </a:xfrm>
+        </p:grpSpPr>
+        <p:cxnSp>
+          <p:nvCxnSpPr>
+            <p:cNvPr id="52" name="Connettore diritto 51">
+              <a:extLst>
+                <a:ext uri="{FF2B5EF4-FFF2-40B4-BE49-F238E27FC236}">
+                  <a16:creationId xmlns:a16="http://schemas.microsoft.com/office/drawing/2014/main" id="{5F3028D0-709F-4C7C-93E0-069D80B1E8C7}"/>
+                </a:ext>
+              </a:extLst>
+            </p:cNvPr>
+            <p:cNvCxnSpPr/>
+            <p:nvPr/>
+          </p:nvCxnSpPr>
+          <p:spPr>
+            <a:xfrm flipH="1">
+              <a:off x="1468877" y="4544609"/>
+              <a:ext cx="2084297" cy="0"/>
+            </a:xfrm>
+            <a:prstGeom prst="line">
+              <a:avLst/>
+            </a:prstGeom>
+            <a:ln w="19050">
+              <a:solidFill>
+                <a:srgbClr val="00B0F0"/>
+              </a:solidFill>
+              <a:prstDash val="dash"/>
+            </a:ln>
+          </p:spPr>
+          <p:style>
+            <a:lnRef idx="1">
+              <a:schemeClr val="accent1"/>
+            </a:lnRef>
+            <a:fillRef idx="0">
+              <a:schemeClr val="accent1"/>
+            </a:fillRef>
+            <a:effectRef idx="0">
+              <a:schemeClr val="accent1"/>
+            </a:effectRef>
+            <a:fontRef idx="minor">
+              <a:schemeClr val="tx1"/>
+            </a:fontRef>
+          </p:style>
+        </p:cxnSp>
+        <p:cxnSp>
+          <p:nvCxnSpPr>
+            <p:cNvPr id="61" name="Connettore diritto 60">
+              <a:extLst>
+                <a:ext uri="{FF2B5EF4-FFF2-40B4-BE49-F238E27FC236}">
+                  <a16:creationId xmlns:a16="http://schemas.microsoft.com/office/drawing/2014/main" id="{223FF7C4-0CB5-48E2-8CD5-B40F044D7B8E}"/>
+                </a:ext>
+              </a:extLst>
+            </p:cNvPr>
+            <p:cNvCxnSpPr/>
+            <p:nvPr/>
+          </p:nvCxnSpPr>
+          <p:spPr>
+            <a:xfrm flipV="1">
+              <a:off x="1478604" y="3746905"/>
+              <a:ext cx="0" cy="789492"/>
+            </a:xfrm>
+            <a:prstGeom prst="line">
+              <a:avLst/>
+            </a:prstGeom>
+            <a:ln w="19050">
+              <a:solidFill>
+                <a:srgbClr val="00B0F0"/>
+              </a:solidFill>
+              <a:prstDash val="dash"/>
+            </a:ln>
+          </p:spPr>
+          <p:style>
+            <a:lnRef idx="1">
+              <a:schemeClr val="accent1"/>
+            </a:lnRef>
+            <a:fillRef idx="0">
+              <a:schemeClr val="accent1"/>
+            </a:fillRef>
+            <a:effectRef idx="0">
+              <a:schemeClr val="accent1"/>
+            </a:effectRef>
+            <a:fontRef idx="minor">
+              <a:schemeClr val="tx1"/>
+            </a:fontRef>
+          </p:style>
+        </p:cxnSp>
+        <p:cxnSp>
+          <p:nvCxnSpPr>
+            <p:cNvPr id="67" name="Connettore diritto 66">
+              <a:extLst>
+                <a:ext uri="{FF2B5EF4-FFF2-40B4-BE49-F238E27FC236}">
+                  <a16:creationId xmlns:a16="http://schemas.microsoft.com/office/drawing/2014/main" id="{8E4EF610-8675-4672-B593-8F0FA9F1AEFB}"/>
+                </a:ext>
+              </a:extLst>
+            </p:cNvPr>
+            <p:cNvCxnSpPr>
+              <a:cxnSpLocks/>
+            </p:cNvCxnSpPr>
+            <p:nvPr/>
+          </p:nvCxnSpPr>
+          <p:spPr>
+            <a:xfrm flipH="1">
+              <a:off x="175098" y="3746905"/>
+              <a:ext cx="1303506" cy="0"/>
+            </a:xfrm>
+            <a:prstGeom prst="line">
+              <a:avLst/>
+            </a:prstGeom>
+            <a:ln w="19050">
+              <a:solidFill>
+                <a:srgbClr val="00B0F0"/>
+              </a:solidFill>
+              <a:prstDash val="dash"/>
+            </a:ln>
+          </p:spPr>
+          <p:style>
+            <a:lnRef idx="1">
+              <a:schemeClr val="accent1"/>
+            </a:lnRef>
+            <a:fillRef idx="0">
+              <a:schemeClr val="accent1"/>
+            </a:fillRef>
+            <a:effectRef idx="0">
+              <a:schemeClr val="accent1"/>
+            </a:effectRef>
+            <a:fontRef idx="minor">
+              <a:schemeClr val="tx1"/>
+            </a:fontRef>
+          </p:style>
+        </p:cxnSp>
+        <p:cxnSp>
+          <p:nvCxnSpPr>
+            <p:cNvPr id="69" name="Connettore diritto 68">
+              <a:extLst>
+                <a:ext uri="{FF2B5EF4-FFF2-40B4-BE49-F238E27FC236}">
+                  <a16:creationId xmlns:a16="http://schemas.microsoft.com/office/drawing/2014/main" id="{134AC295-DF0F-442D-A474-727871D6C269}"/>
+                </a:ext>
+              </a:extLst>
+            </p:cNvPr>
+            <p:cNvCxnSpPr/>
+            <p:nvPr/>
+          </p:nvCxnSpPr>
+          <p:spPr>
+            <a:xfrm>
+              <a:off x="175098" y="3746905"/>
+              <a:ext cx="0" cy="2731716"/>
+            </a:xfrm>
+            <a:prstGeom prst="line">
+              <a:avLst/>
+            </a:prstGeom>
+            <a:ln w="19050">
+              <a:solidFill>
+                <a:srgbClr val="00B0F0"/>
+              </a:solidFill>
+              <a:prstDash val="dash"/>
+            </a:ln>
+          </p:spPr>
+          <p:style>
+            <a:lnRef idx="1">
+              <a:schemeClr val="accent1"/>
+            </a:lnRef>
+            <a:fillRef idx="0">
+              <a:schemeClr val="accent1"/>
+            </a:fillRef>
+            <a:effectRef idx="0">
+              <a:schemeClr val="accent1"/>
+            </a:effectRef>
+            <a:fontRef idx="minor">
+              <a:schemeClr val="tx1"/>
+            </a:fontRef>
+          </p:style>
+        </p:cxnSp>
+        <p:cxnSp>
+          <p:nvCxnSpPr>
+            <p:cNvPr id="71" name="Connettore diritto 70">
+              <a:extLst>
+                <a:ext uri="{FF2B5EF4-FFF2-40B4-BE49-F238E27FC236}">
+                  <a16:creationId xmlns:a16="http://schemas.microsoft.com/office/drawing/2014/main" id="{13AE4735-5949-4976-8AF5-3E7C782C9B7D}"/>
+                </a:ext>
+              </a:extLst>
+            </p:cNvPr>
+            <p:cNvCxnSpPr/>
+            <p:nvPr/>
+          </p:nvCxnSpPr>
+          <p:spPr>
+            <a:xfrm>
+              <a:off x="175098" y="6488349"/>
+              <a:ext cx="3378076" cy="0"/>
+            </a:xfrm>
+            <a:prstGeom prst="line">
+              <a:avLst/>
+            </a:prstGeom>
+            <a:ln w="19050">
+              <a:solidFill>
+                <a:srgbClr val="00B0F0"/>
+              </a:solidFill>
+              <a:prstDash val="dash"/>
+            </a:ln>
+          </p:spPr>
+          <p:style>
+            <a:lnRef idx="1">
+              <a:schemeClr val="accent1"/>
+            </a:lnRef>
+            <a:fillRef idx="0">
+              <a:schemeClr val="accent1"/>
+            </a:fillRef>
+            <a:effectRef idx="0">
+              <a:schemeClr val="accent1"/>
+            </a:effectRef>
+            <a:fontRef idx="minor">
+              <a:schemeClr val="tx1"/>
+            </a:fontRef>
+          </p:style>
+        </p:cxnSp>
+        <p:cxnSp>
+          <p:nvCxnSpPr>
+            <p:cNvPr id="74" name="Connettore diritto 73">
+              <a:extLst>
+                <a:ext uri="{FF2B5EF4-FFF2-40B4-BE49-F238E27FC236}">
+                  <a16:creationId xmlns:a16="http://schemas.microsoft.com/office/drawing/2014/main" id="{4289537D-D624-4961-977F-47BF7350D60B}"/>
+                </a:ext>
+              </a:extLst>
+            </p:cNvPr>
+            <p:cNvCxnSpPr/>
+            <p:nvPr/>
+          </p:nvCxnSpPr>
+          <p:spPr>
+            <a:xfrm>
+              <a:off x="3553174" y="4544609"/>
+              <a:ext cx="0" cy="1934012"/>
+            </a:xfrm>
+            <a:prstGeom prst="line">
+              <a:avLst/>
+            </a:prstGeom>
+            <a:ln w="19050">
+              <a:solidFill>
+                <a:srgbClr val="00B0F0"/>
+              </a:solidFill>
+              <a:prstDash val="dash"/>
+            </a:ln>
+          </p:spPr>
+          <p:style>
+            <a:lnRef idx="1">
+              <a:schemeClr val="accent1"/>
+            </a:lnRef>
+            <a:fillRef idx="0">
+              <a:schemeClr val="accent1"/>
+            </a:fillRef>
+            <a:effectRef idx="0">
+              <a:schemeClr val="accent1"/>
+            </a:effectRef>
+            <a:fontRef idx="minor">
+              <a:schemeClr val="tx1"/>
+            </a:fontRef>
+          </p:style>
+        </p:cxnSp>
+      </p:grpSp>
+      <p:sp>
+        <p:nvSpPr>
+          <p:cNvPr id="100" name="CasellaDiTesto 99">
+            <a:extLst>
+              <a:ext uri="{FF2B5EF4-FFF2-40B4-BE49-F238E27FC236}">
+                <a16:creationId xmlns:a16="http://schemas.microsoft.com/office/drawing/2014/main" id="{8AC35EBD-8279-4FBC-ADAF-6E4B16DA57F2}"/>
+              </a:ext>
+            </a:extLst>
+          </p:cNvPr>
+          <p:cNvSpPr txBox="1"/>
+          <p:nvPr/>
+        </p:nvSpPr>
+        <p:spPr>
+          <a:xfrm>
+            <a:off x="-35696" y="3254721"/>
+            <a:ext cx="1357551" cy="369332"/>
+          </a:xfrm>
+          <a:prstGeom prst="rect">
+            <a:avLst/>
+          </a:prstGeom>
+          <a:noFill/>
+        </p:spPr>
+        <p:txBody>
+          <a:bodyPr wrap="square" rtlCol="0">
+            <a:spAutoFit/>
+          </a:bodyPr>
+          <a:lstStyle/>
+          <a:p>
+            <a:r>
+              <a:rPr lang="en-US" dirty="0">
+                <a:solidFill>
+                  <a:srgbClr val="00B0F0"/>
+                </a:solidFill>
+              </a:rPr>
+              <a:t>Section 5.4</a:t>
+            </a:r>
+            <a:endParaRPr lang="it-IT" dirty="0">
+              <a:solidFill>
+                <a:srgbClr val="00B0F0"/>
+              </a:solidFill>
+            </a:endParaRPr>
+          </a:p>
+        </p:txBody>
+      </p:sp>
+      <p:sp>
+        <p:nvSpPr>
+          <p:cNvPr id="101" name="Rettangolo 100">
+            <a:extLst>
+              <a:ext uri="{FF2B5EF4-FFF2-40B4-BE49-F238E27FC236}">
+                <a16:creationId xmlns:a16="http://schemas.microsoft.com/office/drawing/2014/main" id="{42B8763A-C1F3-4C4D-9E25-3A3D4C6A900C}"/>
+              </a:ext>
+            </a:extLst>
+          </p:cNvPr>
+          <p:cNvSpPr/>
+          <p:nvPr/>
+        </p:nvSpPr>
+        <p:spPr>
+          <a:xfrm>
+            <a:off x="5045413" y="26827"/>
+            <a:ext cx="1357551" cy="1007030"/>
+          </a:xfrm>
+          <a:prstGeom prst="rect">
+            <a:avLst/>
+          </a:prstGeom>
+          <a:noFill/>
+          <a:ln w="19050">
+            <a:solidFill>
+              <a:srgbClr val="00B050"/>
+            </a:solidFill>
+            <a:prstDash val="dash"/>
+          </a:ln>
+        </p:spPr>
+        <p:style>
+          <a:lnRef idx="2">
+            <a:schemeClr val="accent1">
+              <a:shade val="50000"/>
+            </a:schemeClr>
+          </a:lnRef>
+          <a:fillRef idx="1">
+            <a:schemeClr val="accent1"/>
+          </a:fillRef>
+          <a:effectRef idx="0">
+            <a:schemeClr val="accent1"/>
+          </a:effectRef>
+          <a:fontRef idx="minor">
+            <a:schemeClr val="lt1"/>
+          </a:fontRef>
+        </p:style>
+        <p:txBody>
+          <a:bodyPr rtlCol="0" anchor="ctr"/>
+          <a:lstStyle/>
+          <a:p>
+            <a:pPr algn="ctr"/>
+            <a:endParaRPr lang="it-IT"/>
+          </a:p>
+        </p:txBody>
+      </p:sp>
+      <p:sp>
+        <p:nvSpPr>
+          <p:cNvPr id="102" name="CasellaDiTesto 101">
+            <a:extLst>
+              <a:ext uri="{FF2B5EF4-FFF2-40B4-BE49-F238E27FC236}">
+                <a16:creationId xmlns:a16="http://schemas.microsoft.com/office/drawing/2014/main" id="{86D55956-6E37-4768-95DE-BE0CDF3440C6}"/>
+              </a:ext>
+            </a:extLst>
+          </p:cNvPr>
+          <p:cNvSpPr txBox="1"/>
+          <p:nvPr/>
+        </p:nvSpPr>
+        <p:spPr>
+          <a:xfrm>
+            <a:off x="6410064" y="376212"/>
+            <a:ext cx="1357551" cy="369332"/>
+          </a:xfrm>
+          <a:prstGeom prst="rect">
+            <a:avLst/>
+          </a:prstGeom>
+          <a:noFill/>
+        </p:spPr>
+        <p:txBody>
+          <a:bodyPr wrap="square" rtlCol="0">
+            <a:spAutoFit/>
+          </a:bodyPr>
+          <a:lstStyle/>
+          <a:p>
+            <a:r>
+              <a:rPr lang="en-US" dirty="0">
+                <a:solidFill>
+                  <a:srgbClr val="00B050"/>
+                </a:solidFill>
+              </a:rPr>
+              <a:t>Section 5.1</a:t>
+            </a:r>
+            <a:endParaRPr lang="it-IT" dirty="0">
+              <a:solidFill>
+                <a:srgbClr val="00B050"/>
+              </a:solidFill>
+            </a:endParaRPr>
+          </a:p>
+        </p:txBody>
+      </p:sp>
+      <p:sp>
+        <p:nvSpPr>
+          <p:cNvPr id="103" name="Rettangolo 102">
+            <a:extLst>
+              <a:ext uri="{FF2B5EF4-FFF2-40B4-BE49-F238E27FC236}">
+                <a16:creationId xmlns:a16="http://schemas.microsoft.com/office/drawing/2014/main" id="{D859EF95-68F1-4D7E-A7CA-9AE067CEAD27}"/>
+              </a:ext>
+            </a:extLst>
+          </p:cNvPr>
+          <p:cNvSpPr/>
+          <p:nvPr/>
+        </p:nvSpPr>
+        <p:spPr>
+          <a:xfrm>
+            <a:off x="9027939" y="3087775"/>
+            <a:ext cx="1912179" cy="978440"/>
+          </a:xfrm>
+          <a:prstGeom prst="rect">
+            <a:avLst/>
+          </a:prstGeom>
+          <a:noFill/>
+          <a:ln w="19050">
+            <a:solidFill>
+              <a:schemeClr val="accent4">
+                <a:lumMod val="50000"/>
+              </a:schemeClr>
+            </a:solidFill>
+            <a:prstDash val="dash"/>
+          </a:ln>
+        </p:spPr>
+        <p:style>
+          <a:lnRef idx="2">
+            <a:schemeClr val="accent1">
+              <a:shade val="50000"/>
+            </a:schemeClr>
+          </a:lnRef>
+          <a:fillRef idx="1">
+            <a:schemeClr val="accent1"/>
+          </a:fillRef>
+          <a:effectRef idx="0">
+            <a:schemeClr val="accent1"/>
+          </a:effectRef>
+          <a:fontRef idx="minor">
+            <a:schemeClr val="lt1"/>
+          </a:fontRef>
+        </p:style>
+        <p:txBody>
+          <a:bodyPr rtlCol="0" anchor="ctr"/>
+          <a:lstStyle/>
+          <a:p>
+            <a:pPr algn="ctr"/>
+            <a:endParaRPr lang="it-IT"/>
+          </a:p>
+        </p:txBody>
+      </p:sp>
+      <p:sp>
+        <p:nvSpPr>
+          <p:cNvPr id="116" name="CasellaDiTesto 115">
+            <a:extLst>
+              <a:ext uri="{FF2B5EF4-FFF2-40B4-BE49-F238E27FC236}">
+                <a16:creationId xmlns:a16="http://schemas.microsoft.com/office/drawing/2014/main" id="{E233574E-24F7-4780-B352-2A944CDB0650}"/>
+              </a:ext>
+            </a:extLst>
+          </p:cNvPr>
+          <p:cNvSpPr txBox="1"/>
+          <p:nvPr/>
+        </p:nvSpPr>
+        <p:spPr>
+          <a:xfrm>
+            <a:off x="9582567" y="2669746"/>
+            <a:ext cx="1357551" cy="369332"/>
+          </a:xfrm>
+          <a:prstGeom prst="rect">
+            <a:avLst/>
+          </a:prstGeom>
+          <a:noFill/>
+        </p:spPr>
+        <p:txBody>
+          <a:bodyPr wrap="square" rtlCol="0">
+            <a:spAutoFit/>
+          </a:bodyPr>
+          <a:lstStyle/>
+          <a:p>
+            <a:r>
+              <a:rPr lang="en-US" dirty="0">
+                <a:solidFill>
+                  <a:schemeClr val="accent4">
+                    <a:lumMod val="50000"/>
+                  </a:schemeClr>
+                </a:solidFill>
+              </a:rPr>
+              <a:t>Section 5.2</a:t>
+            </a:r>
+            <a:endParaRPr lang="it-IT" dirty="0">
+              <a:solidFill>
+                <a:schemeClr val="accent4">
+                  <a:lumMod val="50000"/>
+                </a:schemeClr>
+              </a:solidFill>
+            </a:endParaRPr>
+          </a:p>
+        </p:txBody>
+      </p:sp>
+      <p:sp>
+        <p:nvSpPr>
+          <p:cNvPr id="81" name="Rettangolo 80">
+            <a:extLst>
+              <a:ext uri="{FF2B5EF4-FFF2-40B4-BE49-F238E27FC236}">
+                <a16:creationId xmlns:a16="http://schemas.microsoft.com/office/drawing/2014/main" id="{591C82C0-734F-4ABE-A5EA-AC222826BB77}"/>
+              </a:ext>
+            </a:extLst>
+          </p:cNvPr>
+          <p:cNvSpPr/>
+          <p:nvPr/>
+        </p:nvSpPr>
+        <p:spPr>
+          <a:xfrm>
+            <a:off x="34290" y="1527243"/>
+            <a:ext cx="12106275" cy="5252936"/>
+          </a:xfrm>
+          <a:prstGeom prst="rect">
+            <a:avLst/>
+          </a:prstGeom>
+          <a:noFill/>
+          <a:ln w="34925">
+            <a:solidFill>
+              <a:srgbClr val="006600"/>
+            </a:solidFill>
+            <a:prstDash val="solid"/>
+          </a:ln>
+        </p:spPr>
+        <p:style>
+          <a:lnRef idx="2">
+            <a:schemeClr val="accent1">
+              <a:shade val="50000"/>
+            </a:schemeClr>
+          </a:lnRef>
+          <a:fillRef idx="1">
+            <a:schemeClr val="accent1"/>
+          </a:fillRef>
+          <a:effectRef idx="0">
+            <a:schemeClr val="accent1"/>
+          </a:effectRef>
+          <a:fontRef idx="minor">
+            <a:schemeClr val="lt1"/>
+          </a:fontRef>
+        </p:style>
+        <p:txBody>
+          <a:bodyPr rtlCol="0" anchor="ctr"/>
+          <a:lstStyle/>
+          <a:p>
+            <a:pPr algn="ctr"/>
+            <a:endParaRPr lang="it-IT"/>
+          </a:p>
+        </p:txBody>
+      </p:sp>
+      <p:sp>
+        <p:nvSpPr>
+          <p:cNvPr id="120" name="CasellaDiTesto 119">
+            <a:extLst>
+              <a:ext uri="{FF2B5EF4-FFF2-40B4-BE49-F238E27FC236}">
+                <a16:creationId xmlns:a16="http://schemas.microsoft.com/office/drawing/2014/main" id="{B3897843-1E28-4FC9-BAB8-463E9E65DAFC}"/>
+              </a:ext>
+            </a:extLst>
+          </p:cNvPr>
+          <p:cNvSpPr txBox="1"/>
+          <p:nvPr/>
+        </p:nvSpPr>
+        <p:spPr>
+          <a:xfrm>
+            <a:off x="7294266" y="1122677"/>
+            <a:ext cx="3318611" cy="369332"/>
+          </a:xfrm>
+          <a:prstGeom prst="rect">
+            <a:avLst/>
+          </a:prstGeom>
+          <a:noFill/>
+        </p:spPr>
+        <p:txBody>
+          <a:bodyPr wrap="square" rtlCol="0">
+            <a:spAutoFit/>
+          </a:bodyPr>
+          <a:lstStyle/>
+          <a:p>
+            <a:r>
+              <a:rPr lang="en-US" dirty="0">
+                <a:solidFill>
+                  <a:srgbClr val="006600"/>
+                </a:solidFill>
+              </a:rPr>
+              <a:t>Section 5.5 – Simulation loop</a:t>
+            </a:r>
+            <a:endParaRPr lang="it-IT" dirty="0">
+              <a:solidFill>
+                <a:srgbClr val="006600"/>
+              </a:solidFill>
+            </a:endParaRPr>
+          </a:p>
+        </p:txBody>
+      </p:sp>
+      <p:sp>
+        <p:nvSpPr>
+          <p:cNvPr id="121" name="Rettangolo 120">
+            <a:extLst>
+              <a:ext uri="{FF2B5EF4-FFF2-40B4-BE49-F238E27FC236}">
+                <a16:creationId xmlns:a16="http://schemas.microsoft.com/office/drawing/2014/main" id="{844F977A-CCCD-4405-9FE9-FEE80ADDE724}"/>
+              </a:ext>
+            </a:extLst>
+          </p:cNvPr>
+          <p:cNvSpPr/>
+          <p:nvPr/>
+        </p:nvSpPr>
+        <p:spPr>
+          <a:xfrm>
+            <a:off x="9096641" y="4114912"/>
+            <a:ext cx="1765873" cy="745337"/>
+          </a:xfrm>
+          <a:prstGeom prst="rect">
+            <a:avLst/>
+          </a:prstGeom>
+          <a:noFill/>
+          <a:ln w="19050">
+            <a:solidFill>
+              <a:srgbClr val="FF0000"/>
+            </a:solidFill>
+            <a:prstDash val="dash"/>
+          </a:ln>
+        </p:spPr>
+        <p:style>
+          <a:lnRef idx="2">
+            <a:schemeClr val="accent1">
+              <a:shade val="50000"/>
+            </a:schemeClr>
+          </a:lnRef>
+          <a:fillRef idx="1">
+            <a:schemeClr val="accent1"/>
+          </a:fillRef>
+          <a:effectRef idx="0">
+            <a:schemeClr val="accent1"/>
+          </a:effectRef>
+          <a:fontRef idx="minor">
+            <a:schemeClr val="lt1"/>
+          </a:fontRef>
+        </p:style>
+        <p:txBody>
+          <a:bodyPr rtlCol="0" anchor="ctr"/>
+          <a:lstStyle/>
+          <a:p>
+            <a:pPr algn="ctr"/>
+            <a:endParaRPr lang="it-IT"/>
+          </a:p>
+        </p:txBody>
+      </p:sp>
+      <p:sp>
+        <p:nvSpPr>
+          <p:cNvPr id="122" name="CasellaDiTesto 121">
+            <a:extLst>
+              <a:ext uri="{FF2B5EF4-FFF2-40B4-BE49-F238E27FC236}">
+                <a16:creationId xmlns:a16="http://schemas.microsoft.com/office/drawing/2014/main" id="{92CF9ABB-6EB1-426B-A38F-AE2FA37872D1}"/>
+              </a:ext>
+            </a:extLst>
+          </p:cNvPr>
+          <p:cNvSpPr txBox="1"/>
+          <p:nvPr/>
+        </p:nvSpPr>
+        <p:spPr>
+          <a:xfrm>
+            <a:off x="9443566" y="4847914"/>
+            <a:ext cx="1357551" cy="369332"/>
+          </a:xfrm>
+          <a:prstGeom prst="rect">
+            <a:avLst/>
+          </a:prstGeom>
+          <a:noFill/>
+        </p:spPr>
+        <p:txBody>
+          <a:bodyPr wrap="square" rtlCol="0">
+            <a:spAutoFit/>
+          </a:bodyPr>
+          <a:lstStyle/>
+          <a:p>
+            <a:r>
+              <a:rPr lang="en-US" dirty="0">
+                <a:solidFill>
+                  <a:srgbClr val="FF0000"/>
+                </a:solidFill>
+              </a:rPr>
+              <a:t>Section 5.3</a:t>
+            </a:r>
+            <a:endParaRPr lang="it-IT" dirty="0">
+              <a:solidFill>
+                <a:srgbClr val="FF0000"/>
+              </a:solidFill>
+            </a:endParaRPr>
+          </a:p>
+        </p:txBody>
+      </p:sp>
     </p:spTree>
     <p:extLst>
       <p:ext uri="{BB962C8B-B14F-4D97-AF65-F5344CB8AC3E}">

</xml_diff>